<commit_message>
cambie contenido de las diapositivas
</commit_message>
<xml_diff>
--- a/presentacion cripto hash.pptx
+++ b/presentacion cripto hash.pptx
@@ -5,7 +5,7 @@
     <p:sldMasterId id="2147483648" r:id="rId1"/>
   </p:sldMasterIdLst>
   <p:notesMasterIdLst>
-    <p:notesMasterId r:id="rId18"/>
+    <p:notesMasterId r:id="rId21"/>
   </p:notesMasterIdLst>
   <p:sldIdLst>
     <p:sldId id="256" r:id="rId2"/>
@@ -13,17 +13,20 @@
     <p:sldId id="272" r:id="rId4"/>
     <p:sldId id="260" r:id="rId5"/>
     <p:sldId id="262" r:id="rId6"/>
-    <p:sldId id="264" r:id="rId7"/>
-    <p:sldId id="274" r:id="rId8"/>
-    <p:sldId id="265" r:id="rId9"/>
-    <p:sldId id="276" r:id="rId10"/>
-    <p:sldId id="266" r:id="rId11"/>
-    <p:sldId id="261" r:id="rId12"/>
-    <p:sldId id="263" r:id="rId13"/>
-    <p:sldId id="268" r:id="rId14"/>
-    <p:sldId id="269" r:id="rId15"/>
-    <p:sldId id="270" r:id="rId16"/>
-    <p:sldId id="267" r:id="rId17"/>
+    <p:sldId id="278" r:id="rId7"/>
+    <p:sldId id="279" r:id="rId8"/>
+    <p:sldId id="264" r:id="rId9"/>
+    <p:sldId id="274" r:id="rId10"/>
+    <p:sldId id="265" r:id="rId11"/>
+    <p:sldId id="276" r:id="rId12"/>
+    <p:sldId id="266" r:id="rId13"/>
+    <p:sldId id="261" r:id="rId14"/>
+    <p:sldId id="263" r:id="rId15"/>
+    <p:sldId id="277" r:id="rId16"/>
+    <p:sldId id="268" r:id="rId17"/>
+    <p:sldId id="269" r:id="rId18"/>
+    <p:sldId id="270" r:id="rId19"/>
+    <p:sldId id="267" r:id="rId20"/>
   </p:sldIdLst>
   <p:sldSz cx="12192000" cy="6858000"/>
   <p:notesSz cx="6858000" cy="9144000"/>
@@ -3249,14 +3252,14 @@
         <a:lstStyle/>
         <a:p>
           <a:r>
-            <a:rPr lang="es-ES_tradnl" b="1"/>
+            <a:rPr lang="es-ES_tradnl" b="1" dirty="0"/>
             <a:t>Resistencia a colisiones: </a:t>
           </a:r>
           <a:r>
-            <a:rPr lang="es-ES_tradnl"/>
+            <a:rPr lang="es-ES_tradnl" dirty="0"/>
             <a:t>Dado distintas entradas es difícil que den la misma salida.</a:t>
           </a:r>
-          <a:endParaRPr lang="en-US"/>
+          <a:endParaRPr lang="en-US" dirty="0"/>
         </a:p>
       </dgm:t>
     </dgm:pt>
@@ -4478,14 +4481,14 @@
             <a:buNone/>
           </a:pPr>
           <a:r>
-            <a:rPr lang="es-ES_tradnl" sz="1800" b="1" kern="1200"/>
+            <a:rPr lang="es-ES_tradnl" sz="1800" b="1" kern="1200" dirty="0"/>
             <a:t>Resistencia a colisiones: </a:t>
           </a:r>
           <a:r>
-            <a:rPr lang="es-ES_tradnl" sz="1800" kern="1200"/>
+            <a:rPr lang="es-ES_tradnl" sz="1800" kern="1200" dirty="0"/>
             <a:t>Dado distintas entradas es difícil que den la misma salida.</a:t>
           </a:r>
-          <a:endParaRPr lang="en-US" sz="1800" kern="1200"/>
+          <a:endParaRPr lang="en-US" sz="1800" kern="1200" dirty="0"/>
         </a:p>
       </dsp:txBody>
       <dsp:txXfrm>
@@ -12248,7 +12251,7 @@
           <a:p>
             <a:fld id="{1DB5870F-1F25-424B-B2DF-2DF78B039362}" type="slidenum">
               <a:rPr lang="es-ES_tradnl" smtClean="0"/>
-              <a:t>13</a:t>
+              <a:t>16</a:t>
             </a:fld>
             <a:endParaRPr lang="es-ES_tradnl"/>
           </a:p>
@@ -15621,7 +15624,7 @@
                   <a:srgbClr val="FFFFFF"/>
                 </a:solidFill>
               </a:rPr>
-              <a:t>Funciones hash de forma eficiente</a:t>
+              <a:t>Funciones hash y MAC basadas en AES</a:t>
             </a:r>
           </a:p>
         </p:txBody>
@@ -15656,7 +15659,7 @@
           <a:p>
             <a:pPr algn="l"/>
             <a:r>
-              <a:rPr lang="es-ES_tradnl" sz="2000">
+              <a:rPr lang="es-ES_tradnl" sz="2000" dirty="0">
                 <a:solidFill>
                   <a:srgbClr val="FFFFFF"/>
                 </a:solidFill>
@@ -16727,6 +16730,851 @@
           <a:chExt cx="0" cy="0"/>
         </a:xfrm>
       </p:grpSpPr>
+      <p:sp>
+        <p:nvSpPr>
+          <p:cNvPr id="10" name="Rectangle 9">
+            <a:extLst>
+              <a:ext uri="{FF2B5EF4-FFF2-40B4-BE49-F238E27FC236}">
+                <a16:creationId xmlns:a16="http://schemas.microsoft.com/office/drawing/2014/main" id="{A4AC5506-6312-4701-8D3C-40187889A947}"/>
+              </a:ext>
+              <a:ext uri="{C183D7F6-B498-43B3-948B-1728B52AA6E4}">
+                <adec:decorative xmlns:adec="http://schemas.microsoft.com/office/drawing/2017/decorative" val="1"/>
+              </a:ext>
+            </a:extLst>
+          </p:cNvPr>
+          <p:cNvSpPr>
+            <a:spLocks noGrp="1" noRot="1" noChangeAspect="1" noMove="1" noResize="1" noEditPoints="1" noAdjustHandles="1" noChangeArrowheads="1" noChangeShapeType="1" noTextEdit="1"/>
+          </p:cNvSpPr>
+          <p:nvPr>
+            <p:extLst>
+              <p:ext uri="{386F3935-93C4-4BCD-93E2-E3B085C9AB24}">
+                <p16:designElem xmlns:p16="http://schemas.microsoft.com/office/powerpoint/2015/main" val="1"/>
+              </p:ext>
+            </p:extLst>
+          </p:nvPr>
+        </p:nvSpPr>
+        <p:spPr>
+          <a:xfrm>
+            <a:off x="0" y="651752"/>
+            <a:ext cx="12192000" cy="736551"/>
+          </a:xfrm>
+          <a:prstGeom prst="rect">
+            <a:avLst/>
+          </a:prstGeom>
+          <a:solidFill>
+            <a:schemeClr val="tx1"/>
+          </a:solidFill>
+          <a:ln>
+            <a:noFill/>
+          </a:ln>
+        </p:spPr>
+        <p:style>
+          <a:lnRef idx="2">
+            <a:schemeClr val="accent1">
+              <a:shade val="50000"/>
+            </a:schemeClr>
+          </a:lnRef>
+          <a:fillRef idx="1">
+            <a:schemeClr val="accent1"/>
+          </a:fillRef>
+          <a:effectRef idx="0">
+            <a:schemeClr val="accent1"/>
+          </a:effectRef>
+          <a:fontRef idx="minor">
+            <a:schemeClr val="lt1"/>
+          </a:fontRef>
+        </p:style>
+        <p:txBody>
+          <a:bodyPr rtlCol="0" anchor="ctr"/>
+          <a:lstStyle/>
+          <a:p>
+            <a:pPr algn="ctr"/>
+            <a:endParaRPr lang="en-US"/>
+          </a:p>
+        </p:txBody>
+      </p:sp>
+      <p:sp>
+        <p:nvSpPr>
+          <p:cNvPr id="2" name="Título 1">
+            <a:extLst>
+              <a:ext uri="{FF2B5EF4-FFF2-40B4-BE49-F238E27FC236}">
+                <a16:creationId xmlns:a16="http://schemas.microsoft.com/office/drawing/2014/main" id="{C4C69ED3-5933-948E-91A4-2D31BCC70281}"/>
+              </a:ext>
+            </a:extLst>
+          </p:cNvPr>
+          <p:cNvSpPr>
+            <a:spLocks noGrp="1"/>
+          </p:cNvSpPr>
+          <p:nvPr>
+            <p:ph type="title"/>
+          </p:nvPr>
+        </p:nvSpPr>
+        <p:spPr>
+          <a:xfrm>
+            <a:off x="556532" y="643467"/>
+            <a:ext cx="11210925" cy="744836"/>
+          </a:xfrm>
+        </p:spPr>
+        <p:txBody>
+          <a:bodyPr vert="horz" lIns="91440" tIns="45720" rIns="91440" bIns="45720" rtlCol="0" anchor="ctr">
+            <a:normAutofit/>
+          </a:bodyPr>
+          <a:lstStyle/>
+          <a:p>
+            <a:pPr algn="ctr"/>
+            <a:r>
+              <a:rPr lang="en-US" sz="3200" kern="1200" dirty="0" err="1">
+                <a:solidFill>
+                  <a:schemeClr val="bg1"/>
+                </a:solidFill>
+                <a:latin typeface="+mj-lt"/>
+                <a:ea typeface="+mj-ea"/>
+                <a:cs typeface="+mj-cs"/>
+              </a:rPr>
+              <a:t>EliMAC</a:t>
+            </a:r>
+            <a:endParaRPr lang="en-US" sz="3200" kern="1200" dirty="0">
+              <a:solidFill>
+                <a:schemeClr val="bg1"/>
+              </a:solidFill>
+              <a:latin typeface="+mj-lt"/>
+              <a:ea typeface="+mj-ea"/>
+              <a:cs typeface="+mj-cs"/>
+            </a:endParaRPr>
+          </a:p>
+        </p:txBody>
+      </p:sp>
+      <p:pic>
+        <p:nvPicPr>
+          <p:cNvPr id="5" name="Marcador de contenido 4" descr="Interfaz de usuario gráfica, Aplicación&#10;&#10;El contenido generado por IA puede ser incorrecto.">
+            <a:extLst>
+              <a:ext uri="{FF2B5EF4-FFF2-40B4-BE49-F238E27FC236}">
+                <a16:creationId xmlns:a16="http://schemas.microsoft.com/office/drawing/2014/main" id="{BFFE29EA-D46F-2D05-263E-B7A9165EF25B}"/>
+              </a:ext>
+            </a:extLst>
+          </p:cNvPr>
+          <p:cNvPicPr>
+            <a:picLocks noGrp="1" noChangeAspect="1"/>
+          </p:cNvPicPr>
+          <p:nvPr>
+            <p:ph idx="1"/>
+          </p:nvPr>
+        </p:nvPicPr>
+        <p:blipFill>
+          <a:blip r:embed="rId2"/>
+          <a:stretch>
+            <a:fillRect/>
+          </a:stretch>
+        </p:blipFill>
+        <p:spPr>
+          <a:xfrm>
+            <a:off x="2172607" y="1675227"/>
+            <a:ext cx="7846785" cy="4394199"/>
+          </a:xfrm>
+          <a:prstGeom prst="rect">
+            <a:avLst/>
+          </a:prstGeom>
+        </p:spPr>
+      </p:pic>
+    </p:spTree>
+    <p:extLst>
+      <p:ext uri="{BB962C8B-B14F-4D97-AF65-F5344CB8AC3E}">
+        <p14:creationId xmlns:p14="http://schemas.microsoft.com/office/powerpoint/2010/main" val="4140415906"/>
+      </p:ext>
+    </p:extLst>
+  </p:cSld>
+  <p:clrMapOvr>
+    <a:masterClrMapping/>
+  </p:clrMapOvr>
+</p:sld>
+</file>
+
+<file path=ppt/slides/slide11.xml><?xml version="1.0" encoding="utf-8"?>
+<p:sld xmlns:a="http://schemas.openxmlformats.org/drawingml/2006/main" xmlns:r="http://schemas.openxmlformats.org/officeDocument/2006/relationships" xmlns:p="http://schemas.openxmlformats.org/presentationml/2006/main">
+  <p:cSld>
+    <p:bg>
+      <p:bgPr>
+        <a:solidFill>
+          <a:schemeClr val="bg1"/>
+        </a:solidFill>
+        <a:effectLst/>
+      </p:bgPr>
+    </p:bg>
+    <p:spTree>
+      <p:nvGrpSpPr>
+        <p:cNvPr id="1" name="">
+          <a:extLst>
+            <a:ext uri="{FF2B5EF4-FFF2-40B4-BE49-F238E27FC236}">
+              <a16:creationId xmlns:a16="http://schemas.microsoft.com/office/drawing/2014/main" id="{33396511-A091-F06A-3022-266DED0ED841}"/>
+            </a:ext>
+          </a:extLst>
+        </p:cNvPr>
+        <p:cNvGrpSpPr/>
+        <p:nvPr/>
+      </p:nvGrpSpPr>
+      <p:grpSpPr>
+        <a:xfrm>
+          <a:off x="0" y="0"/>
+          <a:ext cx="0" cy="0"/>
+          <a:chOff x="0" y="0"/>
+          <a:chExt cx="0" cy="0"/>
+        </a:xfrm>
+      </p:grpSpPr>
+      <p:sp useBgFill="1">
+        <p:nvSpPr>
+          <p:cNvPr id="9" name="Rectangle 8">
+            <a:extLst>
+              <a:ext uri="{FF2B5EF4-FFF2-40B4-BE49-F238E27FC236}">
+                <a16:creationId xmlns:a16="http://schemas.microsoft.com/office/drawing/2014/main" id="{BACC6370-2D7E-4714-9D71-7542949D7D5D}"/>
+              </a:ext>
+              <a:ext uri="{C183D7F6-B498-43B3-948B-1728B52AA6E4}">
+                <adec:decorative xmlns:adec="http://schemas.microsoft.com/office/drawing/2017/decorative" val="1"/>
+              </a:ext>
+            </a:extLst>
+          </p:cNvPr>
+          <p:cNvSpPr>
+            <a:spLocks noGrp="1" noRot="1" noChangeAspect="1" noMove="1" noResize="1" noEditPoints="1" noAdjustHandles="1" noChangeArrowheads="1" noChangeShapeType="1" noTextEdit="1"/>
+          </p:cNvSpPr>
+          <p:nvPr>
+            <p:extLst>
+              <p:ext uri="{386F3935-93C4-4BCD-93E2-E3B085C9AB24}">
+                <p16:designElem xmlns:p16="http://schemas.microsoft.com/office/powerpoint/2015/main" val="1"/>
+              </p:ext>
+            </p:extLst>
+          </p:nvPr>
+        </p:nvSpPr>
+        <p:spPr>
+          <a:xfrm>
+            <a:off x="0" y="0"/>
+            <a:ext cx="12192000" cy="6858000"/>
+          </a:xfrm>
+          <a:prstGeom prst="rect">
+            <a:avLst/>
+          </a:prstGeom>
+          <a:ln w="12700" cap="flat" cmpd="sng" algn="ctr">
+            <a:noFill/>
+            <a:prstDash val="solid"/>
+            <a:miter lim="800000"/>
+          </a:ln>
+          <a:effectLst/>
+          <a:extLst>
+            <a:ext uri="{91240B29-F687-4F45-9708-019B960494DF}">
+              <a14:hiddenLine xmlns:a14="http://schemas.microsoft.com/office/drawing/2010/main" w="12700" cap="flat" cmpd="sng" algn="ctr">
+                <a:solidFill>
+                  <a:schemeClr val="accent1">
+                    <a:shade val="50000"/>
+                  </a:schemeClr>
+                </a:solidFill>
+                <a:prstDash val="solid"/>
+                <a:miter lim="800000"/>
+              </a14:hiddenLine>
+            </a:ext>
+          </a:extLst>
+        </p:spPr>
+        <p:style>
+          <a:lnRef idx="2">
+            <a:schemeClr val="accent1">
+              <a:shade val="50000"/>
+            </a:schemeClr>
+          </a:lnRef>
+          <a:fillRef idx="1">
+            <a:schemeClr val="accent1"/>
+          </a:fillRef>
+          <a:effectRef idx="0">
+            <a:schemeClr val="accent1"/>
+          </a:effectRef>
+          <a:fontRef idx="minor">
+            <a:schemeClr val="lt1"/>
+          </a:fontRef>
+        </p:style>
+        <p:txBody>
+          <a:bodyPr rtlCol="0" anchor="ctr"/>
+          <a:lstStyle/>
+          <a:p>
+            <a:pPr algn="ctr"/>
+            <a:endParaRPr lang="en-US"/>
+          </a:p>
+        </p:txBody>
+      </p:sp>
+      <p:sp>
+        <p:nvSpPr>
+          <p:cNvPr id="11" name="Rectangle 10">
+            <a:extLst>
+              <a:ext uri="{FF2B5EF4-FFF2-40B4-BE49-F238E27FC236}">
+                <a16:creationId xmlns:a16="http://schemas.microsoft.com/office/drawing/2014/main" id="{256B2C21-A230-48C0-8DF1-C46611373C44}"/>
+              </a:ext>
+              <a:ext uri="{C183D7F6-B498-43B3-948B-1728B52AA6E4}">
+                <adec:decorative xmlns:adec="http://schemas.microsoft.com/office/drawing/2017/decorative" val="1"/>
+              </a:ext>
+            </a:extLst>
+          </p:cNvPr>
+          <p:cNvSpPr>
+            <a:spLocks noGrp="1" noRot="1" noChangeAspect="1" noMove="1" noResize="1" noEditPoints="1" noAdjustHandles="1" noChangeArrowheads="1" noChangeShapeType="1" noTextEdit="1"/>
+          </p:cNvSpPr>
+          <p:nvPr>
+            <p:extLst>
+              <p:ext uri="{386F3935-93C4-4BCD-93E2-E3B085C9AB24}">
+                <p16:designElem xmlns:p16="http://schemas.microsoft.com/office/powerpoint/2015/main" val="1"/>
+              </p:ext>
+            </p:extLst>
+          </p:nvPr>
+        </p:nvSpPr>
+        <p:spPr>
+          <a:xfrm rot="5400000" flipH="1">
+            <a:off x="-1410084" y="1410082"/>
+            <a:ext cx="6858000" cy="4037836"/>
+          </a:xfrm>
+          <a:prstGeom prst="rect">
+            <a:avLst/>
+          </a:prstGeom>
+          <a:gradFill>
+            <a:gsLst>
+              <a:gs pos="8000">
+                <a:srgbClr val="000000"/>
+              </a:gs>
+              <a:gs pos="100000">
+                <a:schemeClr val="accent1">
+                  <a:lumMod val="75000"/>
+                </a:schemeClr>
+              </a:gs>
+            </a:gsLst>
+            <a:lin ang="3000000" scaled="0"/>
+          </a:gradFill>
+          <a:ln>
+            <a:noFill/>
+          </a:ln>
+        </p:spPr>
+        <p:style>
+          <a:lnRef idx="2">
+            <a:schemeClr val="accent1">
+              <a:shade val="50000"/>
+            </a:schemeClr>
+          </a:lnRef>
+          <a:fillRef idx="1">
+            <a:schemeClr val="accent1"/>
+          </a:fillRef>
+          <a:effectRef idx="0">
+            <a:schemeClr val="accent1"/>
+          </a:effectRef>
+          <a:fontRef idx="minor">
+            <a:schemeClr val="lt1"/>
+          </a:fontRef>
+        </p:style>
+        <p:txBody>
+          <a:bodyPr rtlCol="0" anchor="ctr"/>
+          <a:lstStyle/>
+          <a:p>
+            <a:pPr algn="ctr"/>
+            <a:endParaRPr lang="en-US"/>
+          </a:p>
+        </p:txBody>
+      </p:sp>
+      <p:sp>
+        <p:nvSpPr>
+          <p:cNvPr id="13" name="Rectangle 12">
+            <a:extLst>
+              <a:ext uri="{FF2B5EF4-FFF2-40B4-BE49-F238E27FC236}">
+                <a16:creationId xmlns:a16="http://schemas.microsoft.com/office/drawing/2014/main" id="{3847E18C-932D-4C95-AABA-FEC7C9499AD7}"/>
+              </a:ext>
+              <a:ext uri="{C183D7F6-B498-43B3-948B-1728B52AA6E4}">
+                <adec:decorative xmlns:adec="http://schemas.microsoft.com/office/drawing/2017/decorative" val="1"/>
+              </a:ext>
+            </a:extLst>
+          </p:cNvPr>
+          <p:cNvSpPr>
+            <a:spLocks noGrp="1" noRot="1" noChangeAspect="1" noMove="1" noResize="1" noEditPoints="1" noAdjustHandles="1" noChangeArrowheads="1" noChangeShapeType="1" noTextEdit="1"/>
+          </p:cNvSpPr>
+          <p:nvPr>
+            <p:extLst>
+              <p:ext uri="{386F3935-93C4-4BCD-93E2-E3B085C9AB24}">
+                <p16:designElem xmlns:p16="http://schemas.microsoft.com/office/powerpoint/2015/main" val="1"/>
+              </p:ext>
+            </p:extLst>
+          </p:nvPr>
+        </p:nvSpPr>
+        <p:spPr>
+          <a:xfrm rot="5400000" flipH="1">
+            <a:off x="-1410085" y="1420219"/>
+            <a:ext cx="6857999" cy="4037839"/>
+          </a:xfrm>
+          <a:prstGeom prst="rect">
+            <a:avLst/>
+          </a:prstGeom>
+          <a:gradFill>
+            <a:gsLst>
+              <a:gs pos="0">
+                <a:srgbClr val="000000">
+                  <a:alpha val="0"/>
+                </a:srgbClr>
+              </a:gs>
+              <a:gs pos="99000">
+                <a:schemeClr val="accent1">
+                  <a:alpha val="46000"/>
+                </a:schemeClr>
+              </a:gs>
+            </a:gsLst>
+            <a:lin ang="1800000" scaled="0"/>
+          </a:gradFill>
+          <a:ln>
+            <a:noFill/>
+          </a:ln>
+        </p:spPr>
+        <p:style>
+          <a:lnRef idx="2">
+            <a:schemeClr val="accent1">
+              <a:shade val="50000"/>
+            </a:schemeClr>
+          </a:lnRef>
+          <a:fillRef idx="1">
+            <a:schemeClr val="accent1"/>
+          </a:fillRef>
+          <a:effectRef idx="0">
+            <a:schemeClr val="accent1"/>
+          </a:effectRef>
+          <a:fontRef idx="minor">
+            <a:schemeClr val="lt1"/>
+          </a:fontRef>
+        </p:style>
+        <p:txBody>
+          <a:bodyPr rtlCol="0" anchor="ctr"/>
+          <a:lstStyle/>
+          <a:p>
+            <a:pPr algn="ctr"/>
+            <a:endParaRPr lang="en-US"/>
+          </a:p>
+        </p:txBody>
+      </p:sp>
+      <p:sp>
+        <p:nvSpPr>
+          <p:cNvPr id="15" name="Rectangle 14">
+            <a:extLst>
+              <a:ext uri="{FF2B5EF4-FFF2-40B4-BE49-F238E27FC236}">
+                <a16:creationId xmlns:a16="http://schemas.microsoft.com/office/drawing/2014/main" id="{3150CB11-0C61-439E-910F-5787759E72A0}"/>
+              </a:ext>
+              <a:ext uri="{C183D7F6-B498-43B3-948B-1728B52AA6E4}">
+                <adec:decorative xmlns:adec="http://schemas.microsoft.com/office/drawing/2017/decorative" val="1"/>
+              </a:ext>
+            </a:extLst>
+          </p:cNvPr>
+          <p:cNvSpPr>
+            <a:spLocks noGrp="1" noRot="1" noChangeAspect="1" noMove="1" noResize="1" noEditPoints="1" noAdjustHandles="1" noChangeArrowheads="1" noChangeShapeType="1" noTextEdit="1"/>
+          </p:cNvSpPr>
+          <p:nvPr>
+            <p:extLst>
+              <p:ext uri="{386F3935-93C4-4BCD-93E2-E3B085C9AB24}">
+                <p16:designElem xmlns:p16="http://schemas.microsoft.com/office/powerpoint/2015/main" val="1"/>
+              </p:ext>
+            </p:extLst>
+          </p:nvPr>
+        </p:nvSpPr>
+        <p:spPr>
+          <a:xfrm rot="5400000" flipH="1">
+            <a:off x="767923" y="3588085"/>
+            <a:ext cx="2501979" cy="4037841"/>
+          </a:xfrm>
+          <a:prstGeom prst="rect">
+            <a:avLst/>
+          </a:prstGeom>
+          <a:gradFill>
+            <a:gsLst>
+              <a:gs pos="2000">
+                <a:schemeClr val="accent1">
+                  <a:alpha val="29000"/>
+                </a:schemeClr>
+              </a:gs>
+              <a:gs pos="100000">
+                <a:srgbClr val="000000">
+                  <a:alpha val="30000"/>
+                </a:srgbClr>
+              </a:gs>
+            </a:gsLst>
+            <a:lin ang="7800000" scaled="0"/>
+          </a:gradFill>
+          <a:ln>
+            <a:noFill/>
+          </a:ln>
+        </p:spPr>
+        <p:style>
+          <a:lnRef idx="2">
+            <a:schemeClr val="accent1">
+              <a:shade val="50000"/>
+            </a:schemeClr>
+          </a:lnRef>
+          <a:fillRef idx="1">
+            <a:schemeClr val="accent1"/>
+          </a:fillRef>
+          <a:effectRef idx="0">
+            <a:schemeClr val="accent1"/>
+          </a:effectRef>
+          <a:fontRef idx="minor">
+            <a:schemeClr val="lt1"/>
+          </a:fontRef>
+        </p:style>
+        <p:txBody>
+          <a:bodyPr rtlCol="0" anchor="ctr"/>
+          <a:lstStyle/>
+          <a:p>
+            <a:pPr algn="ctr"/>
+            <a:endParaRPr lang="en-US" dirty="0"/>
+          </a:p>
+        </p:txBody>
+      </p:sp>
+      <p:sp>
+        <p:nvSpPr>
+          <p:cNvPr id="17" name="Freeform: Shape 16">
+            <a:extLst>
+              <a:ext uri="{FF2B5EF4-FFF2-40B4-BE49-F238E27FC236}">
+                <a16:creationId xmlns:a16="http://schemas.microsoft.com/office/drawing/2014/main" id="{43F8A58B-5155-44CE-A5FF-7647B47D0A7A}"/>
+              </a:ext>
+              <a:ext uri="{C183D7F6-B498-43B3-948B-1728B52AA6E4}">
+                <adec:decorative xmlns:adec="http://schemas.microsoft.com/office/drawing/2017/decorative" val="1"/>
+              </a:ext>
+            </a:extLst>
+          </p:cNvPr>
+          <p:cNvSpPr>
+            <a:spLocks noGrp="1" noRot="1" noChangeAspect="1" noMove="1" noResize="1" noEditPoints="1" noAdjustHandles="1" noChangeArrowheads="1" noChangeShapeType="1" noTextEdit="1"/>
+          </p:cNvSpPr>
+          <p:nvPr>
+            <p:extLst>
+              <p:ext uri="{386F3935-93C4-4BCD-93E2-E3B085C9AB24}">
+                <p16:designElem xmlns:p16="http://schemas.microsoft.com/office/powerpoint/2015/main" val="1"/>
+              </p:ext>
+            </p:extLst>
+          </p:nvPr>
+        </p:nvSpPr>
+        <p:spPr>
+          <a:xfrm rot="20635413">
+            <a:off x="-501737" y="969718"/>
+            <a:ext cx="3900357" cy="4178958"/>
+          </a:xfrm>
+          <a:custGeom>
+            <a:avLst/>
+            <a:gdLst>
+              <a:gd name="connsiteX0" fmla="*/ 2432225 w 3900357"/>
+              <a:gd name="connsiteY0" fmla="*/ 93939 h 4178958"/>
+              <a:gd name="connsiteX1" fmla="*/ 3900357 w 3900357"/>
+              <a:gd name="connsiteY1" fmla="*/ 2089479 h 4178958"/>
+              <a:gd name="connsiteX2" fmla="*/ 1810878 w 3900357"/>
+              <a:gd name="connsiteY2" fmla="*/ 4178958 h 4178958"/>
+              <a:gd name="connsiteX3" fmla="*/ 78249 w 3900357"/>
+              <a:gd name="connsiteY3" fmla="*/ 3257727 h 4178958"/>
+              <a:gd name="connsiteX4" fmla="*/ 0 w 3900357"/>
+              <a:gd name="connsiteY4" fmla="*/ 3128923 h 4178958"/>
+              <a:gd name="connsiteX5" fmla="*/ 831324 w 3900357"/>
+              <a:gd name="connsiteY5" fmla="*/ 244281 h 4178958"/>
+              <a:gd name="connsiteX6" fmla="*/ 997559 w 3900357"/>
+              <a:gd name="connsiteY6" fmla="*/ 164202 h 4178958"/>
+              <a:gd name="connsiteX7" fmla="*/ 1810878 w 3900357"/>
+              <a:gd name="connsiteY7" fmla="*/ 0 h 4178958"/>
+              <a:gd name="connsiteX8" fmla="*/ 2432225 w 3900357"/>
+              <a:gd name="connsiteY8" fmla="*/ 93939 h 4178958"/>
+            </a:gdLst>
+            <a:ahLst/>
+            <a:cxnLst>
+              <a:cxn ang="0">
+                <a:pos x="connsiteX0" y="connsiteY0"/>
+              </a:cxn>
+              <a:cxn ang="0">
+                <a:pos x="connsiteX1" y="connsiteY1"/>
+              </a:cxn>
+              <a:cxn ang="0">
+                <a:pos x="connsiteX2" y="connsiteY2"/>
+              </a:cxn>
+              <a:cxn ang="0">
+                <a:pos x="connsiteX3" y="connsiteY3"/>
+              </a:cxn>
+              <a:cxn ang="0">
+                <a:pos x="connsiteX4" y="connsiteY4"/>
+              </a:cxn>
+              <a:cxn ang="0">
+                <a:pos x="connsiteX5" y="connsiteY5"/>
+              </a:cxn>
+              <a:cxn ang="0">
+                <a:pos x="connsiteX6" y="connsiteY6"/>
+              </a:cxn>
+              <a:cxn ang="0">
+                <a:pos x="connsiteX7" y="connsiteY7"/>
+              </a:cxn>
+              <a:cxn ang="0">
+                <a:pos x="connsiteX8" y="connsiteY8"/>
+              </a:cxn>
+            </a:cxnLst>
+            <a:rect l="l" t="t" r="r" b="b"/>
+            <a:pathLst>
+              <a:path w="3900357" h="4178958">
+                <a:moveTo>
+                  <a:pt x="2432225" y="93939"/>
+                </a:moveTo>
+                <a:cubicBezTo>
+                  <a:pt x="3282786" y="358491"/>
+                  <a:pt x="3900357" y="1151865"/>
+                  <a:pt x="3900357" y="2089479"/>
+                </a:cubicBezTo>
+                <a:cubicBezTo>
+                  <a:pt x="3900357" y="3243466"/>
+                  <a:pt x="2964865" y="4178958"/>
+                  <a:pt x="1810878" y="4178958"/>
+                </a:cubicBezTo>
+                <a:cubicBezTo>
+                  <a:pt x="1089636" y="4178958"/>
+                  <a:pt x="453744" y="3813531"/>
+                  <a:pt x="78249" y="3257727"/>
+                </a:cubicBezTo>
+                <a:lnTo>
+                  <a:pt x="0" y="3128923"/>
+                </a:lnTo>
+                <a:lnTo>
+                  <a:pt x="831324" y="244281"/>
+                </a:lnTo>
+                <a:lnTo>
+                  <a:pt x="997559" y="164202"/>
+                </a:lnTo>
+                <a:cubicBezTo>
+                  <a:pt x="1247540" y="58468"/>
+                  <a:pt x="1522381" y="0"/>
+                  <a:pt x="1810878" y="0"/>
+                </a:cubicBezTo>
+                <a:cubicBezTo>
+                  <a:pt x="2027251" y="0"/>
+                  <a:pt x="2235942" y="32888"/>
+                  <a:pt x="2432225" y="93939"/>
+                </a:cubicBezTo>
+                <a:close/>
+              </a:path>
+            </a:pathLst>
+          </a:custGeom>
+          <a:gradFill>
+            <a:gsLst>
+              <a:gs pos="29000">
+                <a:srgbClr val="000000">
+                  <a:alpha val="0"/>
+                </a:srgbClr>
+              </a:gs>
+              <a:gs pos="100000">
+                <a:schemeClr val="accent1">
+                  <a:alpha val="43000"/>
+                </a:schemeClr>
+              </a:gs>
+            </a:gsLst>
+            <a:lin ang="1800000" scaled="0"/>
+          </a:gradFill>
+          <a:ln>
+            <a:noFill/>
+          </a:ln>
+        </p:spPr>
+        <p:style>
+          <a:lnRef idx="2">
+            <a:schemeClr val="accent1">
+              <a:shade val="50000"/>
+            </a:schemeClr>
+          </a:lnRef>
+          <a:fillRef idx="1">
+            <a:schemeClr val="accent1"/>
+          </a:fillRef>
+          <a:effectRef idx="0">
+            <a:schemeClr val="accent1"/>
+          </a:effectRef>
+          <a:fontRef idx="minor">
+            <a:schemeClr val="lt1"/>
+          </a:fontRef>
+        </p:style>
+        <p:txBody>
+          <a:bodyPr wrap="square" rtlCol="0" anchor="ctr">
+            <a:noAutofit/>
+          </a:bodyPr>
+          <a:lstStyle/>
+          <a:p>
+            <a:pPr algn="ctr"/>
+            <a:endParaRPr lang="en-US" dirty="0"/>
+          </a:p>
+        </p:txBody>
+      </p:sp>
+      <p:sp>
+        <p:nvSpPr>
+          <p:cNvPr id="19" name="Rectangle 18">
+            <a:extLst>
+              <a:ext uri="{FF2B5EF4-FFF2-40B4-BE49-F238E27FC236}">
+                <a16:creationId xmlns:a16="http://schemas.microsoft.com/office/drawing/2014/main" id="{443F2ACA-E6D6-4028-82DD-F03C262D5DE6}"/>
+              </a:ext>
+              <a:ext uri="{C183D7F6-B498-43B3-948B-1728B52AA6E4}">
+                <adec:decorative xmlns:adec="http://schemas.microsoft.com/office/drawing/2017/decorative" val="1"/>
+              </a:ext>
+            </a:extLst>
+          </p:cNvPr>
+          <p:cNvSpPr>
+            <a:spLocks noGrp="1" noRot="1" noChangeAspect="1" noMove="1" noResize="1" noEditPoints="1" noAdjustHandles="1" noChangeArrowheads="1" noChangeShapeType="1" noTextEdit="1"/>
+          </p:cNvSpPr>
+          <p:nvPr>
+            <p:extLst>
+              <p:ext uri="{386F3935-93C4-4BCD-93E2-E3B085C9AB24}">
+                <p16:designElem xmlns:p16="http://schemas.microsoft.com/office/powerpoint/2015/main" val="1"/>
+              </p:ext>
+            </p:extLst>
+          </p:nvPr>
+        </p:nvSpPr>
+        <p:spPr>
+          <a:xfrm rot="5400000" flipH="1">
+            <a:off x="-1410095" y="1410079"/>
+            <a:ext cx="6858003" cy="4037835"/>
+          </a:xfrm>
+          <a:prstGeom prst="rect">
+            <a:avLst/>
+          </a:prstGeom>
+          <a:gradFill>
+            <a:gsLst>
+              <a:gs pos="0">
+                <a:srgbClr val="000000">
+                  <a:alpha val="0"/>
+                </a:srgbClr>
+              </a:gs>
+              <a:gs pos="99000">
+                <a:schemeClr val="accent1">
+                  <a:lumMod val="60000"/>
+                  <a:lumOff val="40000"/>
+                  <a:alpha val="11000"/>
+                </a:schemeClr>
+              </a:gs>
+            </a:gsLst>
+            <a:lin ang="7200000" scaled="0"/>
+          </a:gradFill>
+          <a:ln>
+            <a:noFill/>
+          </a:ln>
+        </p:spPr>
+        <p:style>
+          <a:lnRef idx="2">
+            <a:schemeClr val="accent1">
+              <a:shade val="50000"/>
+            </a:schemeClr>
+          </a:lnRef>
+          <a:fillRef idx="1">
+            <a:schemeClr val="accent1"/>
+          </a:fillRef>
+          <a:effectRef idx="0">
+            <a:schemeClr val="accent1"/>
+          </a:effectRef>
+          <a:fontRef idx="minor">
+            <a:schemeClr val="lt1"/>
+          </a:fontRef>
+        </p:style>
+        <p:txBody>
+          <a:bodyPr rtlCol="0" anchor="ctr"/>
+          <a:lstStyle/>
+          <a:p>
+            <a:pPr algn="ctr"/>
+            <a:endParaRPr lang="en-US"/>
+          </a:p>
+        </p:txBody>
+      </p:sp>
+      <p:sp>
+        <p:nvSpPr>
+          <p:cNvPr id="2" name="Título 1">
+            <a:extLst>
+              <a:ext uri="{FF2B5EF4-FFF2-40B4-BE49-F238E27FC236}">
+                <a16:creationId xmlns:a16="http://schemas.microsoft.com/office/drawing/2014/main" id="{A5F6FF07-52C2-D06E-9BBD-9BAFC149E81D}"/>
+              </a:ext>
+            </a:extLst>
+          </p:cNvPr>
+          <p:cNvSpPr>
+            <a:spLocks noGrp="1"/>
+          </p:cNvSpPr>
+          <p:nvPr>
+            <p:ph type="title"/>
+          </p:nvPr>
+        </p:nvSpPr>
+        <p:spPr>
+          <a:xfrm>
+            <a:off x="586478" y="1683756"/>
+            <a:ext cx="3115265" cy="2396359"/>
+          </a:xfrm>
+        </p:spPr>
+        <p:txBody>
+          <a:bodyPr anchor="b">
+            <a:normAutofit/>
+          </a:bodyPr>
+          <a:lstStyle/>
+          <a:p>
+            <a:pPr algn="r"/>
+            <a:r>
+              <a:rPr lang="es-ES_tradnl" sz="4000">
+                <a:solidFill>
+                  <a:srgbClr val="FFFFFF"/>
+                </a:solidFill>
+              </a:rPr>
+              <a:t>EliMAC</a:t>
+            </a:r>
+          </a:p>
+        </p:txBody>
+      </p:sp>
+      <p:graphicFrame>
+        <p:nvGraphicFramePr>
+          <p:cNvPr id="5" name="Marcador de contenido 2">
+            <a:extLst>
+              <a:ext uri="{FF2B5EF4-FFF2-40B4-BE49-F238E27FC236}">
+                <a16:creationId xmlns:a16="http://schemas.microsoft.com/office/drawing/2014/main" id="{449AD929-EC7F-20D9-88E6-853118D0130D}"/>
+              </a:ext>
+            </a:extLst>
+          </p:cNvPr>
+          <p:cNvGraphicFramePr>
+            <a:graphicFrameLocks noGrp="1"/>
+          </p:cNvGraphicFramePr>
+          <p:nvPr>
+            <p:ph idx="1"/>
+            <p:extLst>
+              <p:ext uri="{D42A27DB-BD31-4B8C-83A1-F6EECF244321}">
+                <p14:modId xmlns:p14="http://schemas.microsoft.com/office/powerpoint/2010/main" val="1991769079"/>
+              </p:ext>
+            </p:extLst>
+          </p:nvPr>
+        </p:nvGraphicFramePr>
+        <p:xfrm>
+          <a:off x="4905052" y="750440"/>
+          <a:ext cx="6666833" cy="5453920"/>
+        </p:xfrm>
+        <a:graphic>
+          <a:graphicData uri="http://schemas.openxmlformats.org/drawingml/2006/diagram">
+            <dgm:relIds xmlns:dgm="http://schemas.openxmlformats.org/drawingml/2006/diagram" xmlns:r="http://schemas.openxmlformats.org/officeDocument/2006/relationships" r:dm="rId2" r:lo="rId3" r:qs="rId4" r:cs="rId5"/>
+          </a:graphicData>
+        </a:graphic>
+      </p:graphicFrame>
+    </p:spTree>
+    <p:extLst>
+      <p:ext uri="{BB962C8B-B14F-4D97-AF65-F5344CB8AC3E}">
+        <p14:creationId xmlns:p14="http://schemas.microsoft.com/office/powerpoint/2010/main" val="2451675773"/>
+      </p:ext>
+    </p:extLst>
+  </p:cSld>
+  <p:clrMapOvr>
+    <a:masterClrMapping/>
+  </p:clrMapOvr>
+</p:sld>
+</file>
+
+<file path=ppt/slides/slide12.xml><?xml version="1.0" encoding="utf-8"?>
+<p:sld xmlns:a="http://schemas.openxmlformats.org/drawingml/2006/main" xmlns:r="http://schemas.openxmlformats.org/officeDocument/2006/relationships" xmlns:p="http://schemas.openxmlformats.org/presentationml/2006/main">
+  <p:cSld>
+    <p:bg>
+      <p:bgPr>
+        <a:solidFill>
+          <a:schemeClr val="bg1"/>
+        </a:solidFill>
+        <a:effectLst/>
+      </p:bgPr>
+    </p:bg>
+    <p:spTree>
+      <p:nvGrpSpPr>
+        <p:cNvPr id="1" name=""/>
+        <p:cNvGrpSpPr/>
+        <p:nvPr/>
+      </p:nvGrpSpPr>
+      <p:grpSpPr>
+        <a:xfrm>
+          <a:off x="0" y="0"/>
+          <a:ext cx="0" cy="0"/>
+          <a:chOff x="0" y="0"/>
+          <a:chExt cx="0" cy="0"/>
+        </a:xfrm>
+      </p:grpSpPr>
       <p:sp useBgFill="1">
         <p:nvSpPr>
           <p:cNvPr id="13" name="Rectangle 12">
@@ -17293,7 +18141,7 @@
 </p:sld>
 </file>
 
-<file path=ppt/slides/slide11.xml><?xml version="1.0" encoding="utf-8"?>
+<file path=ppt/slides/slide13.xml><?xml version="1.0" encoding="utf-8"?>
 <p:sld xmlns:a="http://schemas.openxmlformats.org/drawingml/2006/main" xmlns:r="http://schemas.openxmlformats.org/officeDocument/2006/relationships" xmlns:p="http://schemas.openxmlformats.org/presentationml/2006/main">
   <p:cSld>
     <p:bg>
@@ -17878,7 +18726,7 @@
 </p:sld>
 </file>
 
-<file path=ppt/slides/slide12.xml><?xml version="1.0" encoding="utf-8"?>
+<file path=ppt/slides/slide14.xml><?xml version="1.0" encoding="utf-8"?>
 <p:sld xmlns:a="http://schemas.openxmlformats.org/drawingml/2006/main" xmlns:r="http://schemas.openxmlformats.org/officeDocument/2006/relationships" xmlns:p="http://schemas.openxmlformats.org/presentationml/2006/main">
   <p:cSld>
     <p:bg>
@@ -18539,7 +19387,576 @@
 </p:sld>
 </file>
 
-<file path=ppt/slides/slide13.xml><?xml version="1.0" encoding="utf-8"?>
+<file path=ppt/slides/slide15.xml><?xml version="1.0" encoding="utf-8"?>
+<p:sld xmlns:a="http://schemas.openxmlformats.org/drawingml/2006/main" xmlns:r="http://schemas.openxmlformats.org/officeDocument/2006/relationships" xmlns:p="http://schemas.openxmlformats.org/presentationml/2006/main">
+  <p:cSld>
+    <p:bg>
+      <p:bgPr>
+        <a:solidFill>
+          <a:schemeClr val="bg1"/>
+        </a:solidFill>
+        <a:effectLst/>
+      </p:bgPr>
+    </p:bg>
+    <p:spTree>
+      <p:nvGrpSpPr>
+        <p:cNvPr id="1" name=""/>
+        <p:cNvGrpSpPr/>
+        <p:nvPr/>
+      </p:nvGrpSpPr>
+      <p:grpSpPr>
+        <a:xfrm>
+          <a:off x="0" y="0"/>
+          <a:ext cx="0" cy="0"/>
+          <a:chOff x="0" y="0"/>
+          <a:chExt cx="0" cy="0"/>
+        </a:xfrm>
+      </p:grpSpPr>
+      <p:sp useBgFill="1">
+        <p:nvSpPr>
+          <p:cNvPr id="11" name="Rectangle 10">
+            <a:extLst>
+              <a:ext uri="{FF2B5EF4-FFF2-40B4-BE49-F238E27FC236}">
+                <a16:creationId xmlns:a16="http://schemas.microsoft.com/office/drawing/2014/main" id="{2B97F24A-32CE-4C1C-A50D-3016B394DCFB}"/>
+              </a:ext>
+              <a:ext uri="{C183D7F6-B498-43B3-948B-1728B52AA6E4}">
+                <adec:decorative xmlns:adec="http://schemas.microsoft.com/office/drawing/2017/decorative" val="1"/>
+              </a:ext>
+            </a:extLst>
+          </p:cNvPr>
+          <p:cNvSpPr>
+            <a:spLocks noGrp="1" noRot="1" noChangeAspect="1" noMove="1" noResize="1" noEditPoints="1" noAdjustHandles="1" noChangeArrowheads="1" noChangeShapeType="1" noTextEdit="1"/>
+          </p:cNvSpPr>
+          <p:nvPr>
+            <p:extLst>
+              <p:ext uri="{386F3935-93C4-4BCD-93E2-E3B085C9AB24}">
+                <p16:designElem xmlns:p16="http://schemas.microsoft.com/office/powerpoint/2015/main" val="1"/>
+              </p:ext>
+            </p:extLst>
+          </p:nvPr>
+        </p:nvSpPr>
+        <p:spPr>
+          <a:xfrm>
+            <a:off x="0" y="0"/>
+            <a:ext cx="12192000" cy="6858000"/>
+          </a:xfrm>
+          <a:prstGeom prst="rect">
+            <a:avLst/>
+          </a:prstGeom>
+          <a:ln>
+            <a:noFill/>
+          </a:ln>
+        </p:spPr>
+        <p:style>
+          <a:lnRef idx="2">
+            <a:schemeClr val="accent1">
+              <a:shade val="50000"/>
+            </a:schemeClr>
+          </a:lnRef>
+          <a:fillRef idx="1">
+            <a:schemeClr val="accent1"/>
+          </a:fillRef>
+          <a:effectRef idx="0">
+            <a:schemeClr val="accent1"/>
+          </a:effectRef>
+          <a:fontRef idx="minor">
+            <a:schemeClr val="lt1"/>
+          </a:fontRef>
+        </p:style>
+        <p:txBody>
+          <a:bodyPr rtlCol="0" anchor="ctr"/>
+          <a:lstStyle/>
+          <a:p>
+            <a:pPr algn="ctr"/>
+            <a:endParaRPr lang="en-US"/>
+          </a:p>
+        </p:txBody>
+      </p:sp>
+      <p:sp>
+        <p:nvSpPr>
+          <p:cNvPr id="2" name="Título 1">
+            <a:extLst>
+              <a:ext uri="{FF2B5EF4-FFF2-40B4-BE49-F238E27FC236}">
+                <a16:creationId xmlns:a16="http://schemas.microsoft.com/office/drawing/2014/main" id="{CBC1BAA6-2C06-5BA0-0A0D-16F0B8F0059D}"/>
+              </a:ext>
+            </a:extLst>
+          </p:cNvPr>
+          <p:cNvSpPr>
+            <a:spLocks noGrp="1"/>
+          </p:cNvSpPr>
+          <p:nvPr>
+            <p:ph type="title"/>
+          </p:nvPr>
+        </p:nvSpPr>
+        <p:spPr>
+          <a:xfrm>
+            <a:off x="630936" y="639520"/>
+            <a:ext cx="3429000" cy="1719072"/>
+          </a:xfrm>
+        </p:spPr>
+        <p:txBody>
+          <a:bodyPr vert="horz" lIns="91440" tIns="45720" rIns="91440" bIns="45720" rtlCol="0" anchor="b">
+            <a:normAutofit/>
+          </a:bodyPr>
+          <a:lstStyle/>
+          <a:p>
+            <a:r>
+              <a:rPr lang="en-US" sz="5400" kern="1200">
+                <a:solidFill>
+                  <a:schemeClr val="tx1"/>
+                </a:solidFill>
+                <a:latin typeface="+mj-lt"/>
+                <a:ea typeface="+mj-ea"/>
+                <a:cs typeface="+mj-cs"/>
+              </a:rPr>
+              <a:t>AES vectorizado</a:t>
+            </a:r>
+          </a:p>
+        </p:txBody>
+      </p:sp>
+      <p:sp>
+        <p:nvSpPr>
+          <p:cNvPr id="13" name="sketch line">
+            <a:extLst>
+              <a:ext uri="{FF2B5EF4-FFF2-40B4-BE49-F238E27FC236}">
+                <a16:creationId xmlns:a16="http://schemas.microsoft.com/office/drawing/2014/main" id="{CD8B4F24-440B-49E9-B85D-733523DC064B}"/>
+              </a:ext>
+              <a:ext uri="{C183D7F6-B498-43B3-948B-1728B52AA6E4}">
+                <adec:decorative xmlns:adec="http://schemas.microsoft.com/office/drawing/2017/decorative" val="1"/>
+              </a:ext>
+            </a:extLst>
+          </p:cNvPr>
+          <p:cNvSpPr>
+            <a:spLocks noGrp="1" noRot="1" noChangeAspect="1" noMove="1" noResize="1" noEditPoints="1" noAdjustHandles="1" noChangeArrowheads="1" noChangeShapeType="1" noTextEdit="1"/>
+          </p:cNvSpPr>
+          <p:nvPr>
+            <p:extLst>
+              <p:ext uri="{386F3935-93C4-4BCD-93E2-E3B085C9AB24}">
+                <p16:designElem xmlns:p16="http://schemas.microsoft.com/office/powerpoint/2015/main" val="1"/>
+              </p:ext>
+            </p:extLst>
+          </p:nvPr>
+        </p:nvSpPr>
+        <p:spPr>
+          <a:xfrm>
+            <a:off x="643278" y="2573756"/>
+            <a:ext cx="3255095" cy="18288"/>
+          </a:xfrm>
+          <a:custGeom>
+            <a:avLst/>
+            <a:gdLst>
+              <a:gd name="connsiteX0" fmla="*/ 0 w 3255095"/>
+              <a:gd name="connsiteY0" fmla="*/ 0 h 18288"/>
+              <a:gd name="connsiteX1" fmla="*/ 618468 w 3255095"/>
+              <a:gd name="connsiteY1" fmla="*/ 0 h 18288"/>
+              <a:gd name="connsiteX2" fmla="*/ 1269487 w 3255095"/>
+              <a:gd name="connsiteY2" fmla="*/ 0 h 18288"/>
+              <a:gd name="connsiteX3" fmla="*/ 1953057 w 3255095"/>
+              <a:gd name="connsiteY3" fmla="*/ 0 h 18288"/>
+              <a:gd name="connsiteX4" fmla="*/ 2636627 w 3255095"/>
+              <a:gd name="connsiteY4" fmla="*/ 0 h 18288"/>
+              <a:gd name="connsiteX5" fmla="*/ 3255095 w 3255095"/>
+              <a:gd name="connsiteY5" fmla="*/ 0 h 18288"/>
+              <a:gd name="connsiteX6" fmla="*/ 3255095 w 3255095"/>
+              <a:gd name="connsiteY6" fmla="*/ 18288 h 18288"/>
+              <a:gd name="connsiteX7" fmla="*/ 2538974 w 3255095"/>
+              <a:gd name="connsiteY7" fmla="*/ 18288 h 18288"/>
+              <a:gd name="connsiteX8" fmla="*/ 1822853 w 3255095"/>
+              <a:gd name="connsiteY8" fmla="*/ 18288 h 18288"/>
+              <a:gd name="connsiteX9" fmla="*/ 1171834 w 3255095"/>
+              <a:gd name="connsiteY9" fmla="*/ 18288 h 18288"/>
+              <a:gd name="connsiteX10" fmla="*/ 0 w 3255095"/>
+              <a:gd name="connsiteY10" fmla="*/ 18288 h 18288"/>
+              <a:gd name="connsiteX11" fmla="*/ 0 w 3255095"/>
+              <a:gd name="connsiteY11" fmla="*/ 0 h 18288"/>
+            </a:gdLst>
+            <a:ahLst/>
+            <a:cxnLst>
+              <a:cxn ang="0">
+                <a:pos x="connsiteX0" y="connsiteY0"/>
+              </a:cxn>
+              <a:cxn ang="0">
+                <a:pos x="connsiteX1" y="connsiteY1"/>
+              </a:cxn>
+              <a:cxn ang="0">
+                <a:pos x="connsiteX2" y="connsiteY2"/>
+              </a:cxn>
+              <a:cxn ang="0">
+                <a:pos x="connsiteX3" y="connsiteY3"/>
+              </a:cxn>
+              <a:cxn ang="0">
+                <a:pos x="connsiteX4" y="connsiteY4"/>
+              </a:cxn>
+              <a:cxn ang="0">
+                <a:pos x="connsiteX5" y="connsiteY5"/>
+              </a:cxn>
+              <a:cxn ang="0">
+                <a:pos x="connsiteX6" y="connsiteY6"/>
+              </a:cxn>
+              <a:cxn ang="0">
+                <a:pos x="connsiteX7" y="connsiteY7"/>
+              </a:cxn>
+              <a:cxn ang="0">
+                <a:pos x="connsiteX8" y="connsiteY8"/>
+              </a:cxn>
+              <a:cxn ang="0">
+                <a:pos x="connsiteX9" y="connsiteY9"/>
+              </a:cxn>
+              <a:cxn ang="0">
+                <a:pos x="connsiteX10" y="connsiteY10"/>
+              </a:cxn>
+              <a:cxn ang="0">
+                <a:pos x="connsiteX11" y="connsiteY11"/>
+              </a:cxn>
+            </a:cxnLst>
+            <a:rect l="l" t="t" r="r" b="b"/>
+            <a:pathLst>
+              <a:path w="3255095" h="18288" fill="none" extrusionOk="0">
+                <a:moveTo>
+                  <a:pt x="0" y="0"/>
+                </a:moveTo>
+                <a:cubicBezTo>
+                  <a:pt x="240201" y="-22123"/>
+                  <a:pt x="462021" y="-19623"/>
+                  <a:pt x="618468" y="0"/>
+                </a:cubicBezTo>
+                <a:cubicBezTo>
+                  <a:pt x="774915" y="19623"/>
+                  <a:pt x="974734" y="2035"/>
+                  <a:pt x="1269487" y="0"/>
+                </a:cubicBezTo>
+                <a:cubicBezTo>
+                  <a:pt x="1564240" y="-2035"/>
+                  <a:pt x="1733579" y="10639"/>
+                  <a:pt x="1953057" y="0"/>
+                </a:cubicBezTo>
+                <a:cubicBezTo>
+                  <a:pt x="2172535" y="-10639"/>
+                  <a:pt x="2453962" y="14018"/>
+                  <a:pt x="2636627" y="0"/>
+                </a:cubicBezTo>
+                <a:cubicBezTo>
+                  <a:pt x="2819292" y="-14018"/>
+                  <a:pt x="3121375" y="5399"/>
+                  <a:pt x="3255095" y="0"/>
+                </a:cubicBezTo>
+                <a:cubicBezTo>
+                  <a:pt x="3254386" y="8157"/>
+                  <a:pt x="3254682" y="12125"/>
+                  <a:pt x="3255095" y="18288"/>
+                </a:cubicBezTo>
+                <a:cubicBezTo>
+                  <a:pt x="3088545" y="23203"/>
+                  <a:pt x="2687475" y="7419"/>
+                  <a:pt x="2538974" y="18288"/>
+                </a:cubicBezTo>
+                <a:cubicBezTo>
+                  <a:pt x="2390473" y="29157"/>
+                  <a:pt x="2137381" y="-8959"/>
+                  <a:pt x="1822853" y="18288"/>
+                </a:cubicBezTo>
+                <a:cubicBezTo>
+                  <a:pt x="1508325" y="45535"/>
+                  <a:pt x="1466437" y="20385"/>
+                  <a:pt x="1171834" y="18288"/>
+                </a:cubicBezTo>
+                <a:cubicBezTo>
+                  <a:pt x="877231" y="16191"/>
+                  <a:pt x="561097" y="37643"/>
+                  <a:pt x="0" y="18288"/>
+                </a:cubicBezTo>
+                <a:cubicBezTo>
+                  <a:pt x="-46" y="12483"/>
+                  <a:pt x="-203" y="6491"/>
+                  <a:pt x="0" y="0"/>
+                </a:cubicBezTo>
+                <a:close/>
+              </a:path>
+              <a:path w="3255095" h="18288" stroke="0" extrusionOk="0">
+                <a:moveTo>
+                  <a:pt x="0" y="0"/>
+                </a:moveTo>
+                <a:cubicBezTo>
+                  <a:pt x="291965" y="19429"/>
+                  <a:pt x="363155" y="8568"/>
+                  <a:pt x="618468" y="0"/>
+                </a:cubicBezTo>
+                <a:cubicBezTo>
+                  <a:pt x="873781" y="-8568"/>
+                  <a:pt x="904459" y="-19505"/>
+                  <a:pt x="1171834" y="0"/>
+                </a:cubicBezTo>
+                <a:cubicBezTo>
+                  <a:pt x="1439209" y="19505"/>
+                  <a:pt x="1744369" y="9790"/>
+                  <a:pt x="1887955" y="0"/>
+                </a:cubicBezTo>
+                <a:cubicBezTo>
+                  <a:pt x="2031541" y="-9790"/>
+                  <a:pt x="2346378" y="21240"/>
+                  <a:pt x="2506423" y="0"/>
+                </a:cubicBezTo>
+                <a:cubicBezTo>
+                  <a:pt x="2666468" y="-21240"/>
+                  <a:pt x="2990257" y="30414"/>
+                  <a:pt x="3255095" y="0"/>
+                </a:cubicBezTo>
+                <a:cubicBezTo>
+                  <a:pt x="3254831" y="4493"/>
+                  <a:pt x="3255479" y="9472"/>
+                  <a:pt x="3255095" y="18288"/>
+                </a:cubicBezTo>
+                <a:cubicBezTo>
+                  <a:pt x="3120743" y="16690"/>
+                  <a:pt x="2759628" y="42462"/>
+                  <a:pt x="2604076" y="18288"/>
+                </a:cubicBezTo>
+                <a:cubicBezTo>
+                  <a:pt x="2448524" y="-5886"/>
+                  <a:pt x="2184336" y="19599"/>
+                  <a:pt x="1887955" y="18288"/>
+                </a:cubicBezTo>
+                <a:cubicBezTo>
+                  <a:pt x="1591574" y="16977"/>
+                  <a:pt x="1548845" y="6870"/>
+                  <a:pt x="1334589" y="18288"/>
+                </a:cubicBezTo>
+                <a:cubicBezTo>
+                  <a:pt x="1120333" y="29706"/>
+                  <a:pt x="996014" y="9662"/>
+                  <a:pt x="683570" y="18288"/>
+                </a:cubicBezTo>
+                <a:cubicBezTo>
+                  <a:pt x="371126" y="26914"/>
+                  <a:pt x="198687" y="16167"/>
+                  <a:pt x="0" y="18288"/>
+                </a:cubicBezTo>
+                <a:cubicBezTo>
+                  <a:pt x="843" y="9577"/>
+                  <a:pt x="371" y="6900"/>
+                  <a:pt x="0" y="0"/>
+                </a:cubicBezTo>
+                <a:close/>
+              </a:path>
+            </a:pathLst>
+          </a:custGeom>
+          <a:solidFill>
+            <a:schemeClr val="accent2"/>
+          </a:solidFill>
+          <a:ln w="38100" cap="rnd">
+            <a:solidFill>
+              <a:schemeClr val="accent2"/>
+            </a:solidFill>
+            <a:round/>
+            <a:extLst>
+              <a:ext uri="{C807C97D-BFC1-408E-A445-0C87EB9F89A2}">
+                <ask:lineSketchStyleProps xmlns:ask="http://schemas.microsoft.com/office/drawing/2018/sketchyshapes" sd="1219033472">
+                  <a:prstGeom prst="rect">
+                    <a:avLst/>
+                  </a:prstGeom>
+                  <ask:type>
+                    <ask:lineSketchFreehand/>
+                  </ask:type>
+                </ask:lineSketchStyleProps>
+              </a:ext>
+            </a:extLst>
+          </a:ln>
+        </p:spPr>
+        <p:style>
+          <a:lnRef idx="2">
+            <a:schemeClr val="accent1">
+              <a:shade val="50000"/>
+            </a:schemeClr>
+          </a:lnRef>
+          <a:fillRef idx="1">
+            <a:schemeClr val="accent1"/>
+          </a:fillRef>
+          <a:effectRef idx="0">
+            <a:schemeClr val="accent1"/>
+          </a:effectRef>
+          <a:fontRef idx="minor">
+            <a:schemeClr val="lt1"/>
+          </a:fontRef>
+        </p:style>
+        <p:txBody>
+          <a:bodyPr rtlCol="0" anchor="ctr"/>
+          <a:lstStyle/>
+          <a:p>
+            <a:pPr algn="ctr"/>
+            <a:endParaRPr lang="en-US"/>
+          </a:p>
+        </p:txBody>
+      </p:sp>
+      <p:sp>
+        <p:nvSpPr>
+          <p:cNvPr id="4" name="Marcador de texto 3">
+            <a:extLst>
+              <a:ext uri="{FF2B5EF4-FFF2-40B4-BE49-F238E27FC236}">
+                <a16:creationId xmlns:a16="http://schemas.microsoft.com/office/drawing/2014/main" id="{F92AC60E-3D9A-B4A7-AC2A-7A3A65B9C32C}"/>
+              </a:ext>
+            </a:extLst>
+          </p:cNvPr>
+          <p:cNvSpPr>
+            <a:spLocks noGrp="1"/>
+          </p:cNvSpPr>
+          <p:nvPr>
+            <p:ph type="body" sz="half" idx="2"/>
+          </p:nvPr>
+        </p:nvSpPr>
+        <p:spPr>
+          <a:xfrm>
+            <a:off x="630936" y="2807208"/>
+            <a:ext cx="3429000" cy="3410712"/>
+          </a:xfrm>
+        </p:spPr>
+        <p:txBody>
+          <a:bodyPr vert="horz" lIns="91440" tIns="45720" rIns="91440" bIns="45720" rtlCol="0" anchor="t">
+            <a:normAutofit/>
+          </a:bodyPr>
+          <a:lstStyle/>
+          <a:p>
+            <a:pPr indent="-228600" algn="just">
+              <a:buFont typeface="Arial" panose="020B0604020202020204" pitchFamily="34" charset="0"/>
+              <a:buChar char="•"/>
+            </a:pPr>
+            <a:r>
+              <a:rPr lang="en-US" sz="2200" dirty="0"/>
+              <a:t>Son </a:t>
+            </a:r>
+            <a:r>
+              <a:rPr lang="en-US" sz="2200" dirty="0" err="1"/>
+              <a:t>instrucciones</a:t>
+            </a:r>
+            <a:r>
+              <a:rPr lang="en-US" sz="2200" dirty="0"/>
+              <a:t> </a:t>
+            </a:r>
+            <a:r>
+              <a:rPr lang="en-US" sz="2200" dirty="0" err="1"/>
+              <a:t>vectoriales</a:t>
+            </a:r>
+            <a:r>
+              <a:rPr lang="en-US" sz="2200" dirty="0"/>
+              <a:t> </a:t>
+            </a:r>
+            <a:r>
+              <a:rPr lang="en-US" sz="2200" dirty="0" err="1"/>
+              <a:t>especificas</a:t>
+            </a:r>
+            <a:r>
+              <a:rPr lang="en-US" sz="2200" dirty="0"/>
+              <a:t> de </a:t>
+            </a:r>
+            <a:r>
+              <a:rPr lang="en-US" sz="2200" dirty="0" err="1"/>
+              <a:t>los</a:t>
+            </a:r>
+            <a:r>
+              <a:rPr lang="en-US" sz="2200" dirty="0"/>
+              <a:t> </a:t>
+            </a:r>
+            <a:r>
+              <a:rPr lang="en-US" sz="2200" dirty="0" err="1"/>
+              <a:t>procesadores</a:t>
+            </a:r>
+            <a:endParaRPr lang="en-US" sz="2200" dirty="0"/>
+          </a:p>
+          <a:p>
+            <a:pPr indent="-228600" algn="just">
+              <a:buFont typeface="Arial" panose="020B0604020202020204" pitchFamily="34" charset="0"/>
+              <a:buChar char="•"/>
+            </a:pPr>
+            <a:r>
+              <a:rPr lang="en-US" sz="2200" dirty="0" err="1"/>
+              <a:t>Permiten</a:t>
+            </a:r>
+            <a:r>
+              <a:rPr lang="en-US" sz="2200" dirty="0"/>
+              <a:t> </a:t>
+            </a:r>
+            <a:r>
+              <a:rPr lang="en-US" sz="2200" dirty="0" err="1"/>
+              <a:t>ejecutar</a:t>
+            </a:r>
+            <a:r>
+              <a:rPr lang="en-US" sz="2200" dirty="0"/>
+              <a:t> AES de forma </a:t>
+            </a:r>
+            <a:r>
+              <a:rPr lang="en-US" sz="2200" dirty="0" err="1"/>
+              <a:t>vectorizada</a:t>
+            </a:r>
+            <a:endParaRPr lang="en-US" sz="2200" dirty="0"/>
+          </a:p>
+          <a:p>
+            <a:pPr indent="-228600" algn="just">
+              <a:buFont typeface="Arial" panose="020B0604020202020204" pitchFamily="34" charset="0"/>
+              <a:buChar char="•"/>
+            </a:pPr>
+            <a:r>
+              <a:rPr lang="en-US" sz="2200" dirty="0" err="1"/>
+              <a:t>Existen</a:t>
+            </a:r>
+            <a:r>
+              <a:rPr lang="en-US" sz="2200" dirty="0"/>
+              <a:t> dos conjuntos: ARMv8 y AVX.</a:t>
+            </a:r>
+          </a:p>
+          <a:p>
+            <a:pPr indent="-228600">
+              <a:buFont typeface="Arial" panose="020B0604020202020204" pitchFamily="34" charset="0"/>
+              <a:buChar char="•"/>
+            </a:pPr>
+            <a:endParaRPr lang="en-US" sz="2200" dirty="0"/>
+          </a:p>
+        </p:txBody>
+      </p:sp>
+      <p:pic>
+        <p:nvPicPr>
+          <p:cNvPr id="6" name="Marcador de contenido 5" descr="Diagrama&#10;&#10;El contenido generado por IA puede ser incorrecto.">
+            <a:extLst>
+              <a:ext uri="{FF2B5EF4-FFF2-40B4-BE49-F238E27FC236}">
+                <a16:creationId xmlns:a16="http://schemas.microsoft.com/office/drawing/2014/main" id="{5545B50A-DB2B-AD4D-0D4E-A8E164C0E4F1}"/>
+              </a:ext>
+            </a:extLst>
+          </p:cNvPr>
+          <p:cNvPicPr>
+            <a:picLocks noGrp="1" noChangeAspect="1"/>
+          </p:cNvPicPr>
+          <p:nvPr>
+            <p:ph idx="1"/>
+          </p:nvPr>
+        </p:nvPicPr>
+        <p:blipFill>
+          <a:blip r:embed="rId2"/>
+          <a:stretch>
+            <a:fillRect/>
+          </a:stretch>
+        </p:blipFill>
+        <p:spPr>
+          <a:xfrm>
+            <a:off x="4654296" y="1038585"/>
+            <a:ext cx="6903720" cy="4780829"/>
+          </a:xfrm>
+          <a:prstGeom prst="rect">
+            <a:avLst/>
+          </a:prstGeom>
+        </p:spPr>
+      </p:pic>
+    </p:spTree>
+    <p:extLst>
+      <p:ext uri="{BB962C8B-B14F-4D97-AF65-F5344CB8AC3E}">
+        <p14:creationId xmlns:p14="http://schemas.microsoft.com/office/powerpoint/2010/main" val="2820700304"/>
+      </p:ext>
+    </p:extLst>
+  </p:cSld>
+  <p:clrMapOvr>
+    <a:masterClrMapping/>
+  </p:clrMapOvr>
+</p:sld>
+</file>
+
+<file path=ppt/slides/slide16.xml><?xml version="1.0" encoding="utf-8"?>
 <p:sld xmlns:a="http://schemas.openxmlformats.org/drawingml/2006/main" xmlns:r="http://schemas.openxmlformats.org/officeDocument/2006/relationships" xmlns:p="http://schemas.openxmlformats.org/presentationml/2006/main">
   <p:cSld>
     <p:bg>
@@ -19128,7 +20545,7 @@
 </p:sld>
 </file>
 
-<file path=ppt/slides/slide14.xml><?xml version="1.0" encoding="utf-8"?>
+<file path=ppt/slides/slide17.xml><?xml version="1.0" encoding="utf-8"?>
 <p:sld xmlns:a="http://schemas.openxmlformats.org/drawingml/2006/main" xmlns:r="http://schemas.openxmlformats.org/officeDocument/2006/relationships" xmlns:p="http://schemas.openxmlformats.org/presentationml/2006/main">
   <p:cSld>
     <p:bg>
@@ -19304,7 +20721,7 @@
 </p:sld>
 </file>
 
-<file path=ppt/slides/slide15.xml><?xml version="1.0" encoding="utf-8"?>
+<file path=ppt/slides/slide18.xml><?xml version="1.0" encoding="utf-8"?>
 <p:sld xmlns:a="http://schemas.openxmlformats.org/drawingml/2006/main" xmlns:r="http://schemas.openxmlformats.org/officeDocument/2006/relationships" xmlns:p="http://schemas.openxmlformats.org/presentationml/2006/main">
   <p:cSld>
     <p:bg>
@@ -19480,7 +20897,7 @@
 </p:sld>
 </file>
 
-<file path=ppt/slides/slide16.xml><?xml version="1.0" encoding="utf-8"?>
+<file path=ppt/slides/slide19.xml><?xml version="1.0" encoding="utf-8"?>
 <p:sld xmlns:a="http://schemas.openxmlformats.org/drawingml/2006/main" xmlns:r="http://schemas.openxmlformats.org/officeDocument/2006/relationships" xmlns:p="http://schemas.openxmlformats.org/presentationml/2006/main">
   <p:cSld>
     <p:bg>
@@ -20009,18 +21426,21 @@
           </a:bodyPr>
           <a:lstStyle/>
           <a:p>
+            <a:pPr algn="just"/>
             <a:r>
               <a:rPr lang="es-ES_tradnl" sz="2000" dirty="0"/>
               <a:t>Es una función que convierte entradas de tamaño arbitrario en salidas de un tamaño fijo.</a:t>
             </a:r>
           </a:p>
           <a:p>
+            <a:pPr algn="just"/>
             <a:r>
               <a:rPr lang="es-ES_tradnl" sz="2000" dirty="0"/>
               <a:t>Las funciones hash son usadas para asegurar la integridad de los mensajes comunicados. </a:t>
             </a:r>
           </a:p>
           <a:p>
+            <a:pPr algn="just"/>
             <a:r>
               <a:rPr lang="es-ES_tradnl" sz="2000" dirty="0"/>
               <a:t>La probabilidad de obtener dos salidas iguales a partir de entradas distintas es baja.</a:t>
@@ -20578,8 +21998,8 @@
           </a:p>
         </p:txBody>
       </p:sp>
-      <mc:AlternateContent xmlns:mc="http://schemas.openxmlformats.org/markup-compatibility/2006" xmlns:a14="http://schemas.microsoft.com/office/drawing/2010/main">
-        <mc:Choice Requires="a14">
+      <mc:AlternateContent xmlns:mc="http://schemas.openxmlformats.org/markup-compatibility/2006">
+        <mc:Choice xmlns:a14="http://schemas.microsoft.com/office/drawing/2010/main" Requires="a14">
           <p:sp>
             <p:nvSpPr>
               <p:cNvPr id="3" name="Marcador de contenido 2">
@@ -20608,15 +22028,15 @@
               </a:bodyPr>
               <a:lstStyle/>
               <a:p>
-                <a:pPr marL="0" indent="0">
+                <a:pPr marL="0" indent="0" algn="just">
                   <a:buNone/>
                 </a:pPr>
                 <a:r>
-                  <a:rPr lang="es-MX" sz="2000" b="1"/>
+                  <a:rPr lang="es-MX" sz="2000" b="1" dirty="0"/>
                   <a:t>La probabilidad de colisión</a:t>
                 </a:r>
                 <a:r>
-                  <a:rPr lang="es-MX" sz="2000"/>
+                  <a:rPr lang="es-MX" sz="2000" dirty="0"/>
                   <a:t> de una función hash criptográfica se refiere a la probabilidad de que dos entradas distintas </a:t>
                 </a:r>
                 <a14:m>
@@ -20665,12 +22085,12 @@
                   </m:oMath>
                 </a14:m>
                 <a:r>
-                  <a:rPr lang="es-MX" sz="2000"/>
+                  <a:rPr lang="es-MX" sz="2000" dirty="0"/>
                   <a:t>produzcan el mismo valor hash, es decir, que:</a:t>
                 </a:r>
               </a:p>
               <a:p>
-                <a:pPr marL="0" indent="0">
+                <a:pPr marL="0" indent="0" algn="just">
                   <a:buNone/>
                 </a:pPr>
                 <a14:m>
@@ -20753,14 +22173,14 @@
                     </m:oMath>
                   </m:oMathPara>
                 </a14:m>
-                <a:endParaRPr lang="es-ES" sz="2000" b="0"/>
+                <a:endParaRPr lang="es-ES" sz="2000" b="0" dirty="0"/>
               </a:p>
               <a:p>
-                <a:pPr marL="0" indent="0">
+                <a:pPr marL="0" indent="0" algn="just">
                   <a:buNone/>
                 </a:pPr>
                 <a:r>
-                  <a:rPr lang="es-MX" sz="2000"/>
+                  <a:rPr lang="es-MX" sz="2000" dirty="0"/>
                   <a:t>Para una función hash ideal con salida de </a:t>
                 </a:r>
                 <a14:m>
@@ -20774,19 +22194,19 @@
                   </m:oMath>
                 </a14:m>
                 <a:r>
-                  <a:rPr lang="es-MX" sz="2000"/>
+                  <a:rPr lang="es-MX" sz="2000" dirty="0"/>
                   <a:t> bits, la probabilidad de colisión está relacionada con la </a:t>
                 </a:r>
                 <a:r>
-                  <a:rPr lang="es-MX" sz="2000" b="1"/>
+                  <a:rPr lang="es-MX" sz="2000" b="1" dirty="0"/>
                   <a:t>paradoja del cumpleaños</a:t>
                 </a:r>
-                <a:endParaRPr lang="es-ES_tradnl" sz="2000"/>
+                <a:endParaRPr lang="es-ES_tradnl" sz="2000" dirty="0"/>
               </a:p>
             </p:txBody>
           </p:sp>
         </mc:Choice>
-        <mc:Fallback xmlns="">
+        <mc:Fallback>
           <p:sp>
             <p:nvSpPr>
               <p:cNvPr id="3" name="Marcador de contenido 2">
@@ -20811,7 +22231,7 @@
               <a:blipFill>
                 <a:blip r:embed="rId2"/>
                 <a:stretch>
-                  <a:fillRect l="-1425" r="-1900"/>
+                  <a:fillRect l="-1425" r="-950"/>
                 </a:stretch>
               </a:blipFill>
             </p:spPr>
@@ -21871,6 +23291,1607 @@
           <a:chExt cx="0" cy="0"/>
         </a:xfrm>
       </p:grpSpPr>
+      <p:sp useBgFill="1">
+        <p:nvSpPr>
+          <p:cNvPr id="21" name="Rectangle 7">
+            <a:extLst>
+              <a:ext uri="{FF2B5EF4-FFF2-40B4-BE49-F238E27FC236}">
+                <a16:creationId xmlns:a16="http://schemas.microsoft.com/office/drawing/2014/main" id="{09588DA8-065E-4F6F-8EFD-43104AB2E0CF}"/>
+              </a:ext>
+              <a:ext uri="{C183D7F6-B498-43B3-948B-1728B52AA6E4}">
+                <adec:decorative xmlns:adec="http://schemas.microsoft.com/office/drawing/2017/decorative" val="1"/>
+              </a:ext>
+            </a:extLst>
+          </p:cNvPr>
+          <p:cNvSpPr>
+            <a:spLocks noGrp="1" noRot="1" noChangeAspect="1" noMove="1" noResize="1" noEditPoints="1" noAdjustHandles="1" noChangeArrowheads="1" noChangeShapeType="1" noTextEdit="1"/>
+          </p:cNvSpPr>
+          <p:nvPr>
+            <p:extLst>
+              <p:ext uri="{386F3935-93C4-4BCD-93E2-E3B085C9AB24}">
+                <p16:designElem xmlns:p16="http://schemas.microsoft.com/office/powerpoint/2015/main" val="1"/>
+              </p:ext>
+            </p:extLst>
+          </p:nvPr>
+        </p:nvSpPr>
+        <p:spPr>
+          <a:xfrm>
+            <a:off x="0" y="0"/>
+            <a:ext cx="12192000" cy="6858000"/>
+          </a:xfrm>
+          <a:prstGeom prst="rect">
+            <a:avLst/>
+          </a:prstGeom>
+          <a:ln w="12700" cap="flat" cmpd="sng" algn="ctr">
+            <a:noFill/>
+            <a:prstDash val="solid"/>
+            <a:miter lim="800000"/>
+          </a:ln>
+          <a:effectLst/>
+          <a:extLst>
+            <a:ext uri="{91240B29-F687-4F45-9708-019B960494DF}">
+              <a14:hiddenLine xmlns:a14="http://schemas.microsoft.com/office/drawing/2010/main" w="12700" cap="flat" cmpd="sng" algn="ctr">
+                <a:solidFill>
+                  <a:schemeClr val="accent1">
+                    <a:shade val="50000"/>
+                  </a:schemeClr>
+                </a:solidFill>
+                <a:prstDash val="solid"/>
+                <a:miter lim="800000"/>
+              </a14:hiddenLine>
+            </a:ext>
+          </a:extLst>
+        </p:spPr>
+        <p:style>
+          <a:lnRef idx="2">
+            <a:schemeClr val="accent1">
+              <a:shade val="50000"/>
+            </a:schemeClr>
+          </a:lnRef>
+          <a:fillRef idx="1">
+            <a:schemeClr val="accent1"/>
+          </a:fillRef>
+          <a:effectRef idx="0">
+            <a:schemeClr val="accent1"/>
+          </a:effectRef>
+          <a:fontRef idx="minor">
+            <a:schemeClr val="lt1"/>
+          </a:fontRef>
+        </p:style>
+        <p:txBody>
+          <a:bodyPr rtlCol="0" anchor="ctr"/>
+          <a:lstStyle/>
+          <a:p>
+            <a:pPr algn="ctr"/>
+            <a:endParaRPr lang="en-US"/>
+          </a:p>
+        </p:txBody>
+      </p:sp>
+      <p:sp useBgFill="1">
+        <p:nvSpPr>
+          <p:cNvPr id="22" name="Rectangle 9">
+            <a:extLst>
+              <a:ext uri="{FF2B5EF4-FFF2-40B4-BE49-F238E27FC236}">
+                <a16:creationId xmlns:a16="http://schemas.microsoft.com/office/drawing/2014/main" id="{C4285719-470E-454C-AF62-8323075F1F5B}"/>
+              </a:ext>
+              <a:ext uri="{C183D7F6-B498-43B3-948B-1728B52AA6E4}">
+                <adec:decorative xmlns:adec="http://schemas.microsoft.com/office/drawing/2017/decorative" val="1"/>
+              </a:ext>
+            </a:extLst>
+          </p:cNvPr>
+          <p:cNvSpPr>
+            <a:spLocks noGrp="1" noRot="1" noChangeAspect="1" noMove="1" noResize="1" noEditPoints="1" noAdjustHandles="1" noChangeArrowheads="1" noChangeShapeType="1" noTextEdit="1"/>
+          </p:cNvSpPr>
+          <p:nvPr>
+            <p:extLst>
+              <p:ext uri="{386F3935-93C4-4BCD-93E2-E3B085C9AB24}">
+                <p16:designElem xmlns:p16="http://schemas.microsoft.com/office/powerpoint/2015/main" val="1"/>
+              </p:ext>
+            </p:extLst>
+          </p:nvPr>
+        </p:nvSpPr>
+        <p:spPr>
+          <a:xfrm>
+            <a:off x="0" y="0"/>
+            <a:ext cx="12188952" cy="6858000"/>
+          </a:xfrm>
+          <a:prstGeom prst="rect">
+            <a:avLst/>
+          </a:prstGeom>
+          <a:ln w="12700" cap="flat" cmpd="sng" algn="ctr">
+            <a:noFill/>
+            <a:prstDash val="solid"/>
+            <a:miter lim="800000"/>
+          </a:ln>
+          <a:effectLst/>
+          <a:extLst>
+            <a:ext uri="{91240B29-F687-4F45-9708-019B960494DF}">
+              <a14:hiddenLine xmlns:a14="http://schemas.microsoft.com/office/drawing/2010/main" w="12700" cap="flat" cmpd="sng" algn="ctr">
+                <a:solidFill>
+                  <a:schemeClr val="accent1">
+                    <a:shade val="50000"/>
+                  </a:schemeClr>
+                </a:solidFill>
+                <a:prstDash val="solid"/>
+                <a:miter lim="800000"/>
+              </a14:hiddenLine>
+            </a:ext>
+          </a:extLst>
+        </p:spPr>
+        <p:style>
+          <a:lnRef idx="2">
+            <a:schemeClr val="accent1">
+              <a:shade val="50000"/>
+            </a:schemeClr>
+          </a:lnRef>
+          <a:fillRef idx="1">
+            <a:schemeClr val="accent1"/>
+          </a:fillRef>
+          <a:effectRef idx="0">
+            <a:schemeClr val="accent1"/>
+          </a:effectRef>
+          <a:fontRef idx="minor">
+            <a:schemeClr val="lt1"/>
+          </a:fontRef>
+        </p:style>
+        <p:txBody>
+          <a:bodyPr rtlCol="0" anchor="ctr"/>
+          <a:lstStyle/>
+          <a:p>
+            <a:pPr algn="ctr"/>
+            <a:endParaRPr lang="en-US"/>
+          </a:p>
+        </p:txBody>
+      </p:sp>
+      <p:sp>
+        <p:nvSpPr>
+          <p:cNvPr id="23" name="Rectangle 11">
+            <a:extLst>
+              <a:ext uri="{FF2B5EF4-FFF2-40B4-BE49-F238E27FC236}">
+                <a16:creationId xmlns:a16="http://schemas.microsoft.com/office/drawing/2014/main" id="{CD9FE4EF-C4D8-49A0-B2FF-81D8DB7D8A24}"/>
+              </a:ext>
+              <a:ext uri="{C183D7F6-B498-43B3-948B-1728B52AA6E4}">
+                <adec:decorative xmlns:adec="http://schemas.microsoft.com/office/drawing/2017/decorative" val="1"/>
+              </a:ext>
+            </a:extLst>
+          </p:cNvPr>
+          <p:cNvSpPr>
+            <a:spLocks noGrp="1" noRot="1" noChangeAspect="1" noMove="1" noResize="1" noEditPoints="1" noAdjustHandles="1" noChangeArrowheads="1" noChangeShapeType="1" noTextEdit="1"/>
+          </p:cNvSpPr>
+          <p:nvPr>
+            <p:extLst>
+              <p:ext uri="{386F3935-93C4-4BCD-93E2-E3B085C9AB24}">
+                <p16:designElem xmlns:p16="http://schemas.microsoft.com/office/powerpoint/2015/main" val="1"/>
+              </p:ext>
+            </p:extLst>
+          </p:nvPr>
+        </p:nvSpPr>
+        <p:spPr>
+          <a:xfrm rot="5400000" flipH="1">
+            <a:off x="-1410084" y="1410082"/>
+            <a:ext cx="6858000" cy="4037836"/>
+          </a:xfrm>
+          <a:prstGeom prst="rect">
+            <a:avLst/>
+          </a:prstGeom>
+          <a:gradFill>
+            <a:gsLst>
+              <a:gs pos="8000">
+                <a:srgbClr val="000000"/>
+              </a:gs>
+              <a:gs pos="100000">
+                <a:schemeClr val="accent1">
+                  <a:lumMod val="75000"/>
+                </a:schemeClr>
+              </a:gs>
+            </a:gsLst>
+            <a:lin ang="3000000" scaled="0"/>
+          </a:gradFill>
+          <a:ln>
+            <a:noFill/>
+          </a:ln>
+        </p:spPr>
+        <p:style>
+          <a:lnRef idx="2">
+            <a:schemeClr val="accent1">
+              <a:shade val="50000"/>
+            </a:schemeClr>
+          </a:lnRef>
+          <a:fillRef idx="1">
+            <a:schemeClr val="accent1"/>
+          </a:fillRef>
+          <a:effectRef idx="0">
+            <a:schemeClr val="accent1"/>
+          </a:effectRef>
+          <a:fontRef idx="minor">
+            <a:schemeClr val="lt1"/>
+          </a:fontRef>
+        </p:style>
+        <p:txBody>
+          <a:bodyPr rtlCol="0" anchor="ctr"/>
+          <a:lstStyle/>
+          <a:p>
+            <a:pPr algn="ctr"/>
+            <a:endParaRPr lang="en-US"/>
+          </a:p>
+        </p:txBody>
+      </p:sp>
+      <p:sp>
+        <p:nvSpPr>
+          <p:cNvPr id="24" name="Rectangle 13">
+            <a:extLst>
+              <a:ext uri="{FF2B5EF4-FFF2-40B4-BE49-F238E27FC236}">
+                <a16:creationId xmlns:a16="http://schemas.microsoft.com/office/drawing/2014/main" id="{4300840D-0A0B-4512-BACA-B439D5B9C57C}"/>
+              </a:ext>
+              <a:ext uri="{C183D7F6-B498-43B3-948B-1728B52AA6E4}">
+                <adec:decorative xmlns:adec="http://schemas.microsoft.com/office/drawing/2017/decorative" val="1"/>
+              </a:ext>
+            </a:extLst>
+          </p:cNvPr>
+          <p:cNvSpPr>
+            <a:spLocks noGrp="1" noRot="1" noChangeAspect="1" noMove="1" noResize="1" noEditPoints="1" noAdjustHandles="1" noChangeArrowheads="1" noChangeShapeType="1" noTextEdit="1"/>
+          </p:cNvSpPr>
+          <p:nvPr>
+            <p:extLst>
+              <p:ext uri="{386F3935-93C4-4BCD-93E2-E3B085C9AB24}">
+                <p16:designElem xmlns:p16="http://schemas.microsoft.com/office/powerpoint/2015/main" val="1"/>
+              </p:ext>
+            </p:extLst>
+          </p:nvPr>
+        </p:nvSpPr>
+        <p:spPr>
+          <a:xfrm rot="5400000" flipH="1">
+            <a:off x="-1410085" y="1420219"/>
+            <a:ext cx="6857999" cy="4037839"/>
+          </a:xfrm>
+          <a:prstGeom prst="rect">
+            <a:avLst/>
+          </a:prstGeom>
+          <a:gradFill>
+            <a:gsLst>
+              <a:gs pos="0">
+                <a:srgbClr val="000000">
+                  <a:alpha val="0"/>
+                </a:srgbClr>
+              </a:gs>
+              <a:gs pos="99000">
+                <a:schemeClr val="accent1">
+                  <a:alpha val="46000"/>
+                </a:schemeClr>
+              </a:gs>
+            </a:gsLst>
+            <a:lin ang="1800000" scaled="0"/>
+          </a:gradFill>
+          <a:ln>
+            <a:noFill/>
+          </a:ln>
+        </p:spPr>
+        <p:style>
+          <a:lnRef idx="2">
+            <a:schemeClr val="accent1">
+              <a:shade val="50000"/>
+            </a:schemeClr>
+          </a:lnRef>
+          <a:fillRef idx="1">
+            <a:schemeClr val="accent1"/>
+          </a:fillRef>
+          <a:effectRef idx="0">
+            <a:schemeClr val="accent1"/>
+          </a:effectRef>
+          <a:fontRef idx="minor">
+            <a:schemeClr val="lt1"/>
+          </a:fontRef>
+        </p:style>
+        <p:txBody>
+          <a:bodyPr rtlCol="0" anchor="ctr"/>
+          <a:lstStyle/>
+          <a:p>
+            <a:pPr algn="ctr"/>
+            <a:endParaRPr lang="en-US"/>
+          </a:p>
+        </p:txBody>
+      </p:sp>
+      <p:sp>
+        <p:nvSpPr>
+          <p:cNvPr id="25" name="Rectangle 15">
+            <a:extLst>
+              <a:ext uri="{FF2B5EF4-FFF2-40B4-BE49-F238E27FC236}">
+                <a16:creationId xmlns:a16="http://schemas.microsoft.com/office/drawing/2014/main" id="{D2B78728-A580-49A7-84F9-6EF6F583ADE0}"/>
+              </a:ext>
+              <a:ext uri="{C183D7F6-B498-43B3-948B-1728B52AA6E4}">
+                <adec:decorative xmlns:adec="http://schemas.microsoft.com/office/drawing/2017/decorative" val="1"/>
+              </a:ext>
+            </a:extLst>
+          </p:cNvPr>
+          <p:cNvSpPr>
+            <a:spLocks noGrp="1" noRot="1" noChangeAspect="1" noMove="1" noResize="1" noEditPoints="1" noAdjustHandles="1" noChangeArrowheads="1" noChangeShapeType="1" noTextEdit="1"/>
+          </p:cNvSpPr>
+          <p:nvPr>
+            <p:extLst>
+              <p:ext uri="{386F3935-93C4-4BCD-93E2-E3B085C9AB24}">
+                <p16:designElem xmlns:p16="http://schemas.microsoft.com/office/powerpoint/2015/main" val="1"/>
+              </p:ext>
+            </p:extLst>
+          </p:nvPr>
+        </p:nvSpPr>
+        <p:spPr>
+          <a:xfrm rot="5400000" flipH="1">
+            <a:off x="767923" y="3588085"/>
+            <a:ext cx="2501979" cy="4037841"/>
+          </a:xfrm>
+          <a:prstGeom prst="rect">
+            <a:avLst/>
+          </a:prstGeom>
+          <a:gradFill>
+            <a:gsLst>
+              <a:gs pos="2000">
+                <a:schemeClr val="accent1">
+                  <a:alpha val="29000"/>
+                </a:schemeClr>
+              </a:gs>
+              <a:gs pos="100000">
+                <a:srgbClr val="000000">
+                  <a:alpha val="30000"/>
+                </a:srgbClr>
+              </a:gs>
+            </a:gsLst>
+            <a:lin ang="7800000" scaled="0"/>
+          </a:gradFill>
+          <a:ln>
+            <a:noFill/>
+          </a:ln>
+        </p:spPr>
+        <p:style>
+          <a:lnRef idx="2">
+            <a:schemeClr val="accent1">
+              <a:shade val="50000"/>
+            </a:schemeClr>
+          </a:lnRef>
+          <a:fillRef idx="1">
+            <a:schemeClr val="accent1"/>
+          </a:fillRef>
+          <a:effectRef idx="0">
+            <a:schemeClr val="accent1"/>
+          </a:effectRef>
+          <a:fontRef idx="minor">
+            <a:schemeClr val="lt1"/>
+          </a:fontRef>
+        </p:style>
+        <p:txBody>
+          <a:bodyPr rtlCol="0" anchor="ctr"/>
+          <a:lstStyle/>
+          <a:p>
+            <a:pPr algn="ctr"/>
+            <a:endParaRPr lang="en-US" dirty="0"/>
+          </a:p>
+        </p:txBody>
+      </p:sp>
+      <p:sp>
+        <p:nvSpPr>
+          <p:cNvPr id="26" name="Freeform: Shape 17">
+            <a:extLst>
+              <a:ext uri="{FF2B5EF4-FFF2-40B4-BE49-F238E27FC236}">
+                <a16:creationId xmlns:a16="http://schemas.microsoft.com/office/drawing/2014/main" id="{38FAA1A1-D861-433F-88FA-1E9D6FD31D11}"/>
+              </a:ext>
+              <a:ext uri="{C183D7F6-B498-43B3-948B-1728B52AA6E4}">
+                <adec:decorative xmlns:adec="http://schemas.microsoft.com/office/drawing/2017/decorative" val="1"/>
+              </a:ext>
+            </a:extLst>
+          </p:cNvPr>
+          <p:cNvSpPr>
+            <a:spLocks noGrp="1" noRot="1" noChangeAspect="1" noMove="1" noResize="1" noEditPoints="1" noAdjustHandles="1" noChangeArrowheads="1" noChangeShapeType="1" noTextEdit="1"/>
+          </p:cNvSpPr>
+          <p:nvPr>
+            <p:extLst>
+              <p:ext uri="{386F3935-93C4-4BCD-93E2-E3B085C9AB24}">
+                <p16:designElem xmlns:p16="http://schemas.microsoft.com/office/powerpoint/2015/main" val="1"/>
+              </p:ext>
+            </p:extLst>
+          </p:nvPr>
+        </p:nvSpPr>
+        <p:spPr>
+          <a:xfrm rot="20635413">
+            <a:off x="-501737" y="969718"/>
+            <a:ext cx="3900357" cy="4178958"/>
+          </a:xfrm>
+          <a:custGeom>
+            <a:avLst/>
+            <a:gdLst>
+              <a:gd name="connsiteX0" fmla="*/ 2432225 w 3900357"/>
+              <a:gd name="connsiteY0" fmla="*/ 93939 h 4178958"/>
+              <a:gd name="connsiteX1" fmla="*/ 3900357 w 3900357"/>
+              <a:gd name="connsiteY1" fmla="*/ 2089479 h 4178958"/>
+              <a:gd name="connsiteX2" fmla="*/ 1810878 w 3900357"/>
+              <a:gd name="connsiteY2" fmla="*/ 4178958 h 4178958"/>
+              <a:gd name="connsiteX3" fmla="*/ 78249 w 3900357"/>
+              <a:gd name="connsiteY3" fmla="*/ 3257727 h 4178958"/>
+              <a:gd name="connsiteX4" fmla="*/ 0 w 3900357"/>
+              <a:gd name="connsiteY4" fmla="*/ 3128923 h 4178958"/>
+              <a:gd name="connsiteX5" fmla="*/ 831324 w 3900357"/>
+              <a:gd name="connsiteY5" fmla="*/ 244281 h 4178958"/>
+              <a:gd name="connsiteX6" fmla="*/ 997559 w 3900357"/>
+              <a:gd name="connsiteY6" fmla="*/ 164202 h 4178958"/>
+              <a:gd name="connsiteX7" fmla="*/ 1810878 w 3900357"/>
+              <a:gd name="connsiteY7" fmla="*/ 0 h 4178958"/>
+              <a:gd name="connsiteX8" fmla="*/ 2432225 w 3900357"/>
+              <a:gd name="connsiteY8" fmla="*/ 93939 h 4178958"/>
+            </a:gdLst>
+            <a:ahLst/>
+            <a:cxnLst>
+              <a:cxn ang="0">
+                <a:pos x="connsiteX0" y="connsiteY0"/>
+              </a:cxn>
+              <a:cxn ang="0">
+                <a:pos x="connsiteX1" y="connsiteY1"/>
+              </a:cxn>
+              <a:cxn ang="0">
+                <a:pos x="connsiteX2" y="connsiteY2"/>
+              </a:cxn>
+              <a:cxn ang="0">
+                <a:pos x="connsiteX3" y="connsiteY3"/>
+              </a:cxn>
+              <a:cxn ang="0">
+                <a:pos x="connsiteX4" y="connsiteY4"/>
+              </a:cxn>
+              <a:cxn ang="0">
+                <a:pos x="connsiteX5" y="connsiteY5"/>
+              </a:cxn>
+              <a:cxn ang="0">
+                <a:pos x="connsiteX6" y="connsiteY6"/>
+              </a:cxn>
+              <a:cxn ang="0">
+                <a:pos x="connsiteX7" y="connsiteY7"/>
+              </a:cxn>
+              <a:cxn ang="0">
+                <a:pos x="connsiteX8" y="connsiteY8"/>
+              </a:cxn>
+            </a:cxnLst>
+            <a:rect l="l" t="t" r="r" b="b"/>
+            <a:pathLst>
+              <a:path w="3900357" h="4178958">
+                <a:moveTo>
+                  <a:pt x="2432225" y="93939"/>
+                </a:moveTo>
+                <a:cubicBezTo>
+                  <a:pt x="3282786" y="358491"/>
+                  <a:pt x="3900357" y="1151865"/>
+                  <a:pt x="3900357" y="2089479"/>
+                </a:cubicBezTo>
+                <a:cubicBezTo>
+                  <a:pt x="3900357" y="3243466"/>
+                  <a:pt x="2964865" y="4178958"/>
+                  <a:pt x="1810878" y="4178958"/>
+                </a:cubicBezTo>
+                <a:cubicBezTo>
+                  <a:pt x="1089636" y="4178958"/>
+                  <a:pt x="453744" y="3813531"/>
+                  <a:pt x="78249" y="3257727"/>
+                </a:cubicBezTo>
+                <a:lnTo>
+                  <a:pt x="0" y="3128923"/>
+                </a:lnTo>
+                <a:lnTo>
+                  <a:pt x="831324" y="244281"/>
+                </a:lnTo>
+                <a:lnTo>
+                  <a:pt x="997559" y="164202"/>
+                </a:lnTo>
+                <a:cubicBezTo>
+                  <a:pt x="1247540" y="58468"/>
+                  <a:pt x="1522381" y="0"/>
+                  <a:pt x="1810878" y="0"/>
+                </a:cubicBezTo>
+                <a:cubicBezTo>
+                  <a:pt x="2027251" y="0"/>
+                  <a:pt x="2235942" y="32888"/>
+                  <a:pt x="2432225" y="93939"/>
+                </a:cubicBezTo>
+                <a:close/>
+              </a:path>
+            </a:pathLst>
+          </a:custGeom>
+          <a:gradFill>
+            <a:gsLst>
+              <a:gs pos="29000">
+                <a:srgbClr val="000000">
+                  <a:alpha val="0"/>
+                </a:srgbClr>
+              </a:gs>
+              <a:gs pos="100000">
+                <a:schemeClr val="accent1">
+                  <a:alpha val="43000"/>
+                </a:schemeClr>
+              </a:gs>
+            </a:gsLst>
+            <a:lin ang="1800000" scaled="0"/>
+          </a:gradFill>
+          <a:ln>
+            <a:noFill/>
+          </a:ln>
+        </p:spPr>
+        <p:style>
+          <a:lnRef idx="2">
+            <a:schemeClr val="accent1">
+              <a:shade val="50000"/>
+            </a:schemeClr>
+          </a:lnRef>
+          <a:fillRef idx="1">
+            <a:schemeClr val="accent1"/>
+          </a:fillRef>
+          <a:effectRef idx="0">
+            <a:schemeClr val="accent1"/>
+          </a:effectRef>
+          <a:fontRef idx="minor">
+            <a:schemeClr val="lt1"/>
+          </a:fontRef>
+        </p:style>
+        <p:txBody>
+          <a:bodyPr wrap="square" rtlCol="0" anchor="ctr">
+            <a:noAutofit/>
+          </a:bodyPr>
+          <a:lstStyle/>
+          <a:p>
+            <a:pPr algn="ctr"/>
+            <a:endParaRPr lang="en-US" dirty="0"/>
+          </a:p>
+        </p:txBody>
+      </p:sp>
+      <p:sp>
+        <p:nvSpPr>
+          <p:cNvPr id="20" name="Rectangle 19">
+            <a:extLst>
+              <a:ext uri="{FF2B5EF4-FFF2-40B4-BE49-F238E27FC236}">
+                <a16:creationId xmlns:a16="http://schemas.microsoft.com/office/drawing/2014/main" id="{8D71EDA1-87BF-4D5D-AB79-F346FD19278A}"/>
+              </a:ext>
+              <a:ext uri="{C183D7F6-B498-43B3-948B-1728B52AA6E4}">
+                <adec:decorative xmlns:adec="http://schemas.microsoft.com/office/drawing/2017/decorative" val="1"/>
+              </a:ext>
+            </a:extLst>
+          </p:cNvPr>
+          <p:cNvSpPr>
+            <a:spLocks noGrp="1" noRot="1" noChangeAspect="1" noMove="1" noResize="1" noEditPoints="1" noAdjustHandles="1" noChangeArrowheads="1" noChangeShapeType="1" noTextEdit="1"/>
+          </p:cNvSpPr>
+          <p:nvPr>
+            <p:extLst>
+              <p:ext uri="{386F3935-93C4-4BCD-93E2-E3B085C9AB24}">
+                <p16:designElem xmlns:p16="http://schemas.microsoft.com/office/powerpoint/2015/main" val="1"/>
+              </p:ext>
+            </p:extLst>
+          </p:nvPr>
+        </p:nvSpPr>
+        <p:spPr>
+          <a:xfrm rot="5400000" flipH="1">
+            <a:off x="-1410093" y="1399943"/>
+            <a:ext cx="6858003" cy="4037835"/>
+          </a:xfrm>
+          <a:prstGeom prst="rect">
+            <a:avLst/>
+          </a:prstGeom>
+          <a:gradFill>
+            <a:gsLst>
+              <a:gs pos="0">
+                <a:srgbClr val="000000">
+                  <a:alpha val="0"/>
+                </a:srgbClr>
+              </a:gs>
+              <a:gs pos="99000">
+                <a:schemeClr val="accent1">
+                  <a:lumMod val="60000"/>
+                  <a:lumOff val="40000"/>
+                  <a:alpha val="11000"/>
+                </a:schemeClr>
+              </a:gs>
+            </a:gsLst>
+            <a:lin ang="7200000" scaled="0"/>
+          </a:gradFill>
+          <a:ln>
+            <a:noFill/>
+          </a:ln>
+        </p:spPr>
+        <p:style>
+          <a:lnRef idx="2">
+            <a:schemeClr val="accent1">
+              <a:shade val="50000"/>
+            </a:schemeClr>
+          </a:lnRef>
+          <a:fillRef idx="1">
+            <a:schemeClr val="accent1"/>
+          </a:fillRef>
+          <a:effectRef idx="0">
+            <a:schemeClr val="accent1"/>
+          </a:effectRef>
+          <a:fontRef idx="minor">
+            <a:schemeClr val="lt1"/>
+          </a:fontRef>
+        </p:style>
+        <p:txBody>
+          <a:bodyPr rtlCol="0" anchor="ctr"/>
+          <a:lstStyle/>
+          <a:p>
+            <a:pPr algn="ctr"/>
+            <a:endParaRPr lang="en-US"/>
+          </a:p>
+        </p:txBody>
+      </p:sp>
+      <p:sp>
+        <p:nvSpPr>
+          <p:cNvPr id="2" name="Título 1">
+            <a:extLst>
+              <a:ext uri="{FF2B5EF4-FFF2-40B4-BE49-F238E27FC236}">
+                <a16:creationId xmlns:a16="http://schemas.microsoft.com/office/drawing/2014/main" id="{EC0A84B2-5BEA-6F79-FB4E-E3012A630833}"/>
+              </a:ext>
+            </a:extLst>
+          </p:cNvPr>
+          <p:cNvSpPr>
+            <a:spLocks noGrp="1"/>
+          </p:cNvSpPr>
+          <p:nvPr>
+            <p:ph type="title"/>
+          </p:nvPr>
+        </p:nvSpPr>
+        <p:spPr>
+          <a:xfrm>
+            <a:off x="466722" y="586855"/>
+            <a:ext cx="3201366" cy="3387497"/>
+          </a:xfrm>
+        </p:spPr>
+        <p:txBody>
+          <a:bodyPr anchor="b">
+            <a:normAutofit/>
+          </a:bodyPr>
+          <a:lstStyle/>
+          <a:p>
+            <a:pPr algn="r"/>
+            <a:r>
+              <a:rPr lang="es-ES_tradnl" sz="4000">
+                <a:solidFill>
+                  <a:srgbClr val="FFFFFF"/>
+                </a:solidFill>
+              </a:rPr>
+              <a:t>¿Qué es una MAC?</a:t>
+            </a:r>
+          </a:p>
+        </p:txBody>
+      </p:sp>
+      <mc:AlternateContent xmlns:mc="http://schemas.openxmlformats.org/markup-compatibility/2006">
+        <mc:Choice xmlns:a14="http://schemas.microsoft.com/office/drawing/2010/main" Requires="a14">
+          <p:sp>
+            <p:nvSpPr>
+              <p:cNvPr id="3" name="Marcador de contenido 2">
+                <a:extLst>
+                  <a:ext uri="{FF2B5EF4-FFF2-40B4-BE49-F238E27FC236}">
+                    <a16:creationId xmlns:a16="http://schemas.microsoft.com/office/drawing/2014/main" id="{DB01ACD8-B3D2-0750-AA1D-0E6D30B7BB1F}"/>
+                  </a:ext>
+                </a:extLst>
+              </p:cNvPr>
+              <p:cNvSpPr>
+                <a:spLocks noGrp="1"/>
+              </p:cNvSpPr>
+              <p:nvPr>
+                <p:ph idx="1"/>
+              </p:nvPr>
+            </p:nvSpPr>
+            <p:spPr>
+              <a:xfrm>
+                <a:off x="4810259" y="649480"/>
+                <a:ext cx="6555347" cy="5546047"/>
+              </a:xfrm>
+            </p:spPr>
+            <p:txBody>
+              <a:bodyPr anchor="ctr">
+                <a:normAutofit/>
+              </a:bodyPr>
+              <a:lstStyle/>
+              <a:p>
+                <a:pPr algn="just"/>
+                <a:r>
+                  <a:rPr lang="es-MX" sz="2000" dirty="0"/>
+                  <a:t>Un </a:t>
+                </a:r>
+                <a:r>
+                  <a:rPr lang="es-MX" sz="2000" b="1" dirty="0"/>
+                  <a:t>Código de Autenticación de Mensajes (MAC)</a:t>
+                </a:r>
+                <a:r>
+                  <a:rPr lang="es-MX" sz="2000" dirty="0"/>
+                  <a:t> es una función que toma como entrada un mensaje </a:t>
+                </a:r>
+                <a14:m>
+                  <m:oMath xmlns:m="http://schemas.openxmlformats.org/officeDocument/2006/math">
+                    <m:r>
+                      <a:rPr lang="es-ES" sz="2000" b="0" i="1">
+                        <a:latin typeface="Cambria Math" panose="02040503050406030204" pitchFamily="18" charset="0"/>
+                      </a:rPr>
+                      <m:t>𝑚</m:t>
+                    </m:r>
+                  </m:oMath>
+                </a14:m>
+                <a:r>
+                  <a:rPr lang="es-MX" sz="2000" dirty="0"/>
+                  <a:t> y una clave secreta </a:t>
+                </a:r>
+                <a14:m>
+                  <m:oMath xmlns:m="http://schemas.openxmlformats.org/officeDocument/2006/math">
+                    <m:r>
+                      <a:rPr lang="es-ES" sz="2000" b="0" i="1">
+                        <a:latin typeface="Cambria Math" panose="02040503050406030204" pitchFamily="18" charset="0"/>
+                      </a:rPr>
+                      <m:t>𝑘</m:t>
+                    </m:r>
+                  </m:oMath>
+                </a14:m>
+                <a:r>
+                  <a:rPr lang="es-MX" sz="2000" dirty="0"/>
+                  <a:t>, y genera un </a:t>
+                </a:r>
+                <a:r>
+                  <a:rPr lang="es-MX" sz="2000" b="1" dirty="0"/>
+                  <a:t>código de autenticación</a:t>
+                </a:r>
+                <a:r>
+                  <a:rPr lang="es-MX" sz="2000" dirty="0"/>
+                  <a:t> (o </a:t>
+                </a:r>
+                <a:r>
+                  <a:rPr lang="es-MX" sz="2000" b="1" dirty="0"/>
+                  <a:t>tag</a:t>
+                </a:r>
+                <a:r>
+                  <a:rPr lang="es-MX" sz="2000" dirty="0"/>
+                  <a:t>) </a:t>
+                </a:r>
+                <a14:m>
+                  <m:oMath xmlns:m="http://schemas.openxmlformats.org/officeDocument/2006/math">
+                    <m:r>
+                      <a:rPr lang="es-ES" sz="2000" b="0" i="1">
+                        <a:latin typeface="Cambria Math" panose="02040503050406030204" pitchFamily="18" charset="0"/>
+                      </a:rPr>
+                      <m:t>𝑇</m:t>
+                    </m:r>
+                  </m:oMath>
+                </a14:m>
+                <a:r>
+                  <a:rPr lang="es-MX" sz="2000" dirty="0"/>
+                  <a:t>, de manera que:</a:t>
+                </a:r>
+              </a:p>
+              <a:p>
+                <a:pPr marL="0" indent="0">
+                  <a:buNone/>
+                </a:pPr>
+                <a14:m>
+                  <m:oMathPara xmlns:m="http://schemas.openxmlformats.org/officeDocument/2006/math">
+                    <m:oMathParaPr>
+                      <m:jc m:val="centerGroup"/>
+                    </m:oMathParaPr>
+                    <m:oMath xmlns:m="http://schemas.openxmlformats.org/officeDocument/2006/math">
+                      <m:r>
+                        <a:rPr lang="es-ES" sz="2000" b="0" i="1">
+                          <a:latin typeface="Cambria Math" panose="02040503050406030204" pitchFamily="18" charset="0"/>
+                        </a:rPr>
+                        <m:t>𝑇</m:t>
+                      </m:r>
+                      <m:r>
+                        <a:rPr lang="es-ES" sz="2000" b="0" i="1">
+                          <a:latin typeface="Cambria Math" panose="02040503050406030204" pitchFamily="18" charset="0"/>
+                        </a:rPr>
+                        <m:t>=</m:t>
+                      </m:r>
+                      <m:sSub>
+                        <m:sSubPr>
+                          <m:ctrlPr>
+                            <a:rPr lang="es-ES" sz="2000" b="0" i="1">
+                              <a:latin typeface="Cambria Math" panose="02040503050406030204" pitchFamily="18" charset="0"/>
+                            </a:rPr>
+                          </m:ctrlPr>
+                        </m:sSubPr>
+                        <m:e>
+                          <m:r>
+                            <a:rPr lang="es-ES" sz="2000" b="0" i="1">
+                              <a:latin typeface="Cambria Math" panose="02040503050406030204" pitchFamily="18" charset="0"/>
+                            </a:rPr>
+                            <m:t>𝑀𝐴𝐶</m:t>
+                          </m:r>
+                        </m:e>
+                        <m:sub>
+                          <m:r>
+                            <a:rPr lang="es-ES" sz="2000" b="0" i="1">
+                              <a:latin typeface="Cambria Math" panose="02040503050406030204" pitchFamily="18" charset="0"/>
+                            </a:rPr>
+                            <m:t>𝑘</m:t>
+                          </m:r>
+                        </m:sub>
+                      </m:sSub>
+                      <m:r>
+                        <a:rPr lang="es-ES" sz="2000" b="0" i="1">
+                          <a:latin typeface="Cambria Math" panose="02040503050406030204" pitchFamily="18" charset="0"/>
+                        </a:rPr>
+                        <m:t>(</m:t>
+                      </m:r>
+                      <m:r>
+                        <a:rPr lang="es-ES" sz="2000" b="0" i="1">
+                          <a:latin typeface="Cambria Math" panose="02040503050406030204" pitchFamily="18" charset="0"/>
+                        </a:rPr>
+                        <m:t>𝑚</m:t>
+                      </m:r>
+                      <m:r>
+                        <a:rPr lang="es-ES" sz="2000" b="0" i="1">
+                          <a:latin typeface="Cambria Math" panose="02040503050406030204" pitchFamily="18" charset="0"/>
+                        </a:rPr>
+                        <m:t>)</m:t>
+                      </m:r>
+                    </m:oMath>
+                  </m:oMathPara>
+                </a14:m>
+                <a:endParaRPr lang="es-ES_tradnl" sz="2000" dirty="0"/>
+              </a:p>
+              <a:p>
+                <a:r>
+                  <a:rPr lang="es-ES_tradnl" sz="2000" dirty="0"/>
+                  <a:t>Algunas MAC están basadas en funciones hash.</a:t>
+                </a:r>
+              </a:p>
+            </p:txBody>
+          </p:sp>
+        </mc:Choice>
+        <mc:Fallback>
+          <p:sp>
+            <p:nvSpPr>
+              <p:cNvPr id="3" name="Marcador de contenido 2">
+                <a:extLst>
+                  <a:ext uri="{FF2B5EF4-FFF2-40B4-BE49-F238E27FC236}">
+                    <a16:creationId xmlns:a16="http://schemas.microsoft.com/office/drawing/2014/main" id="{DB01ACD8-B3D2-0750-AA1D-0E6D30B7BB1F}"/>
+                  </a:ext>
+                </a:extLst>
+              </p:cNvPr>
+              <p:cNvSpPr>
+                <a:spLocks noGrp="1" noRot="1" noChangeAspect="1" noMove="1" noResize="1" noEditPoints="1" noAdjustHandles="1" noChangeArrowheads="1" noChangeShapeType="1" noTextEdit="1"/>
+              </p:cNvSpPr>
+              <p:nvPr>
+                <p:ph idx="1"/>
+              </p:nvPr>
+            </p:nvSpPr>
+            <p:spPr>
+              <a:xfrm>
+                <a:off x="4810259" y="649480"/>
+                <a:ext cx="6555347" cy="5546047"/>
+              </a:xfrm>
+              <a:blipFill>
+                <a:blip r:embed="rId2"/>
+                <a:stretch>
+                  <a:fillRect l="-774" r="-1161"/>
+                </a:stretch>
+              </a:blipFill>
+            </p:spPr>
+            <p:txBody>
+              <a:bodyPr/>
+              <a:lstStyle/>
+              <a:p>
+                <a:r>
+                  <a:rPr lang="es-ES_tradnl">
+                    <a:noFill/>
+                  </a:rPr>
+                  <a:t> </a:t>
+                </a:r>
+              </a:p>
+            </p:txBody>
+          </p:sp>
+        </mc:Fallback>
+      </mc:AlternateContent>
+    </p:spTree>
+    <p:extLst>
+      <p:ext uri="{BB962C8B-B14F-4D97-AF65-F5344CB8AC3E}">
+        <p14:creationId xmlns:p14="http://schemas.microsoft.com/office/powerpoint/2010/main" val="538584781"/>
+      </p:ext>
+    </p:extLst>
+  </p:cSld>
+  <p:clrMapOvr>
+    <a:masterClrMapping/>
+  </p:clrMapOvr>
+</p:sld>
+</file>
+
+<file path=ppt/slides/slide7.xml><?xml version="1.0" encoding="utf-8"?>
+<p:sld xmlns:a="http://schemas.openxmlformats.org/drawingml/2006/main" xmlns:r="http://schemas.openxmlformats.org/officeDocument/2006/relationships" xmlns:p="http://schemas.openxmlformats.org/presentationml/2006/main">
+  <p:cSld>
+    <p:bg>
+      <p:bgPr>
+        <a:solidFill>
+          <a:schemeClr val="bg1"/>
+        </a:solidFill>
+        <a:effectLst/>
+      </p:bgPr>
+    </p:bg>
+    <p:spTree>
+      <p:nvGrpSpPr>
+        <p:cNvPr id="1" name=""/>
+        <p:cNvGrpSpPr/>
+        <p:nvPr/>
+      </p:nvGrpSpPr>
+      <p:grpSpPr>
+        <a:xfrm>
+          <a:off x="0" y="0"/>
+          <a:ext cx="0" cy="0"/>
+          <a:chOff x="0" y="0"/>
+          <a:chExt cx="0" cy="0"/>
+        </a:xfrm>
+      </p:grpSpPr>
+      <p:sp useBgFill="1">
+        <p:nvSpPr>
+          <p:cNvPr id="8" name="Rectangle 7">
+            <a:extLst>
+              <a:ext uri="{FF2B5EF4-FFF2-40B4-BE49-F238E27FC236}">
+                <a16:creationId xmlns:a16="http://schemas.microsoft.com/office/drawing/2014/main" id="{DEE2AD96-B495-4E06-9291-B71706F728CB}"/>
+              </a:ext>
+              <a:ext uri="{C183D7F6-B498-43B3-948B-1728B52AA6E4}">
+                <adec:decorative xmlns:adec="http://schemas.microsoft.com/office/drawing/2017/decorative" val="1"/>
+              </a:ext>
+            </a:extLst>
+          </p:cNvPr>
+          <p:cNvSpPr>
+            <a:spLocks noGrp="1" noRot="1" noChangeAspect="1" noMove="1" noResize="1" noEditPoints="1" noAdjustHandles="1" noChangeArrowheads="1" noChangeShapeType="1" noTextEdit="1"/>
+          </p:cNvSpPr>
+          <p:nvPr>
+            <p:extLst>
+              <p:ext uri="{386F3935-93C4-4BCD-93E2-E3B085C9AB24}">
+                <p16:designElem xmlns:p16="http://schemas.microsoft.com/office/powerpoint/2015/main" val="1"/>
+              </p:ext>
+            </p:extLst>
+          </p:nvPr>
+        </p:nvSpPr>
+        <p:spPr>
+          <a:xfrm>
+            <a:off x="0" y="0"/>
+            <a:ext cx="12192000" cy="6858000"/>
+          </a:xfrm>
+          <a:prstGeom prst="rect">
+            <a:avLst/>
+          </a:prstGeom>
+          <a:ln w="12700" cap="flat" cmpd="sng" algn="ctr">
+            <a:noFill/>
+            <a:prstDash val="solid"/>
+            <a:miter lim="800000"/>
+          </a:ln>
+          <a:effectLst/>
+          <a:extLst>
+            <a:ext uri="{91240B29-F687-4F45-9708-019B960494DF}">
+              <a14:hiddenLine xmlns:a14="http://schemas.microsoft.com/office/drawing/2010/main" w="12700" cap="flat" cmpd="sng" algn="ctr">
+                <a:solidFill>
+                  <a:schemeClr val="accent1">
+                    <a:shade val="50000"/>
+                  </a:schemeClr>
+                </a:solidFill>
+                <a:prstDash val="solid"/>
+                <a:miter lim="800000"/>
+              </a14:hiddenLine>
+            </a:ext>
+          </a:extLst>
+        </p:spPr>
+        <p:style>
+          <a:lnRef idx="2">
+            <a:schemeClr val="accent1">
+              <a:shade val="50000"/>
+            </a:schemeClr>
+          </a:lnRef>
+          <a:fillRef idx="1">
+            <a:schemeClr val="accent1"/>
+          </a:fillRef>
+          <a:effectRef idx="0">
+            <a:schemeClr val="accent1"/>
+          </a:effectRef>
+          <a:fontRef idx="minor">
+            <a:schemeClr val="lt1"/>
+          </a:fontRef>
+        </p:style>
+        <p:txBody>
+          <a:bodyPr rtlCol="0" anchor="ctr"/>
+          <a:lstStyle/>
+          <a:p>
+            <a:pPr algn="ctr"/>
+            <a:endParaRPr lang="en-US"/>
+          </a:p>
+        </p:txBody>
+      </p:sp>
+      <p:sp>
+        <p:nvSpPr>
+          <p:cNvPr id="10" name="Rectangle 9">
+            <a:extLst>
+              <a:ext uri="{FF2B5EF4-FFF2-40B4-BE49-F238E27FC236}">
+                <a16:creationId xmlns:a16="http://schemas.microsoft.com/office/drawing/2014/main" id="{53CF6D67-C5A8-4ADD-9E8E-1E38CA1D3166}"/>
+              </a:ext>
+              <a:ext uri="{C183D7F6-B498-43B3-948B-1728B52AA6E4}">
+                <adec:decorative xmlns:adec="http://schemas.microsoft.com/office/drawing/2017/decorative" val="1"/>
+              </a:ext>
+            </a:extLst>
+          </p:cNvPr>
+          <p:cNvSpPr>
+            <a:spLocks noGrp="1" noRot="1" noChangeAspect="1" noMove="1" noResize="1" noEditPoints="1" noAdjustHandles="1" noChangeArrowheads="1" noChangeShapeType="1" noTextEdit="1"/>
+          </p:cNvSpPr>
+          <p:nvPr>
+            <p:extLst>
+              <p:ext uri="{386F3935-93C4-4BCD-93E2-E3B085C9AB24}">
+                <p16:designElem xmlns:p16="http://schemas.microsoft.com/office/powerpoint/2015/main" val="1"/>
+              </p:ext>
+            </p:extLst>
+          </p:nvPr>
+        </p:nvSpPr>
+        <p:spPr>
+          <a:xfrm rot="5400000" flipH="1">
+            <a:off x="-638515" y="639280"/>
+            <a:ext cx="6858000" cy="5579440"/>
+          </a:xfrm>
+          <a:prstGeom prst="rect">
+            <a:avLst/>
+          </a:prstGeom>
+          <a:gradFill>
+            <a:gsLst>
+              <a:gs pos="8000">
+                <a:srgbClr val="000000"/>
+              </a:gs>
+              <a:gs pos="100000">
+                <a:schemeClr val="accent1">
+                  <a:lumMod val="75000"/>
+                </a:schemeClr>
+              </a:gs>
+            </a:gsLst>
+            <a:lin ang="3000000" scaled="0"/>
+          </a:gradFill>
+          <a:ln>
+            <a:noFill/>
+          </a:ln>
+        </p:spPr>
+        <p:style>
+          <a:lnRef idx="2">
+            <a:schemeClr val="accent1">
+              <a:shade val="50000"/>
+            </a:schemeClr>
+          </a:lnRef>
+          <a:fillRef idx="1">
+            <a:schemeClr val="accent1"/>
+          </a:fillRef>
+          <a:effectRef idx="0">
+            <a:schemeClr val="accent1"/>
+          </a:effectRef>
+          <a:fontRef idx="minor">
+            <a:schemeClr val="lt1"/>
+          </a:fontRef>
+        </p:style>
+        <p:txBody>
+          <a:bodyPr rtlCol="0" anchor="ctr"/>
+          <a:lstStyle/>
+          <a:p>
+            <a:pPr algn="ctr"/>
+            <a:endParaRPr lang="en-US"/>
+          </a:p>
+        </p:txBody>
+      </p:sp>
+      <p:sp>
+        <p:nvSpPr>
+          <p:cNvPr id="12" name="Rectangle 11">
+            <a:extLst>
+              <a:ext uri="{FF2B5EF4-FFF2-40B4-BE49-F238E27FC236}">
+                <a16:creationId xmlns:a16="http://schemas.microsoft.com/office/drawing/2014/main" id="{86909FA0-B515-4681-B7A8-FA281D133B94}"/>
+              </a:ext>
+              <a:ext uri="{C183D7F6-B498-43B3-948B-1728B52AA6E4}">
+                <adec:decorative xmlns:adec="http://schemas.microsoft.com/office/drawing/2017/decorative" val="1"/>
+              </a:ext>
+            </a:extLst>
+          </p:cNvPr>
+          <p:cNvSpPr>
+            <a:spLocks noGrp="1" noRot="1" noChangeAspect="1" noMove="1" noResize="1" noEditPoints="1" noAdjustHandles="1" noChangeArrowheads="1" noChangeShapeType="1" noTextEdit="1"/>
+          </p:cNvSpPr>
+          <p:nvPr>
+            <p:extLst>
+              <p:ext uri="{386F3935-93C4-4BCD-93E2-E3B085C9AB24}">
+                <p16:designElem xmlns:p16="http://schemas.microsoft.com/office/powerpoint/2015/main" val="1"/>
+              </p:ext>
+            </p:extLst>
+          </p:nvPr>
+        </p:nvSpPr>
+        <p:spPr>
+          <a:xfrm rot="5400000" flipH="1">
+            <a:off x="-393206" y="395206"/>
+            <a:ext cx="6346209" cy="5576080"/>
+          </a:xfrm>
+          <a:prstGeom prst="rect">
+            <a:avLst/>
+          </a:prstGeom>
+          <a:gradFill>
+            <a:gsLst>
+              <a:gs pos="0">
+                <a:srgbClr val="000000">
+                  <a:alpha val="0"/>
+                </a:srgbClr>
+              </a:gs>
+              <a:gs pos="99000">
+                <a:schemeClr val="accent1">
+                  <a:alpha val="0"/>
+                </a:schemeClr>
+              </a:gs>
+            </a:gsLst>
+            <a:lin ang="1800000" scaled="0"/>
+          </a:gradFill>
+          <a:ln>
+            <a:noFill/>
+          </a:ln>
+        </p:spPr>
+        <p:style>
+          <a:lnRef idx="2">
+            <a:schemeClr val="accent1">
+              <a:shade val="50000"/>
+            </a:schemeClr>
+          </a:lnRef>
+          <a:fillRef idx="1">
+            <a:schemeClr val="accent1"/>
+          </a:fillRef>
+          <a:effectRef idx="0">
+            <a:schemeClr val="accent1"/>
+          </a:effectRef>
+          <a:fontRef idx="minor">
+            <a:schemeClr val="lt1"/>
+          </a:fontRef>
+        </p:style>
+        <p:txBody>
+          <a:bodyPr rtlCol="0" anchor="ctr"/>
+          <a:lstStyle/>
+          <a:p>
+            <a:pPr algn="ctr"/>
+            <a:endParaRPr lang="en-US"/>
+          </a:p>
+        </p:txBody>
+      </p:sp>
+      <p:sp>
+        <p:nvSpPr>
+          <p:cNvPr id="14" name="Rectangle 13">
+            <a:extLst>
+              <a:ext uri="{FF2B5EF4-FFF2-40B4-BE49-F238E27FC236}">
+                <a16:creationId xmlns:a16="http://schemas.microsoft.com/office/drawing/2014/main" id="{21C9FE86-FCC3-4A31-AA1C-C882262B7FE7}"/>
+              </a:ext>
+              <a:ext uri="{C183D7F6-B498-43B3-948B-1728B52AA6E4}">
+                <adec:decorative xmlns:adec="http://schemas.microsoft.com/office/drawing/2017/decorative" val="1"/>
+              </a:ext>
+            </a:extLst>
+          </p:cNvPr>
+          <p:cNvSpPr>
+            <a:spLocks noGrp="1" noRot="1" noChangeAspect="1" noMove="1" noResize="1" noEditPoints="1" noAdjustHandles="1" noChangeArrowheads="1" noChangeShapeType="1" noTextEdit="1"/>
+          </p:cNvSpPr>
+          <p:nvPr>
+            <p:extLst>
+              <p:ext uri="{386F3935-93C4-4BCD-93E2-E3B085C9AB24}">
+                <p16:designElem xmlns:p16="http://schemas.microsoft.com/office/powerpoint/2015/main" val="1"/>
+              </p:ext>
+            </p:extLst>
+          </p:nvPr>
+        </p:nvSpPr>
+        <p:spPr>
+          <a:xfrm rot="5400000" flipH="1">
+            <a:off x="1528907" y="2818967"/>
+            <a:ext cx="2501979" cy="5576080"/>
+          </a:xfrm>
+          <a:prstGeom prst="rect">
+            <a:avLst/>
+          </a:prstGeom>
+          <a:gradFill>
+            <a:gsLst>
+              <a:gs pos="2000">
+                <a:schemeClr val="accent1">
+                  <a:alpha val="29000"/>
+                </a:schemeClr>
+              </a:gs>
+              <a:gs pos="100000">
+                <a:srgbClr val="000000">
+                  <a:alpha val="30000"/>
+                </a:srgbClr>
+              </a:gs>
+            </a:gsLst>
+            <a:lin ang="7800000" scaled="0"/>
+          </a:gradFill>
+          <a:ln>
+            <a:noFill/>
+          </a:ln>
+        </p:spPr>
+        <p:style>
+          <a:lnRef idx="2">
+            <a:schemeClr val="accent1">
+              <a:shade val="50000"/>
+            </a:schemeClr>
+          </a:lnRef>
+          <a:fillRef idx="1">
+            <a:schemeClr val="accent1"/>
+          </a:fillRef>
+          <a:effectRef idx="0">
+            <a:schemeClr val="accent1"/>
+          </a:effectRef>
+          <a:fontRef idx="minor">
+            <a:schemeClr val="lt1"/>
+          </a:fontRef>
+        </p:style>
+        <p:txBody>
+          <a:bodyPr rtlCol="0" anchor="ctr"/>
+          <a:lstStyle/>
+          <a:p>
+            <a:pPr algn="ctr"/>
+            <a:endParaRPr lang="en-US" dirty="0"/>
+          </a:p>
+        </p:txBody>
+      </p:sp>
+      <p:sp>
+        <p:nvSpPr>
+          <p:cNvPr id="16" name="Rectangle 15">
+            <a:extLst>
+              <a:ext uri="{FF2B5EF4-FFF2-40B4-BE49-F238E27FC236}">
+                <a16:creationId xmlns:a16="http://schemas.microsoft.com/office/drawing/2014/main" id="{7D96243B-ECED-4B71-8E06-AE9A285EAD20}"/>
+              </a:ext>
+              <a:ext uri="{C183D7F6-B498-43B3-948B-1728B52AA6E4}">
+                <adec:decorative xmlns:adec="http://schemas.microsoft.com/office/drawing/2017/decorative" val="1"/>
+              </a:ext>
+            </a:extLst>
+          </p:cNvPr>
+          <p:cNvSpPr>
+            <a:spLocks noGrp="1" noRot="1" noChangeAspect="1" noMove="1" noResize="1" noEditPoints="1" noAdjustHandles="1" noChangeArrowheads="1" noChangeShapeType="1" noTextEdit="1"/>
+          </p:cNvSpPr>
+          <p:nvPr>
+            <p:extLst>
+              <p:ext uri="{386F3935-93C4-4BCD-93E2-E3B085C9AB24}">
+                <p16:designElem xmlns:p16="http://schemas.microsoft.com/office/powerpoint/2015/main" val="1"/>
+              </p:ext>
+            </p:extLst>
+          </p:nvPr>
+        </p:nvSpPr>
+        <p:spPr>
+          <a:xfrm rot="5400000" flipH="1">
+            <a:off x="-425002" y="852793"/>
+            <a:ext cx="6858001" cy="5152412"/>
+          </a:xfrm>
+          <a:prstGeom prst="rect">
+            <a:avLst/>
+          </a:prstGeom>
+          <a:gradFill>
+            <a:gsLst>
+              <a:gs pos="0">
+                <a:srgbClr val="000000">
+                  <a:alpha val="0"/>
+                </a:srgbClr>
+              </a:gs>
+              <a:gs pos="99000">
+                <a:schemeClr val="accent1">
+                  <a:alpha val="11000"/>
+                </a:schemeClr>
+              </a:gs>
+            </a:gsLst>
+            <a:lin ang="7800000" scaled="0"/>
+          </a:gradFill>
+          <a:ln>
+            <a:noFill/>
+          </a:ln>
+        </p:spPr>
+        <p:style>
+          <a:lnRef idx="2">
+            <a:schemeClr val="accent1">
+              <a:shade val="50000"/>
+            </a:schemeClr>
+          </a:lnRef>
+          <a:fillRef idx="1">
+            <a:schemeClr val="accent1"/>
+          </a:fillRef>
+          <a:effectRef idx="0">
+            <a:schemeClr val="accent1"/>
+          </a:effectRef>
+          <a:fontRef idx="minor">
+            <a:schemeClr val="lt1"/>
+          </a:fontRef>
+        </p:style>
+        <p:txBody>
+          <a:bodyPr rtlCol="0" anchor="ctr"/>
+          <a:lstStyle/>
+          <a:p>
+            <a:pPr algn="ctr"/>
+            <a:endParaRPr lang="en-US"/>
+          </a:p>
+        </p:txBody>
+      </p:sp>
+      <p:sp>
+        <p:nvSpPr>
+          <p:cNvPr id="18" name="Oval 17">
+            <a:extLst>
+              <a:ext uri="{FF2B5EF4-FFF2-40B4-BE49-F238E27FC236}">
+                <a16:creationId xmlns:a16="http://schemas.microsoft.com/office/drawing/2014/main" id="{A09989E4-EFDC-4A90-A633-E0525FB4139E}"/>
+              </a:ext>
+              <a:ext uri="{C183D7F6-B498-43B3-948B-1728B52AA6E4}">
+                <adec:decorative xmlns:adec="http://schemas.microsoft.com/office/drawing/2017/decorative" val="1"/>
+              </a:ext>
+            </a:extLst>
+          </p:cNvPr>
+          <p:cNvSpPr>
+            <a:spLocks noGrp="1" noRot="1" noChangeAspect="1" noMove="1" noResize="1" noEditPoints="1" noAdjustHandles="1" noChangeArrowheads="1" noChangeShapeType="1" noTextEdit="1"/>
+          </p:cNvSpPr>
+          <p:nvPr>
+            <p:extLst>
+              <p:ext uri="{386F3935-93C4-4BCD-93E2-E3B085C9AB24}">
+                <p16:designElem xmlns:p16="http://schemas.microsoft.com/office/powerpoint/2015/main" val="1"/>
+              </p:ext>
+            </p:extLst>
+          </p:nvPr>
+        </p:nvSpPr>
+        <p:spPr>
+          <a:xfrm rot="6097846">
+            <a:off x="818753" y="1128497"/>
+            <a:ext cx="4318303" cy="4318303"/>
+          </a:xfrm>
+          <a:prstGeom prst="ellipse">
+            <a:avLst/>
+          </a:prstGeom>
+          <a:gradFill>
+            <a:gsLst>
+              <a:gs pos="39000">
+                <a:schemeClr val="accent1">
+                  <a:alpha val="0"/>
+                </a:schemeClr>
+              </a:gs>
+              <a:gs pos="100000">
+                <a:schemeClr val="accent1">
+                  <a:lumMod val="60000"/>
+                  <a:lumOff val="40000"/>
+                  <a:alpha val="15000"/>
+                </a:schemeClr>
+              </a:gs>
+            </a:gsLst>
+            <a:lin ang="17400000" scaled="0"/>
+          </a:gradFill>
+          <a:ln>
+            <a:noFill/>
+          </a:ln>
+        </p:spPr>
+        <p:style>
+          <a:lnRef idx="2">
+            <a:schemeClr val="accent1">
+              <a:shade val="50000"/>
+            </a:schemeClr>
+          </a:lnRef>
+          <a:fillRef idx="1">
+            <a:schemeClr val="accent1"/>
+          </a:fillRef>
+          <a:effectRef idx="0">
+            <a:schemeClr val="accent1"/>
+          </a:effectRef>
+          <a:fontRef idx="minor">
+            <a:schemeClr val="lt1"/>
+          </a:fontRef>
+        </p:style>
+        <p:txBody>
+          <a:bodyPr rtlCol="0" anchor="ctr"/>
+          <a:lstStyle/>
+          <a:p>
+            <a:pPr algn="ctr"/>
+            <a:endParaRPr lang="en-US" dirty="0"/>
+          </a:p>
+        </p:txBody>
+      </p:sp>
+      <p:sp>
+        <p:nvSpPr>
+          <p:cNvPr id="2" name="Título 1">
+            <a:extLst>
+              <a:ext uri="{FF2B5EF4-FFF2-40B4-BE49-F238E27FC236}">
+                <a16:creationId xmlns:a16="http://schemas.microsoft.com/office/drawing/2014/main" id="{B4D09C94-750B-4997-AB28-93DF78A24D92}"/>
+              </a:ext>
+            </a:extLst>
+          </p:cNvPr>
+          <p:cNvSpPr>
+            <a:spLocks noGrp="1"/>
+          </p:cNvSpPr>
+          <p:nvPr>
+            <p:ph type="title"/>
+          </p:nvPr>
+        </p:nvSpPr>
+        <p:spPr>
+          <a:xfrm>
+            <a:off x="826396" y="586855"/>
+            <a:ext cx="4230100" cy="3387497"/>
+          </a:xfrm>
+        </p:spPr>
+        <p:txBody>
+          <a:bodyPr anchor="b">
+            <a:normAutofit/>
+          </a:bodyPr>
+          <a:lstStyle/>
+          <a:p>
+            <a:pPr algn="r"/>
+            <a:r>
+              <a:rPr lang="es-ES_tradnl" sz="4000" dirty="0">
+                <a:solidFill>
+                  <a:srgbClr val="FFFFFF"/>
+                </a:solidFill>
+              </a:rPr>
+              <a:t>¿Qué es una MAC?</a:t>
+            </a:r>
+          </a:p>
+        </p:txBody>
+      </p:sp>
+      <mc:AlternateContent xmlns:mc="http://schemas.openxmlformats.org/markup-compatibility/2006">
+        <mc:Choice xmlns:a14="http://schemas.microsoft.com/office/drawing/2010/main" Requires="a14">
+          <p:sp>
+            <p:nvSpPr>
+              <p:cNvPr id="3" name="Marcador de contenido 2">
+                <a:extLst>
+                  <a:ext uri="{FF2B5EF4-FFF2-40B4-BE49-F238E27FC236}">
+                    <a16:creationId xmlns:a16="http://schemas.microsoft.com/office/drawing/2014/main" id="{759D0D58-7378-E7CB-CEFA-DD91FF544713}"/>
+                  </a:ext>
+                </a:extLst>
+              </p:cNvPr>
+              <p:cNvSpPr>
+                <a:spLocks noGrp="1"/>
+              </p:cNvSpPr>
+              <p:nvPr>
+                <p:ph idx="1"/>
+              </p:nvPr>
+            </p:nvSpPr>
+            <p:spPr>
+              <a:xfrm>
+                <a:off x="6503158" y="649480"/>
+                <a:ext cx="4862447" cy="5546047"/>
+              </a:xfrm>
+            </p:spPr>
+            <p:txBody>
+              <a:bodyPr anchor="ctr">
+                <a:normAutofit/>
+              </a:bodyPr>
+              <a:lstStyle/>
+              <a:p>
+                <a:pPr algn="just"/>
+                <a:r>
+                  <a:rPr lang="es-MX" sz="2000" dirty="0"/>
+                  <a:t>El objetivo de un MAC es garantizar </a:t>
+                </a:r>
+                <a:r>
+                  <a:rPr lang="es-MX" sz="2000" b="1" dirty="0"/>
+                  <a:t>la autenticidad y la integridad del mensaje</a:t>
+                </a:r>
+                <a:r>
+                  <a:rPr lang="es-MX" sz="2000" dirty="0"/>
+                  <a:t>, es decir:</a:t>
+                </a:r>
+              </a:p>
+              <a:p>
+                <a:pPr algn="just"/>
+                <a:r>
+                  <a:rPr lang="es-MX" sz="2000" b="1" dirty="0"/>
+                  <a:t>Autenticidad</a:t>
+                </a:r>
+                <a:r>
+                  <a:rPr lang="es-MX" sz="2000" dirty="0"/>
+                  <a:t>: Solo alguien que conoce la clave </a:t>
+                </a:r>
+                <a14:m>
+                  <m:oMath xmlns:m="http://schemas.openxmlformats.org/officeDocument/2006/math">
+                    <m:r>
+                      <a:rPr lang="es-ES" sz="2000" b="0" i="1">
+                        <a:latin typeface="Cambria Math" panose="02040503050406030204" pitchFamily="18" charset="0"/>
+                      </a:rPr>
+                      <m:t>𝑘</m:t>
+                    </m:r>
+                  </m:oMath>
+                </a14:m>
+                <a:r>
+                  <a:rPr lang="es-MX" sz="2000" dirty="0"/>
+                  <a:t> puede generar </a:t>
+                </a:r>
+                <a14:m>
+                  <m:oMath xmlns:m="http://schemas.openxmlformats.org/officeDocument/2006/math">
+                    <m:r>
+                      <a:rPr lang="es-ES" sz="2000" b="0" i="1">
+                        <a:latin typeface="Cambria Math" panose="02040503050406030204" pitchFamily="18" charset="0"/>
+                      </a:rPr>
+                      <m:t>𝑡</m:t>
+                    </m:r>
+                  </m:oMath>
+                </a14:m>
+                <a:r>
+                  <a:rPr lang="es-MX" sz="2000" dirty="0"/>
+                  <a:t>.</a:t>
+                </a:r>
+              </a:p>
+              <a:p>
+                <a:pPr algn="just">
+                  <a:buFont typeface="Arial" panose="020B0604020202020204" pitchFamily="34" charset="0"/>
+                  <a:buChar char="•"/>
+                </a:pPr>
+                <a:r>
+                  <a:rPr lang="es-MX" sz="2000" b="1" dirty="0"/>
+                  <a:t>Integridad</a:t>
+                </a:r>
+                <a:r>
+                  <a:rPr lang="es-MX" sz="2000" dirty="0"/>
+                  <a:t>: Si el mensaje es alterado, el MAC también cambia, y un receptor legítimo podrá detectar la modificación</a:t>
+                </a:r>
+              </a:p>
+              <a:p>
+                <a:endParaRPr lang="es-ES_tradnl" sz="2000" dirty="0"/>
+              </a:p>
+            </p:txBody>
+          </p:sp>
+        </mc:Choice>
+        <mc:Fallback>
+          <p:sp>
+            <p:nvSpPr>
+              <p:cNvPr id="3" name="Marcador de contenido 2">
+                <a:extLst>
+                  <a:ext uri="{FF2B5EF4-FFF2-40B4-BE49-F238E27FC236}">
+                    <a16:creationId xmlns:a16="http://schemas.microsoft.com/office/drawing/2014/main" id="{759D0D58-7378-E7CB-CEFA-DD91FF544713}"/>
+                  </a:ext>
+                </a:extLst>
+              </p:cNvPr>
+              <p:cNvSpPr>
+                <a:spLocks noGrp="1" noRot="1" noChangeAspect="1" noMove="1" noResize="1" noEditPoints="1" noAdjustHandles="1" noChangeArrowheads="1" noChangeShapeType="1" noTextEdit="1"/>
+              </p:cNvSpPr>
+              <p:nvPr>
+                <p:ph idx="1"/>
+              </p:nvPr>
+            </p:nvSpPr>
+            <p:spPr>
+              <a:xfrm>
+                <a:off x="6503158" y="649480"/>
+                <a:ext cx="4862447" cy="5546047"/>
+              </a:xfrm>
+              <a:blipFill>
+                <a:blip r:embed="rId2"/>
+                <a:stretch>
+                  <a:fillRect l="-1305" r="-1567"/>
+                </a:stretch>
+              </a:blipFill>
+            </p:spPr>
+            <p:txBody>
+              <a:bodyPr/>
+              <a:lstStyle/>
+              <a:p>
+                <a:r>
+                  <a:rPr lang="es-ES_tradnl">
+                    <a:noFill/>
+                  </a:rPr>
+                  <a:t> </a:t>
+                </a:r>
+              </a:p>
+            </p:txBody>
+          </p:sp>
+        </mc:Fallback>
+      </mc:AlternateContent>
+    </p:spTree>
+    <p:extLst>
+      <p:ext uri="{BB962C8B-B14F-4D97-AF65-F5344CB8AC3E}">
+        <p14:creationId xmlns:p14="http://schemas.microsoft.com/office/powerpoint/2010/main" val="1778153262"/>
+      </p:ext>
+    </p:extLst>
+  </p:cSld>
+  <p:clrMapOvr>
+    <a:masterClrMapping/>
+  </p:clrMapOvr>
+</p:sld>
+</file>
+
+<file path=ppt/slides/slide8.xml><?xml version="1.0" encoding="utf-8"?>
+<p:sld xmlns:a="http://schemas.openxmlformats.org/drawingml/2006/main" xmlns:r="http://schemas.openxmlformats.org/officeDocument/2006/relationships" xmlns:p="http://schemas.openxmlformats.org/presentationml/2006/main">
+  <p:cSld>
+    <p:bg>
+      <p:bgPr>
+        <a:solidFill>
+          <a:schemeClr val="bg1"/>
+        </a:solidFill>
+        <a:effectLst/>
+      </p:bgPr>
+    </p:bg>
+    <p:spTree>
+      <p:nvGrpSpPr>
+        <p:cNvPr id="1" name=""/>
+        <p:cNvGrpSpPr/>
+        <p:nvPr/>
+      </p:nvGrpSpPr>
+      <p:grpSpPr>
+        <a:xfrm>
+          <a:off x="0" y="0"/>
+          <a:ext cx="0" cy="0"/>
+          <a:chOff x="0" y="0"/>
+          <a:chExt cx="0" cy="0"/>
+        </a:xfrm>
+      </p:grpSpPr>
       <p:sp>
         <p:nvSpPr>
           <p:cNvPr id="21" name="Rectangle 9">
@@ -22030,7 +25051,7 @@
 </p:sld>
 </file>
 
-<file path=ppt/slides/slide7.xml><?xml version="1.0" encoding="utf-8"?>
+<file path=ppt/slides/slide9.xml><?xml version="1.0" encoding="utf-8"?>
 <p:sld xmlns:a="http://schemas.openxmlformats.org/drawingml/2006/main" xmlns:r="http://schemas.openxmlformats.org/officeDocument/2006/relationships" xmlns:p="http://schemas.openxmlformats.org/presentationml/2006/main">
   <p:cSld>
     <p:bg>
@@ -22432,851 +25453,6 @@
     <p:extLst>
       <p:ext uri="{BB962C8B-B14F-4D97-AF65-F5344CB8AC3E}">
         <p14:creationId xmlns:p14="http://schemas.microsoft.com/office/powerpoint/2010/main" val="3958970624"/>
-      </p:ext>
-    </p:extLst>
-  </p:cSld>
-  <p:clrMapOvr>
-    <a:masterClrMapping/>
-  </p:clrMapOvr>
-</p:sld>
-</file>
-
-<file path=ppt/slides/slide8.xml><?xml version="1.0" encoding="utf-8"?>
-<p:sld xmlns:a="http://schemas.openxmlformats.org/drawingml/2006/main" xmlns:r="http://schemas.openxmlformats.org/officeDocument/2006/relationships" xmlns:p="http://schemas.openxmlformats.org/presentationml/2006/main">
-  <p:cSld>
-    <p:bg>
-      <p:bgPr>
-        <a:solidFill>
-          <a:schemeClr val="bg1"/>
-        </a:solidFill>
-        <a:effectLst/>
-      </p:bgPr>
-    </p:bg>
-    <p:spTree>
-      <p:nvGrpSpPr>
-        <p:cNvPr id="1" name=""/>
-        <p:cNvGrpSpPr/>
-        <p:nvPr/>
-      </p:nvGrpSpPr>
-      <p:grpSpPr>
-        <a:xfrm>
-          <a:off x="0" y="0"/>
-          <a:ext cx="0" cy="0"/>
-          <a:chOff x="0" y="0"/>
-          <a:chExt cx="0" cy="0"/>
-        </a:xfrm>
-      </p:grpSpPr>
-      <p:sp>
-        <p:nvSpPr>
-          <p:cNvPr id="10" name="Rectangle 9">
-            <a:extLst>
-              <a:ext uri="{FF2B5EF4-FFF2-40B4-BE49-F238E27FC236}">
-                <a16:creationId xmlns:a16="http://schemas.microsoft.com/office/drawing/2014/main" id="{A4AC5506-6312-4701-8D3C-40187889A947}"/>
-              </a:ext>
-              <a:ext uri="{C183D7F6-B498-43B3-948B-1728B52AA6E4}">
-                <adec:decorative xmlns:adec="http://schemas.microsoft.com/office/drawing/2017/decorative" val="1"/>
-              </a:ext>
-            </a:extLst>
-          </p:cNvPr>
-          <p:cNvSpPr>
-            <a:spLocks noGrp="1" noRot="1" noChangeAspect="1" noMove="1" noResize="1" noEditPoints="1" noAdjustHandles="1" noChangeArrowheads="1" noChangeShapeType="1" noTextEdit="1"/>
-          </p:cNvSpPr>
-          <p:nvPr>
-            <p:extLst>
-              <p:ext uri="{386F3935-93C4-4BCD-93E2-E3B085C9AB24}">
-                <p16:designElem xmlns:p16="http://schemas.microsoft.com/office/powerpoint/2015/main" val="1"/>
-              </p:ext>
-            </p:extLst>
-          </p:nvPr>
-        </p:nvSpPr>
-        <p:spPr>
-          <a:xfrm>
-            <a:off x="0" y="651752"/>
-            <a:ext cx="12192000" cy="736551"/>
-          </a:xfrm>
-          <a:prstGeom prst="rect">
-            <a:avLst/>
-          </a:prstGeom>
-          <a:solidFill>
-            <a:schemeClr val="tx1"/>
-          </a:solidFill>
-          <a:ln>
-            <a:noFill/>
-          </a:ln>
-        </p:spPr>
-        <p:style>
-          <a:lnRef idx="2">
-            <a:schemeClr val="accent1">
-              <a:shade val="50000"/>
-            </a:schemeClr>
-          </a:lnRef>
-          <a:fillRef idx="1">
-            <a:schemeClr val="accent1"/>
-          </a:fillRef>
-          <a:effectRef idx="0">
-            <a:schemeClr val="accent1"/>
-          </a:effectRef>
-          <a:fontRef idx="minor">
-            <a:schemeClr val="lt1"/>
-          </a:fontRef>
-        </p:style>
-        <p:txBody>
-          <a:bodyPr rtlCol="0" anchor="ctr"/>
-          <a:lstStyle/>
-          <a:p>
-            <a:pPr algn="ctr"/>
-            <a:endParaRPr lang="en-US"/>
-          </a:p>
-        </p:txBody>
-      </p:sp>
-      <p:sp>
-        <p:nvSpPr>
-          <p:cNvPr id="2" name="Título 1">
-            <a:extLst>
-              <a:ext uri="{FF2B5EF4-FFF2-40B4-BE49-F238E27FC236}">
-                <a16:creationId xmlns:a16="http://schemas.microsoft.com/office/drawing/2014/main" id="{C4C69ED3-5933-948E-91A4-2D31BCC70281}"/>
-              </a:ext>
-            </a:extLst>
-          </p:cNvPr>
-          <p:cNvSpPr>
-            <a:spLocks noGrp="1"/>
-          </p:cNvSpPr>
-          <p:nvPr>
-            <p:ph type="title"/>
-          </p:nvPr>
-        </p:nvSpPr>
-        <p:spPr>
-          <a:xfrm>
-            <a:off x="556532" y="643467"/>
-            <a:ext cx="11210925" cy="744836"/>
-          </a:xfrm>
-        </p:spPr>
-        <p:txBody>
-          <a:bodyPr vert="horz" lIns="91440" tIns="45720" rIns="91440" bIns="45720" rtlCol="0" anchor="ctr">
-            <a:normAutofit/>
-          </a:bodyPr>
-          <a:lstStyle/>
-          <a:p>
-            <a:pPr algn="ctr"/>
-            <a:r>
-              <a:rPr lang="en-US" sz="3200" kern="1200" dirty="0" err="1">
-                <a:solidFill>
-                  <a:schemeClr val="bg1"/>
-                </a:solidFill>
-                <a:latin typeface="+mj-lt"/>
-                <a:ea typeface="+mj-ea"/>
-                <a:cs typeface="+mj-cs"/>
-              </a:rPr>
-              <a:t>EliMAC</a:t>
-            </a:r>
-            <a:endParaRPr lang="en-US" sz="3200" kern="1200" dirty="0">
-              <a:solidFill>
-                <a:schemeClr val="bg1"/>
-              </a:solidFill>
-              <a:latin typeface="+mj-lt"/>
-              <a:ea typeface="+mj-ea"/>
-              <a:cs typeface="+mj-cs"/>
-            </a:endParaRPr>
-          </a:p>
-        </p:txBody>
-      </p:sp>
-      <p:pic>
-        <p:nvPicPr>
-          <p:cNvPr id="5" name="Marcador de contenido 4" descr="Interfaz de usuario gráfica, Aplicación&#10;&#10;El contenido generado por IA puede ser incorrecto.">
-            <a:extLst>
-              <a:ext uri="{FF2B5EF4-FFF2-40B4-BE49-F238E27FC236}">
-                <a16:creationId xmlns:a16="http://schemas.microsoft.com/office/drawing/2014/main" id="{BFFE29EA-D46F-2D05-263E-B7A9165EF25B}"/>
-              </a:ext>
-            </a:extLst>
-          </p:cNvPr>
-          <p:cNvPicPr>
-            <a:picLocks noGrp="1" noChangeAspect="1"/>
-          </p:cNvPicPr>
-          <p:nvPr>
-            <p:ph idx="1"/>
-          </p:nvPr>
-        </p:nvPicPr>
-        <p:blipFill>
-          <a:blip r:embed="rId2"/>
-          <a:stretch>
-            <a:fillRect/>
-          </a:stretch>
-        </p:blipFill>
-        <p:spPr>
-          <a:xfrm>
-            <a:off x="2172607" y="1675227"/>
-            <a:ext cx="7846785" cy="4394199"/>
-          </a:xfrm>
-          <a:prstGeom prst="rect">
-            <a:avLst/>
-          </a:prstGeom>
-        </p:spPr>
-      </p:pic>
-    </p:spTree>
-    <p:extLst>
-      <p:ext uri="{BB962C8B-B14F-4D97-AF65-F5344CB8AC3E}">
-        <p14:creationId xmlns:p14="http://schemas.microsoft.com/office/powerpoint/2010/main" val="4140415906"/>
-      </p:ext>
-    </p:extLst>
-  </p:cSld>
-  <p:clrMapOvr>
-    <a:masterClrMapping/>
-  </p:clrMapOvr>
-</p:sld>
-</file>
-
-<file path=ppt/slides/slide9.xml><?xml version="1.0" encoding="utf-8"?>
-<p:sld xmlns:a="http://schemas.openxmlformats.org/drawingml/2006/main" xmlns:r="http://schemas.openxmlformats.org/officeDocument/2006/relationships" xmlns:p="http://schemas.openxmlformats.org/presentationml/2006/main">
-  <p:cSld>
-    <p:bg>
-      <p:bgPr>
-        <a:solidFill>
-          <a:schemeClr val="bg1"/>
-        </a:solidFill>
-        <a:effectLst/>
-      </p:bgPr>
-    </p:bg>
-    <p:spTree>
-      <p:nvGrpSpPr>
-        <p:cNvPr id="1" name="">
-          <a:extLst>
-            <a:ext uri="{FF2B5EF4-FFF2-40B4-BE49-F238E27FC236}">
-              <a16:creationId xmlns:a16="http://schemas.microsoft.com/office/drawing/2014/main" id="{33396511-A091-F06A-3022-266DED0ED841}"/>
-            </a:ext>
-          </a:extLst>
-        </p:cNvPr>
-        <p:cNvGrpSpPr/>
-        <p:nvPr/>
-      </p:nvGrpSpPr>
-      <p:grpSpPr>
-        <a:xfrm>
-          <a:off x="0" y="0"/>
-          <a:ext cx="0" cy="0"/>
-          <a:chOff x="0" y="0"/>
-          <a:chExt cx="0" cy="0"/>
-        </a:xfrm>
-      </p:grpSpPr>
-      <p:sp useBgFill="1">
-        <p:nvSpPr>
-          <p:cNvPr id="9" name="Rectangle 8">
-            <a:extLst>
-              <a:ext uri="{FF2B5EF4-FFF2-40B4-BE49-F238E27FC236}">
-                <a16:creationId xmlns:a16="http://schemas.microsoft.com/office/drawing/2014/main" id="{BACC6370-2D7E-4714-9D71-7542949D7D5D}"/>
-              </a:ext>
-              <a:ext uri="{C183D7F6-B498-43B3-948B-1728B52AA6E4}">
-                <adec:decorative xmlns:adec="http://schemas.microsoft.com/office/drawing/2017/decorative" val="1"/>
-              </a:ext>
-            </a:extLst>
-          </p:cNvPr>
-          <p:cNvSpPr>
-            <a:spLocks noGrp="1" noRot="1" noChangeAspect="1" noMove="1" noResize="1" noEditPoints="1" noAdjustHandles="1" noChangeArrowheads="1" noChangeShapeType="1" noTextEdit="1"/>
-          </p:cNvSpPr>
-          <p:nvPr>
-            <p:extLst>
-              <p:ext uri="{386F3935-93C4-4BCD-93E2-E3B085C9AB24}">
-                <p16:designElem xmlns:p16="http://schemas.microsoft.com/office/powerpoint/2015/main" val="1"/>
-              </p:ext>
-            </p:extLst>
-          </p:nvPr>
-        </p:nvSpPr>
-        <p:spPr>
-          <a:xfrm>
-            <a:off x="0" y="0"/>
-            <a:ext cx="12192000" cy="6858000"/>
-          </a:xfrm>
-          <a:prstGeom prst="rect">
-            <a:avLst/>
-          </a:prstGeom>
-          <a:ln w="12700" cap="flat" cmpd="sng" algn="ctr">
-            <a:noFill/>
-            <a:prstDash val="solid"/>
-            <a:miter lim="800000"/>
-          </a:ln>
-          <a:effectLst/>
-          <a:extLst>
-            <a:ext uri="{91240B29-F687-4F45-9708-019B960494DF}">
-              <a14:hiddenLine xmlns:a14="http://schemas.microsoft.com/office/drawing/2010/main" w="12700" cap="flat" cmpd="sng" algn="ctr">
-                <a:solidFill>
-                  <a:schemeClr val="accent1">
-                    <a:shade val="50000"/>
-                  </a:schemeClr>
-                </a:solidFill>
-                <a:prstDash val="solid"/>
-                <a:miter lim="800000"/>
-              </a14:hiddenLine>
-            </a:ext>
-          </a:extLst>
-        </p:spPr>
-        <p:style>
-          <a:lnRef idx="2">
-            <a:schemeClr val="accent1">
-              <a:shade val="50000"/>
-            </a:schemeClr>
-          </a:lnRef>
-          <a:fillRef idx="1">
-            <a:schemeClr val="accent1"/>
-          </a:fillRef>
-          <a:effectRef idx="0">
-            <a:schemeClr val="accent1"/>
-          </a:effectRef>
-          <a:fontRef idx="minor">
-            <a:schemeClr val="lt1"/>
-          </a:fontRef>
-        </p:style>
-        <p:txBody>
-          <a:bodyPr rtlCol="0" anchor="ctr"/>
-          <a:lstStyle/>
-          <a:p>
-            <a:pPr algn="ctr"/>
-            <a:endParaRPr lang="en-US"/>
-          </a:p>
-        </p:txBody>
-      </p:sp>
-      <p:sp>
-        <p:nvSpPr>
-          <p:cNvPr id="11" name="Rectangle 10">
-            <a:extLst>
-              <a:ext uri="{FF2B5EF4-FFF2-40B4-BE49-F238E27FC236}">
-                <a16:creationId xmlns:a16="http://schemas.microsoft.com/office/drawing/2014/main" id="{256B2C21-A230-48C0-8DF1-C46611373C44}"/>
-              </a:ext>
-              <a:ext uri="{C183D7F6-B498-43B3-948B-1728B52AA6E4}">
-                <adec:decorative xmlns:adec="http://schemas.microsoft.com/office/drawing/2017/decorative" val="1"/>
-              </a:ext>
-            </a:extLst>
-          </p:cNvPr>
-          <p:cNvSpPr>
-            <a:spLocks noGrp="1" noRot="1" noChangeAspect="1" noMove="1" noResize="1" noEditPoints="1" noAdjustHandles="1" noChangeArrowheads="1" noChangeShapeType="1" noTextEdit="1"/>
-          </p:cNvSpPr>
-          <p:nvPr>
-            <p:extLst>
-              <p:ext uri="{386F3935-93C4-4BCD-93E2-E3B085C9AB24}">
-                <p16:designElem xmlns:p16="http://schemas.microsoft.com/office/powerpoint/2015/main" val="1"/>
-              </p:ext>
-            </p:extLst>
-          </p:nvPr>
-        </p:nvSpPr>
-        <p:spPr>
-          <a:xfrm rot="5400000" flipH="1">
-            <a:off x="-1410084" y="1410082"/>
-            <a:ext cx="6858000" cy="4037836"/>
-          </a:xfrm>
-          <a:prstGeom prst="rect">
-            <a:avLst/>
-          </a:prstGeom>
-          <a:gradFill>
-            <a:gsLst>
-              <a:gs pos="8000">
-                <a:srgbClr val="000000"/>
-              </a:gs>
-              <a:gs pos="100000">
-                <a:schemeClr val="accent1">
-                  <a:lumMod val="75000"/>
-                </a:schemeClr>
-              </a:gs>
-            </a:gsLst>
-            <a:lin ang="3000000" scaled="0"/>
-          </a:gradFill>
-          <a:ln>
-            <a:noFill/>
-          </a:ln>
-        </p:spPr>
-        <p:style>
-          <a:lnRef idx="2">
-            <a:schemeClr val="accent1">
-              <a:shade val="50000"/>
-            </a:schemeClr>
-          </a:lnRef>
-          <a:fillRef idx="1">
-            <a:schemeClr val="accent1"/>
-          </a:fillRef>
-          <a:effectRef idx="0">
-            <a:schemeClr val="accent1"/>
-          </a:effectRef>
-          <a:fontRef idx="minor">
-            <a:schemeClr val="lt1"/>
-          </a:fontRef>
-        </p:style>
-        <p:txBody>
-          <a:bodyPr rtlCol="0" anchor="ctr"/>
-          <a:lstStyle/>
-          <a:p>
-            <a:pPr algn="ctr"/>
-            <a:endParaRPr lang="en-US"/>
-          </a:p>
-        </p:txBody>
-      </p:sp>
-      <p:sp>
-        <p:nvSpPr>
-          <p:cNvPr id="13" name="Rectangle 12">
-            <a:extLst>
-              <a:ext uri="{FF2B5EF4-FFF2-40B4-BE49-F238E27FC236}">
-                <a16:creationId xmlns:a16="http://schemas.microsoft.com/office/drawing/2014/main" id="{3847E18C-932D-4C95-AABA-FEC7C9499AD7}"/>
-              </a:ext>
-              <a:ext uri="{C183D7F6-B498-43B3-948B-1728B52AA6E4}">
-                <adec:decorative xmlns:adec="http://schemas.microsoft.com/office/drawing/2017/decorative" val="1"/>
-              </a:ext>
-            </a:extLst>
-          </p:cNvPr>
-          <p:cNvSpPr>
-            <a:spLocks noGrp="1" noRot="1" noChangeAspect="1" noMove="1" noResize="1" noEditPoints="1" noAdjustHandles="1" noChangeArrowheads="1" noChangeShapeType="1" noTextEdit="1"/>
-          </p:cNvSpPr>
-          <p:nvPr>
-            <p:extLst>
-              <p:ext uri="{386F3935-93C4-4BCD-93E2-E3B085C9AB24}">
-                <p16:designElem xmlns:p16="http://schemas.microsoft.com/office/powerpoint/2015/main" val="1"/>
-              </p:ext>
-            </p:extLst>
-          </p:nvPr>
-        </p:nvSpPr>
-        <p:spPr>
-          <a:xfrm rot="5400000" flipH="1">
-            <a:off x="-1410085" y="1420219"/>
-            <a:ext cx="6857999" cy="4037839"/>
-          </a:xfrm>
-          <a:prstGeom prst="rect">
-            <a:avLst/>
-          </a:prstGeom>
-          <a:gradFill>
-            <a:gsLst>
-              <a:gs pos="0">
-                <a:srgbClr val="000000">
-                  <a:alpha val="0"/>
-                </a:srgbClr>
-              </a:gs>
-              <a:gs pos="99000">
-                <a:schemeClr val="accent1">
-                  <a:alpha val="46000"/>
-                </a:schemeClr>
-              </a:gs>
-            </a:gsLst>
-            <a:lin ang="1800000" scaled="0"/>
-          </a:gradFill>
-          <a:ln>
-            <a:noFill/>
-          </a:ln>
-        </p:spPr>
-        <p:style>
-          <a:lnRef idx="2">
-            <a:schemeClr val="accent1">
-              <a:shade val="50000"/>
-            </a:schemeClr>
-          </a:lnRef>
-          <a:fillRef idx="1">
-            <a:schemeClr val="accent1"/>
-          </a:fillRef>
-          <a:effectRef idx="0">
-            <a:schemeClr val="accent1"/>
-          </a:effectRef>
-          <a:fontRef idx="minor">
-            <a:schemeClr val="lt1"/>
-          </a:fontRef>
-        </p:style>
-        <p:txBody>
-          <a:bodyPr rtlCol="0" anchor="ctr"/>
-          <a:lstStyle/>
-          <a:p>
-            <a:pPr algn="ctr"/>
-            <a:endParaRPr lang="en-US"/>
-          </a:p>
-        </p:txBody>
-      </p:sp>
-      <p:sp>
-        <p:nvSpPr>
-          <p:cNvPr id="15" name="Rectangle 14">
-            <a:extLst>
-              <a:ext uri="{FF2B5EF4-FFF2-40B4-BE49-F238E27FC236}">
-                <a16:creationId xmlns:a16="http://schemas.microsoft.com/office/drawing/2014/main" id="{3150CB11-0C61-439E-910F-5787759E72A0}"/>
-              </a:ext>
-              <a:ext uri="{C183D7F6-B498-43B3-948B-1728B52AA6E4}">
-                <adec:decorative xmlns:adec="http://schemas.microsoft.com/office/drawing/2017/decorative" val="1"/>
-              </a:ext>
-            </a:extLst>
-          </p:cNvPr>
-          <p:cNvSpPr>
-            <a:spLocks noGrp="1" noRot="1" noChangeAspect="1" noMove="1" noResize="1" noEditPoints="1" noAdjustHandles="1" noChangeArrowheads="1" noChangeShapeType="1" noTextEdit="1"/>
-          </p:cNvSpPr>
-          <p:nvPr>
-            <p:extLst>
-              <p:ext uri="{386F3935-93C4-4BCD-93E2-E3B085C9AB24}">
-                <p16:designElem xmlns:p16="http://schemas.microsoft.com/office/powerpoint/2015/main" val="1"/>
-              </p:ext>
-            </p:extLst>
-          </p:nvPr>
-        </p:nvSpPr>
-        <p:spPr>
-          <a:xfrm rot="5400000" flipH="1">
-            <a:off x="767923" y="3588085"/>
-            <a:ext cx="2501979" cy="4037841"/>
-          </a:xfrm>
-          <a:prstGeom prst="rect">
-            <a:avLst/>
-          </a:prstGeom>
-          <a:gradFill>
-            <a:gsLst>
-              <a:gs pos="2000">
-                <a:schemeClr val="accent1">
-                  <a:alpha val="29000"/>
-                </a:schemeClr>
-              </a:gs>
-              <a:gs pos="100000">
-                <a:srgbClr val="000000">
-                  <a:alpha val="30000"/>
-                </a:srgbClr>
-              </a:gs>
-            </a:gsLst>
-            <a:lin ang="7800000" scaled="0"/>
-          </a:gradFill>
-          <a:ln>
-            <a:noFill/>
-          </a:ln>
-        </p:spPr>
-        <p:style>
-          <a:lnRef idx="2">
-            <a:schemeClr val="accent1">
-              <a:shade val="50000"/>
-            </a:schemeClr>
-          </a:lnRef>
-          <a:fillRef idx="1">
-            <a:schemeClr val="accent1"/>
-          </a:fillRef>
-          <a:effectRef idx="0">
-            <a:schemeClr val="accent1"/>
-          </a:effectRef>
-          <a:fontRef idx="minor">
-            <a:schemeClr val="lt1"/>
-          </a:fontRef>
-        </p:style>
-        <p:txBody>
-          <a:bodyPr rtlCol="0" anchor="ctr"/>
-          <a:lstStyle/>
-          <a:p>
-            <a:pPr algn="ctr"/>
-            <a:endParaRPr lang="en-US" dirty="0"/>
-          </a:p>
-        </p:txBody>
-      </p:sp>
-      <p:sp>
-        <p:nvSpPr>
-          <p:cNvPr id="17" name="Freeform: Shape 16">
-            <a:extLst>
-              <a:ext uri="{FF2B5EF4-FFF2-40B4-BE49-F238E27FC236}">
-                <a16:creationId xmlns:a16="http://schemas.microsoft.com/office/drawing/2014/main" id="{43F8A58B-5155-44CE-A5FF-7647B47D0A7A}"/>
-              </a:ext>
-              <a:ext uri="{C183D7F6-B498-43B3-948B-1728B52AA6E4}">
-                <adec:decorative xmlns:adec="http://schemas.microsoft.com/office/drawing/2017/decorative" val="1"/>
-              </a:ext>
-            </a:extLst>
-          </p:cNvPr>
-          <p:cNvSpPr>
-            <a:spLocks noGrp="1" noRot="1" noChangeAspect="1" noMove="1" noResize="1" noEditPoints="1" noAdjustHandles="1" noChangeArrowheads="1" noChangeShapeType="1" noTextEdit="1"/>
-          </p:cNvSpPr>
-          <p:nvPr>
-            <p:extLst>
-              <p:ext uri="{386F3935-93C4-4BCD-93E2-E3B085C9AB24}">
-                <p16:designElem xmlns:p16="http://schemas.microsoft.com/office/powerpoint/2015/main" val="1"/>
-              </p:ext>
-            </p:extLst>
-          </p:nvPr>
-        </p:nvSpPr>
-        <p:spPr>
-          <a:xfrm rot="20635413">
-            <a:off x="-501737" y="969718"/>
-            <a:ext cx="3900357" cy="4178958"/>
-          </a:xfrm>
-          <a:custGeom>
-            <a:avLst/>
-            <a:gdLst>
-              <a:gd name="connsiteX0" fmla="*/ 2432225 w 3900357"/>
-              <a:gd name="connsiteY0" fmla="*/ 93939 h 4178958"/>
-              <a:gd name="connsiteX1" fmla="*/ 3900357 w 3900357"/>
-              <a:gd name="connsiteY1" fmla="*/ 2089479 h 4178958"/>
-              <a:gd name="connsiteX2" fmla="*/ 1810878 w 3900357"/>
-              <a:gd name="connsiteY2" fmla="*/ 4178958 h 4178958"/>
-              <a:gd name="connsiteX3" fmla="*/ 78249 w 3900357"/>
-              <a:gd name="connsiteY3" fmla="*/ 3257727 h 4178958"/>
-              <a:gd name="connsiteX4" fmla="*/ 0 w 3900357"/>
-              <a:gd name="connsiteY4" fmla="*/ 3128923 h 4178958"/>
-              <a:gd name="connsiteX5" fmla="*/ 831324 w 3900357"/>
-              <a:gd name="connsiteY5" fmla="*/ 244281 h 4178958"/>
-              <a:gd name="connsiteX6" fmla="*/ 997559 w 3900357"/>
-              <a:gd name="connsiteY6" fmla="*/ 164202 h 4178958"/>
-              <a:gd name="connsiteX7" fmla="*/ 1810878 w 3900357"/>
-              <a:gd name="connsiteY7" fmla="*/ 0 h 4178958"/>
-              <a:gd name="connsiteX8" fmla="*/ 2432225 w 3900357"/>
-              <a:gd name="connsiteY8" fmla="*/ 93939 h 4178958"/>
-            </a:gdLst>
-            <a:ahLst/>
-            <a:cxnLst>
-              <a:cxn ang="0">
-                <a:pos x="connsiteX0" y="connsiteY0"/>
-              </a:cxn>
-              <a:cxn ang="0">
-                <a:pos x="connsiteX1" y="connsiteY1"/>
-              </a:cxn>
-              <a:cxn ang="0">
-                <a:pos x="connsiteX2" y="connsiteY2"/>
-              </a:cxn>
-              <a:cxn ang="0">
-                <a:pos x="connsiteX3" y="connsiteY3"/>
-              </a:cxn>
-              <a:cxn ang="0">
-                <a:pos x="connsiteX4" y="connsiteY4"/>
-              </a:cxn>
-              <a:cxn ang="0">
-                <a:pos x="connsiteX5" y="connsiteY5"/>
-              </a:cxn>
-              <a:cxn ang="0">
-                <a:pos x="connsiteX6" y="connsiteY6"/>
-              </a:cxn>
-              <a:cxn ang="0">
-                <a:pos x="connsiteX7" y="connsiteY7"/>
-              </a:cxn>
-              <a:cxn ang="0">
-                <a:pos x="connsiteX8" y="connsiteY8"/>
-              </a:cxn>
-            </a:cxnLst>
-            <a:rect l="l" t="t" r="r" b="b"/>
-            <a:pathLst>
-              <a:path w="3900357" h="4178958">
-                <a:moveTo>
-                  <a:pt x="2432225" y="93939"/>
-                </a:moveTo>
-                <a:cubicBezTo>
-                  <a:pt x="3282786" y="358491"/>
-                  <a:pt x="3900357" y="1151865"/>
-                  <a:pt x="3900357" y="2089479"/>
-                </a:cubicBezTo>
-                <a:cubicBezTo>
-                  <a:pt x="3900357" y="3243466"/>
-                  <a:pt x="2964865" y="4178958"/>
-                  <a:pt x="1810878" y="4178958"/>
-                </a:cubicBezTo>
-                <a:cubicBezTo>
-                  <a:pt x="1089636" y="4178958"/>
-                  <a:pt x="453744" y="3813531"/>
-                  <a:pt x="78249" y="3257727"/>
-                </a:cubicBezTo>
-                <a:lnTo>
-                  <a:pt x="0" y="3128923"/>
-                </a:lnTo>
-                <a:lnTo>
-                  <a:pt x="831324" y="244281"/>
-                </a:lnTo>
-                <a:lnTo>
-                  <a:pt x="997559" y="164202"/>
-                </a:lnTo>
-                <a:cubicBezTo>
-                  <a:pt x="1247540" y="58468"/>
-                  <a:pt x="1522381" y="0"/>
-                  <a:pt x="1810878" y="0"/>
-                </a:cubicBezTo>
-                <a:cubicBezTo>
-                  <a:pt x="2027251" y="0"/>
-                  <a:pt x="2235942" y="32888"/>
-                  <a:pt x="2432225" y="93939"/>
-                </a:cubicBezTo>
-                <a:close/>
-              </a:path>
-            </a:pathLst>
-          </a:custGeom>
-          <a:gradFill>
-            <a:gsLst>
-              <a:gs pos="29000">
-                <a:srgbClr val="000000">
-                  <a:alpha val="0"/>
-                </a:srgbClr>
-              </a:gs>
-              <a:gs pos="100000">
-                <a:schemeClr val="accent1">
-                  <a:alpha val="43000"/>
-                </a:schemeClr>
-              </a:gs>
-            </a:gsLst>
-            <a:lin ang="1800000" scaled="0"/>
-          </a:gradFill>
-          <a:ln>
-            <a:noFill/>
-          </a:ln>
-        </p:spPr>
-        <p:style>
-          <a:lnRef idx="2">
-            <a:schemeClr val="accent1">
-              <a:shade val="50000"/>
-            </a:schemeClr>
-          </a:lnRef>
-          <a:fillRef idx="1">
-            <a:schemeClr val="accent1"/>
-          </a:fillRef>
-          <a:effectRef idx="0">
-            <a:schemeClr val="accent1"/>
-          </a:effectRef>
-          <a:fontRef idx="minor">
-            <a:schemeClr val="lt1"/>
-          </a:fontRef>
-        </p:style>
-        <p:txBody>
-          <a:bodyPr wrap="square" rtlCol="0" anchor="ctr">
-            <a:noAutofit/>
-          </a:bodyPr>
-          <a:lstStyle/>
-          <a:p>
-            <a:pPr algn="ctr"/>
-            <a:endParaRPr lang="en-US" dirty="0"/>
-          </a:p>
-        </p:txBody>
-      </p:sp>
-      <p:sp>
-        <p:nvSpPr>
-          <p:cNvPr id="19" name="Rectangle 18">
-            <a:extLst>
-              <a:ext uri="{FF2B5EF4-FFF2-40B4-BE49-F238E27FC236}">
-                <a16:creationId xmlns:a16="http://schemas.microsoft.com/office/drawing/2014/main" id="{443F2ACA-E6D6-4028-82DD-F03C262D5DE6}"/>
-              </a:ext>
-              <a:ext uri="{C183D7F6-B498-43B3-948B-1728B52AA6E4}">
-                <adec:decorative xmlns:adec="http://schemas.microsoft.com/office/drawing/2017/decorative" val="1"/>
-              </a:ext>
-            </a:extLst>
-          </p:cNvPr>
-          <p:cNvSpPr>
-            <a:spLocks noGrp="1" noRot="1" noChangeAspect="1" noMove="1" noResize="1" noEditPoints="1" noAdjustHandles="1" noChangeArrowheads="1" noChangeShapeType="1" noTextEdit="1"/>
-          </p:cNvSpPr>
-          <p:nvPr>
-            <p:extLst>
-              <p:ext uri="{386F3935-93C4-4BCD-93E2-E3B085C9AB24}">
-                <p16:designElem xmlns:p16="http://schemas.microsoft.com/office/powerpoint/2015/main" val="1"/>
-              </p:ext>
-            </p:extLst>
-          </p:nvPr>
-        </p:nvSpPr>
-        <p:spPr>
-          <a:xfrm rot="5400000" flipH="1">
-            <a:off x="-1410095" y="1410079"/>
-            <a:ext cx="6858003" cy="4037835"/>
-          </a:xfrm>
-          <a:prstGeom prst="rect">
-            <a:avLst/>
-          </a:prstGeom>
-          <a:gradFill>
-            <a:gsLst>
-              <a:gs pos="0">
-                <a:srgbClr val="000000">
-                  <a:alpha val="0"/>
-                </a:srgbClr>
-              </a:gs>
-              <a:gs pos="99000">
-                <a:schemeClr val="accent1">
-                  <a:lumMod val="60000"/>
-                  <a:lumOff val="40000"/>
-                  <a:alpha val="11000"/>
-                </a:schemeClr>
-              </a:gs>
-            </a:gsLst>
-            <a:lin ang="7200000" scaled="0"/>
-          </a:gradFill>
-          <a:ln>
-            <a:noFill/>
-          </a:ln>
-        </p:spPr>
-        <p:style>
-          <a:lnRef idx="2">
-            <a:schemeClr val="accent1">
-              <a:shade val="50000"/>
-            </a:schemeClr>
-          </a:lnRef>
-          <a:fillRef idx="1">
-            <a:schemeClr val="accent1"/>
-          </a:fillRef>
-          <a:effectRef idx="0">
-            <a:schemeClr val="accent1"/>
-          </a:effectRef>
-          <a:fontRef idx="minor">
-            <a:schemeClr val="lt1"/>
-          </a:fontRef>
-        </p:style>
-        <p:txBody>
-          <a:bodyPr rtlCol="0" anchor="ctr"/>
-          <a:lstStyle/>
-          <a:p>
-            <a:pPr algn="ctr"/>
-            <a:endParaRPr lang="en-US"/>
-          </a:p>
-        </p:txBody>
-      </p:sp>
-      <p:sp>
-        <p:nvSpPr>
-          <p:cNvPr id="2" name="Título 1">
-            <a:extLst>
-              <a:ext uri="{FF2B5EF4-FFF2-40B4-BE49-F238E27FC236}">
-                <a16:creationId xmlns:a16="http://schemas.microsoft.com/office/drawing/2014/main" id="{A5F6FF07-52C2-D06E-9BBD-9BAFC149E81D}"/>
-              </a:ext>
-            </a:extLst>
-          </p:cNvPr>
-          <p:cNvSpPr>
-            <a:spLocks noGrp="1"/>
-          </p:cNvSpPr>
-          <p:nvPr>
-            <p:ph type="title"/>
-          </p:nvPr>
-        </p:nvSpPr>
-        <p:spPr>
-          <a:xfrm>
-            <a:off x="586478" y="1683756"/>
-            <a:ext cx="3115265" cy="2396359"/>
-          </a:xfrm>
-        </p:spPr>
-        <p:txBody>
-          <a:bodyPr anchor="b">
-            <a:normAutofit/>
-          </a:bodyPr>
-          <a:lstStyle/>
-          <a:p>
-            <a:pPr algn="r"/>
-            <a:r>
-              <a:rPr lang="es-ES_tradnl" sz="4000">
-                <a:solidFill>
-                  <a:srgbClr val="FFFFFF"/>
-                </a:solidFill>
-              </a:rPr>
-              <a:t>EliMAC</a:t>
-            </a:r>
-          </a:p>
-        </p:txBody>
-      </p:sp>
-      <p:graphicFrame>
-        <p:nvGraphicFramePr>
-          <p:cNvPr id="5" name="Marcador de contenido 2">
-            <a:extLst>
-              <a:ext uri="{FF2B5EF4-FFF2-40B4-BE49-F238E27FC236}">
-                <a16:creationId xmlns:a16="http://schemas.microsoft.com/office/drawing/2014/main" id="{449AD929-EC7F-20D9-88E6-853118D0130D}"/>
-              </a:ext>
-            </a:extLst>
-          </p:cNvPr>
-          <p:cNvGraphicFramePr>
-            <a:graphicFrameLocks noGrp="1"/>
-          </p:cNvGraphicFramePr>
-          <p:nvPr>
-            <p:ph idx="1"/>
-            <p:extLst>
-              <p:ext uri="{D42A27DB-BD31-4B8C-83A1-F6EECF244321}">
-                <p14:modId xmlns:p14="http://schemas.microsoft.com/office/powerpoint/2010/main" val="1991769079"/>
-              </p:ext>
-            </p:extLst>
-          </p:nvPr>
-        </p:nvGraphicFramePr>
-        <p:xfrm>
-          <a:off x="4905052" y="750440"/>
-          <a:ext cx="6666833" cy="5453920"/>
-        </p:xfrm>
-        <a:graphic>
-          <a:graphicData uri="http://schemas.openxmlformats.org/drawingml/2006/diagram">
-            <dgm:relIds xmlns:dgm="http://schemas.openxmlformats.org/drawingml/2006/diagram" xmlns:r="http://schemas.openxmlformats.org/officeDocument/2006/relationships" r:dm="rId2" r:lo="rId3" r:qs="rId4" r:cs="rId5"/>
-          </a:graphicData>
-        </a:graphic>
-      </p:graphicFrame>
-    </p:spTree>
-    <p:extLst>
-      <p:ext uri="{BB962C8B-B14F-4D97-AF65-F5344CB8AC3E}">
-        <p14:creationId xmlns:p14="http://schemas.microsoft.com/office/powerpoint/2010/main" val="2451675773"/>
       </p:ext>
     </p:extLst>
   </p:cSld>

</xml_diff>

<commit_message>
añadi cambios a la presentacions
</commit_message>
<xml_diff>
--- a/presentacion cripto hash.pptx
+++ b/presentacion cripto hash.pptx
@@ -5,7 +5,7 @@
     <p:sldMasterId id="2147483648" r:id="rId1"/>
   </p:sldMasterIdLst>
   <p:notesMasterIdLst>
-    <p:notesMasterId r:id="rId30"/>
+    <p:notesMasterId r:id="rId29"/>
   </p:notesMasterIdLst>
   <p:sldIdLst>
     <p:sldId id="256" r:id="rId2"/>
@@ -24,18 +24,17 @@
     <p:sldId id="270" r:id="rId15"/>
     <p:sldId id="287" r:id="rId16"/>
     <p:sldId id="289" r:id="rId17"/>
-    <p:sldId id="290" r:id="rId18"/>
-    <p:sldId id="291" r:id="rId19"/>
-    <p:sldId id="292" r:id="rId20"/>
-    <p:sldId id="278" r:id="rId21"/>
-    <p:sldId id="279" r:id="rId22"/>
-    <p:sldId id="264" r:id="rId23"/>
-    <p:sldId id="274" r:id="rId24"/>
-    <p:sldId id="265" r:id="rId25"/>
-    <p:sldId id="276" r:id="rId26"/>
-    <p:sldId id="295" r:id="rId27"/>
-    <p:sldId id="266" r:id="rId28"/>
-    <p:sldId id="267" r:id="rId29"/>
+    <p:sldId id="291" r:id="rId18"/>
+    <p:sldId id="292" r:id="rId19"/>
+    <p:sldId id="278" r:id="rId20"/>
+    <p:sldId id="279" r:id="rId21"/>
+    <p:sldId id="264" r:id="rId22"/>
+    <p:sldId id="274" r:id="rId23"/>
+    <p:sldId id="265" r:id="rId24"/>
+    <p:sldId id="276" r:id="rId25"/>
+    <p:sldId id="295" r:id="rId26"/>
+    <p:sldId id="266" r:id="rId27"/>
+    <p:sldId id="267" r:id="rId28"/>
   </p:sldIdLst>
   <p:sldSz cx="12192000" cy="6858000"/>
   <p:notesSz cx="6858000" cy="9144000"/>
@@ -4101,755 +4100,6 @@
 </file>
 
 <file path=ppt/diagrams/colors6.xml><?xml version="1.0" encoding="utf-8"?>
-<dgm:colorsDef xmlns:dgm="http://schemas.openxmlformats.org/drawingml/2006/diagram" xmlns:a="http://schemas.openxmlformats.org/drawingml/2006/main" uniqueId="urn:microsoft.com/office/officeart/2018/5/colors/Iconchunking_neutralbg_accent1_2">
-  <dgm:title val=""/>
-  <dgm:desc val=""/>
-  <dgm:catLst>
-    <dgm:cat type="accent1" pri="11200"/>
-  </dgm:catLst>
-  <dgm:styleLbl name="node0">
-    <dgm:fillClrLst meth="repeat">
-      <a:schemeClr val="accent1"/>
-    </dgm:fillClrLst>
-    <dgm:linClrLst meth="repeat">
-      <a:schemeClr val="lt1"/>
-    </dgm:linClrLst>
-    <dgm:effectClrLst/>
-    <dgm:txLinClrLst/>
-    <dgm:txFillClrLst/>
-    <dgm:txEffectClrLst/>
-  </dgm:styleLbl>
-  <dgm:styleLbl name="alignNode1">
-    <dgm:fillClrLst meth="repeat">
-      <a:schemeClr val="accent1"/>
-    </dgm:fillClrLst>
-    <dgm:linClrLst meth="repeat">
-      <a:schemeClr val="accent1"/>
-    </dgm:linClrLst>
-    <dgm:effectClrLst/>
-    <dgm:txLinClrLst/>
-    <dgm:txFillClrLst/>
-    <dgm:txEffectClrLst/>
-  </dgm:styleLbl>
-  <dgm:styleLbl name="node1">
-    <dgm:fillClrLst meth="repeat">
-      <a:schemeClr val="accent1"/>
-    </dgm:fillClrLst>
-    <dgm:linClrLst meth="repeat">
-      <a:schemeClr val="lt1">
-        <a:alpha val="0"/>
-      </a:schemeClr>
-    </dgm:linClrLst>
-    <dgm:effectClrLst/>
-    <dgm:txLinClrLst/>
-    <dgm:txFillClrLst/>
-    <dgm:txEffectClrLst/>
-  </dgm:styleLbl>
-  <dgm:styleLbl name="lnNode1">
-    <dgm:fillClrLst meth="repeat">
-      <a:schemeClr val="accent1"/>
-    </dgm:fillClrLst>
-    <dgm:linClrLst meth="repeat">
-      <a:schemeClr val="lt1"/>
-    </dgm:linClrLst>
-    <dgm:effectClrLst/>
-    <dgm:txLinClrLst/>
-    <dgm:txFillClrLst/>
-    <dgm:txEffectClrLst/>
-  </dgm:styleLbl>
-  <dgm:styleLbl name="vennNode1">
-    <dgm:fillClrLst meth="repeat">
-      <a:schemeClr val="accent1">
-        <a:alpha val="50000"/>
-      </a:schemeClr>
-    </dgm:fillClrLst>
-    <dgm:linClrLst meth="repeat">
-      <a:schemeClr val="lt1"/>
-    </dgm:linClrLst>
-    <dgm:effectClrLst/>
-    <dgm:txLinClrLst/>
-    <dgm:txFillClrLst/>
-    <dgm:txEffectClrLst/>
-  </dgm:styleLbl>
-  <dgm:styleLbl name="node2">
-    <dgm:fillClrLst meth="repeat">
-      <a:schemeClr val="accent1"/>
-    </dgm:fillClrLst>
-    <dgm:linClrLst meth="repeat">
-      <a:schemeClr val="lt1"/>
-    </dgm:linClrLst>
-    <dgm:effectClrLst/>
-    <dgm:txLinClrLst/>
-    <dgm:txFillClrLst/>
-    <dgm:txEffectClrLst/>
-  </dgm:styleLbl>
-  <dgm:styleLbl name="node3">
-    <dgm:fillClrLst meth="repeat">
-      <a:schemeClr val="accent1"/>
-    </dgm:fillClrLst>
-    <dgm:linClrLst meth="repeat">
-      <a:schemeClr val="lt1"/>
-    </dgm:linClrLst>
-    <dgm:effectClrLst/>
-    <dgm:txLinClrLst/>
-    <dgm:txFillClrLst/>
-    <dgm:txEffectClrLst/>
-  </dgm:styleLbl>
-  <dgm:styleLbl name="node4">
-    <dgm:fillClrLst meth="repeat">
-      <a:schemeClr val="accent1"/>
-    </dgm:fillClrLst>
-    <dgm:linClrLst meth="repeat">
-      <a:schemeClr val="lt1"/>
-    </dgm:linClrLst>
-    <dgm:effectClrLst/>
-    <dgm:txLinClrLst/>
-    <dgm:txFillClrLst/>
-    <dgm:txEffectClrLst/>
-  </dgm:styleLbl>
-  <dgm:styleLbl name="fgImgPlace1">
-    <dgm:fillClrLst meth="repeat">
-      <a:schemeClr val="accent1">
-        <a:tint val="50000"/>
-      </a:schemeClr>
-    </dgm:fillClrLst>
-    <dgm:linClrLst meth="repeat">
-      <a:schemeClr val="lt1"/>
-    </dgm:linClrLst>
-    <dgm:effectClrLst/>
-    <dgm:txLinClrLst/>
-    <dgm:txFillClrLst meth="repeat">
-      <a:schemeClr val="lt1"/>
-    </dgm:txFillClrLst>
-    <dgm:txEffectClrLst/>
-  </dgm:styleLbl>
-  <dgm:styleLbl name="alignImgPlace1">
-    <dgm:fillClrLst meth="repeat">
-      <a:schemeClr val="accent1">
-        <a:tint val="50000"/>
-      </a:schemeClr>
-    </dgm:fillClrLst>
-    <dgm:linClrLst meth="repeat">
-      <a:schemeClr val="lt1"/>
-    </dgm:linClrLst>
-    <dgm:effectClrLst/>
-    <dgm:txLinClrLst/>
-    <dgm:txFillClrLst meth="repeat">
-      <a:schemeClr val="lt1"/>
-    </dgm:txFillClrLst>
-    <dgm:txEffectClrLst/>
-  </dgm:styleLbl>
-  <dgm:styleLbl name="bgImgPlace1">
-    <dgm:fillClrLst meth="repeat">
-      <a:schemeClr val="accent1">
-        <a:tint val="50000"/>
-      </a:schemeClr>
-    </dgm:fillClrLst>
-    <dgm:linClrLst meth="repeat">
-      <a:schemeClr val="lt1"/>
-    </dgm:linClrLst>
-    <dgm:effectClrLst/>
-    <dgm:txLinClrLst/>
-    <dgm:txFillClrLst meth="repeat">
-      <a:schemeClr val="lt1"/>
-    </dgm:txFillClrLst>
-    <dgm:txEffectClrLst/>
-  </dgm:styleLbl>
-  <dgm:styleLbl name="sibTrans2D1">
-    <dgm:fillClrLst meth="repeat">
-      <a:schemeClr val="accent1">
-        <a:tint val="60000"/>
-      </a:schemeClr>
-    </dgm:fillClrLst>
-    <dgm:linClrLst meth="repeat">
-      <a:schemeClr val="accent1">
-        <a:tint val="60000"/>
-      </a:schemeClr>
-    </dgm:linClrLst>
-    <dgm:effectClrLst/>
-    <dgm:txLinClrLst/>
-    <dgm:txFillClrLst/>
-    <dgm:txEffectClrLst/>
-  </dgm:styleLbl>
-  <dgm:styleLbl name="fgSibTrans2D1">
-    <dgm:fillClrLst meth="repeat">
-      <a:schemeClr val="accent1">
-        <a:tint val="60000"/>
-      </a:schemeClr>
-    </dgm:fillClrLst>
-    <dgm:linClrLst meth="repeat">
-      <a:schemeClr val="accent1">
-        <a:tint val="60000"/>
-      </a:schemeClr>
-    </dgm:linClrLst>
-    <dgm:effectClrLst/>
-    <dgm:txLinClrLst/>
-    <dgm:txFillClrLst/>
-    <dgm:txEffectClrLst/>
-  </dgm:styleLbl>
-  <dgm:styleLbl name="bgSibTrans2D1">
-    <dgm:fillClrLst meth="repeat">
-      <a:schemeClr val="accent1">
-        <a:tint val="60000"/>
-      </a:schemeClr>
-    </dgm:fillClrLst>
-    <dgm:linClrLst meth="repeat">
-      <a:schemeClr val="accent1">
-        <a:tint val="60000"/>
-      </a:schemeClr>
-    </dgm:linClrLst>
-    <dgm:effectClrLst/>
-    <dgm:txLinClrLst/>
-    <dgm:txFillClrLst/>
-    <dgm:txEffectClrLst/>
-  </dgm:styleLbl>
-  <dgm:styleLbl name="sibTrans1D1">
-    <dgm:fillClrLst meth="repeat">
-      <a:schemeClr val="accent1"/>
-    </dgm:fillClrLst>
-    <dgm:linClrLst meth="repeat">
-      <a:schemeClr val="accent1"/>
-    </dgm:linClrLst>
-    <dgm:effectClrLst/>
-    <dgm:txLinClrLst/>
-    <dgm:txFillClrLst meth="repeat">
-      <a:schemeClr val="tx1"/>
-    </dgm:txFillClrLst>
-    <dgm:txEffectClrLst/>
-  </dgm:styleLbl>
-  <dgm:styleLbl name="callout">
-    <dgm:fillClrLst meth="repeat">
-      <a:schemeClr val="accent1"/>
-    </dgm:fillClrLst>
-    <dgm:linClrLst meth="repeat">
-      <a:schemeClr val="accent1">
-        <a:tint val="50000"/>
-      </a:schemeClr>
-    </dgm:linClrLst>
-    <dgm:effectClrLst/>
-    <dgm:txLinClrLst/>
-    <dgm:txFillClrLst meth="repeat">
-      <a:schemeClr val="tx1"/>
-    </dgm:txFillClrLst>
-    <dgm:txEffectClrLst/>
-  </dgm:styleLbl>
-  <dgm:styleLbl name="asst0">
-    <dgm:fillClrLst meth="repeat">
-      <a:schemeClr val="accent1"/>
-    </dgm:fillClrLst>
-    <dgm:linClrLst meth="repeat">
-      <a:schemeClr val="lt1"/>
-    </dgm:linClrLst>
-    <dgm:effectClrLst/>
-    <dgm:txLinClrLst/>
-    <dgm:txFillClrLst/>
-    <dgm:txEffectClrLst/>
-  </dgm:styleLbl>
-  <dgm:styleLbl name="asst1">
-    <dgm:fillClrLst meth="repeat">
-      <a:schemeClr val="accent1"/>
-    </dgm:fillClrLst>
-    <dgm:linClrLst meth="repeat">
-      <a:schemeClr val="lt1"/>
-    </dgm:linClrLst>
-    <dgm:effectClrLst/>
-    <dgm:txLinClrLst/>
-    <dgm:txFillClrLst/>
-    <dgm:txEffectClrLst/>
-  </dgm:styleLbl>
-  <dgm:styleLbl name="asst2">
-    <dgm:fillClrLst meth="repeat">
-      <a:schemeClr val="accent1"/>
-    </dgm:fillClrLst>
-    <dgm:linClrLst meth="repeat">
-      <a:schemeClr val="lt1"/>
-    </dgm:linClrLst>
-    <dgm:effectClrLst/>
-    <dgm:txLinClrLst/>
-    <dgm:txFillClrLst/>
-    <dgm:txEffectClrLst/>
-  </dgm:styleLbl>
-  <dgm:styleLbl name="asst3">
-    <dgm:fillClrLst meth="repeat">
-      <a:schemeClr val="accent1"/>
-    </dgm:fillClrLst>
-    <dgm:linClrLst meth="repeat">
-      <a:schemeClr val="lt1"/>
-    </dgm:linClrLst>
-    <dgm:effectClrLst/>
-    <dgm:txLinClrLst/>
-    <dgm:txFillClrLst/>
-    <dgm:txEffectClrLst/>
-  </dgm:styleLbl>
-  <dgm:styleLbl name="asst4">
-    <dgm:fillClrLst meth="repeat">
-      <a:schemeClr val="accent1"/>
-    </dgm:fillClrLst>
-    <dgm:linClrLst meth="repeat">
-      <a:schemeClr val="lt1"/>
-    </dgm:linClrLst>
-    <dgm:effectClrLst/>
-    <dgm:txLinClrLst/>
-    <dgm:txFillClrLst/>
-    <dgm:txEffectClrLst/>
-  </dgm:styleLbl>
-  <dgm:styleLbl name="parChTrans2D1">
-    <dgm:fillClrLst meth="repeat">
-      <a:schemeClr val="accent1">
-        <a:tint val="60000"/>
-      </a:schemeClr>
-    </dgm:fillClrLst>
-    <dgm:linClrLst meth="repeat">
-      <a:schemeClr val="accent1">
-        <a:tint val="60000"/>
-      </a:schemeClr>
-    </dgm:linClrLst>
-    <dgm:effectClrLst/>
-    <dgm:txLinClrLst/>
-    <dgm:txFillClrLst meth="repeat">
-      <a:schemeClr val="lt1"/>
-    </dgm:txFillClrLst>
-    <dgm:txEffectClrLst/>
-  </dgm:styleLbl>
-  <dgm:styleLbl name="parChTrans2D2">
-    <dgm:fillClrLst meth="repeat">
-      <a:schemeClr val="accent1"/>
-    </dgm:fillClrLst>
-    <dgm:linClrLst meth="repeat">
-      <a:schemeClr val="accent1"/>
-    </dgm:linClrLst>
-    <dgm:effectClrLst/>
-    <dgm:txLinClrLst/>
-    <dgm:txFillClrLst meth="repeat">
-      <a:schemeClr val="lt1"/>
-    </dgm:txFillClrLst>
-    <dgm:txEffectClrLst/>
-  </dgm:styleLbl>
-  <dgm:styleLbl name="parChTrans2D3">
-    <dgm:fillClrLst meth="repeat">
-      <a:schemeClr val="accent1"/>
-    </dgm:fillClrLst>
-    <dgm:linClrLst meth="repeat">
-      <a:schemeClr val="accent1"/>
-    </dgm:linClrLst>
-    <dgm:effectClrLst/>
-    <dgm:txLinClrLst/>
-    <dgm:txFillClrLst meth="repeat">
-      <a:schemeClr val="lt1"/>
-    </dgm:txFillClrLst>
-    <dgm:txEffectClrLst/>
-  </dgm:styleLbl>
-  <dgm:styleLbl name="parChTrans2D4">
-    <dgm:fillClrLst meth="repeat">
-      <a:schemeClr val="accent1"/>
-    </dgm:fillClrLst>
-    <dgm:linClrLst meth="repeat">
-      <a:schemeClr val="accent1"/>
-    </dgm:linClrLst>
-    <dgm:effectClrLst/>
-    <dgm:txLinClrLst/>
-    <dgm:txFillClrLst meth="repeat">
-      <a:schemeClr val="lt1"/>
-    </dgm:txFillClrLst>
-    <dgm:txEffectClrLst/>
-  </dgm:styleLbl>
-  <dgm:styleLbl name="parChTrans1D1">
-    <dgm:fillClrLst meth="repeat">
-      <a:schemeClr val="accent1"/>
-    </dgm:fillClrLst>
-    <dgm:linClrLst meth="repeat">
-      <a:schemeClr val="accent1">
-        <a:shade val="60000"/>
-      </a:schemeClr>
-    </dgm:linClrLst>
-    <dgm:effectClrLst/>
-    <dgm:txLinClrLst/>
-    <dgm:txFillClrLst meth="repeat">
-      <a:schemeClr val="tx1"/>
-    </dgm:txFillClrLst>
-    <dgm:txEffectClrLst/>
-  </dgm:styleLbl>
-  <dgm:styleLbl name="parChTrans1D2">
-    <dgm:fillClrLst meth="repeat">
-      <a:schemeClr val="accent1"/>
-    </dgm:fillClrLst>
-    <dgm:linClrLst meth="repeat">
-      <a:schemeClr val="accent1">
-        <a:shade val="60000"/>
-      </a:schemeClr>
-    </dgm:linClrLst>
-    <dgm:effectClrLst/>
-    <dgm:txLinClrLst/>
-    <dgm:txFillClrLst meth="repeat">
-      <a:schemeClr val="tx1"/>
-    </dgm:txFillClrLst>
-    <dgm:txEffectClrLst/>
-  </dgm:styleLbl>
-  <dgm:styleLbl name="parChTrans1D3">
-    <dgm:fillClrLst meth="repeat">
-      <a:schemeClr val="accent1"/>
-    </dgm:fillClrLst>
-    <dgm:linClrLst meth="repeat">
-      <a:schemeClr val="accent1">
-        <a:shade val="80000"/>
-      </a:schemeClr>
-    </dgm:linClrLst>
-    <dgm:effectClrLst/>
-    <dgm:txLinClrLst/>
-    <dgm:txFillClrLst meth="repeat">
-      <a:schemeClr val="tx1"/>
-    </dgm:txFillClrLst>
-    <dgm:txEffectClrLst/>
-  </dgm:styleLbl>
-  <dgm:styleLbl name="parChTrans1D4">
-    <dgm:fillClrLst meth="repeat">
-      <a:schemeClr val="accent1"/>
-    </dgm:fillClrLst>
-    <dgm:linClrLst meth="repeat">
-      <a:schemeClr val="accent1">
-        <a:shade val="80000"/>
-      </a:schemeClr>
-    </dgm:linClrLst>
-    <dgm:effectClrLst/>
-    <dgm:txLinClrLst/>
-    <dgm:txFillClrLst meth="repeat">
-      <a:schemeClr val="tx1"/>
-    </dgm:txFillClrLst>
-    <dgm:txEffectClrLst/>
-  </dgm:styleLbl>
-  <dgm:styleLbl name="fgAcc1">
-    <dgm:fillClrLst meth="repeat">
-      <a:schemeClr val="lt1">
-        <a:alpha val="90000"/>
-      </a:schemeClr>
-    </dgm:fillClrLst>
-    <dgm:linClrLst meth="repeat">
-      <a:schemeClr val="accent1"/>
-    </dgm:linClrLst>
-    <dgm:effectClrLst/>
-    <dgm:txLinClrLst/>
-    <dgm:txFillClrLst meth="repeat">
-      <a:schemeClr val="dk1"/>
-    </dgm:txFillClrLst>
-    <dgm:txEffectClrLst/>
-  </dgm:styleLbl>
-  <dgm:styleLbl name="conFgAcc1">
-    <dgm:fillClrLst meth="repeat">
-      <a:schemeClr val="lt1">
-        <a:alpha val="90000"/>
-      </a:schemeClr>
-    </dgm:fillClrLst>
-    <dgm:linClrLst meth="repeat">
-      <a:schemeClr val="accent1"/>
-    </dgm:linClrLst>
-    <dgm:effectClrLst/>
-    <dgm:txLinClrLst/>
-    <dgm:txFillClrLst meth="repeat">
-      <a:schemeClr val="dk1"/>
-    </dgm:txFillClrLst>
-    <dgm:txEffectClrLst/>
-  </dgm:styleLbl>
-  <dgm:styleLbl name="alignAcc1">
-    <dgm:fillClrLst meth="repeat">
-      <a:schemeClr val="lt1">
-        <a:alpha val="90000"/>
-      </a:schemeClr>
-    </dgm:fillClrLst>
-    <dgm:linClrLst meth="repeat">
-      <a:schemeClr val="accent1"/>
-    </dgm:linClrLst>
-    <dgm:effectClrLst/>
-    <dgm:txLinClrLst/>
-    <dgm:txFillClrLst meth="repeat">
-      <a:schemeClr val="dk1"/>
-    </dgm:txFillClrLst>
-    <dgm:txEffectClrLst/>
-  </dgm:styleLbl>
-  <dgm:styleLbl name="trAlignAcc1">
-    <dgm:fillClrLst meth="repeat">
-      <a:schemeClr val="lt1">
-        <a:alpha val="40000"/>
-      </a:schemeClr>
-    </dgm:fillClrLst>
-    <dgm:linClrLst meth="repeat">
-      <a:schemeClr val="accent1"/>
-    </dgm:linClrLst>
-    <dgm:effectClrLst/>
-    <dgm:txLinClrLst/>
-    <dgm:txFillClrLst meth="repeat">
-      <a:schemeClr val="dk1"/>
-    </dgm:txFillClrLst>
-    <dgm:txEffectClrLst/>
-  </dgm:styleLbl>
-  <dgm:styleLbl name="bgAcc1">
-    <dgm:fillClrLst meth="repeat">
-      <a:schemeClr val="lt1">
-        <a:alpha val="90000"/>
-      </a:schemeClr>
-    </dgm:fillClrLst>
-    <dgm:linClrLst meth="repeat">
-      <a:schemeClr val="accent1"/>
-    </dgm:linClrLst>
-    <dgm:effectClrLst/>
-    <dgm:txLinClrLst/>
-    <dgm:txFillClrLst meth="repeat">
-      <a:schemeClr val="dk1"/>
-    </dgm:txFillClrLst>
-    <dgm:txEffectClrLst/>
-  </dgm:styleLbl>
-  <dgm:styleLbl name="solidFgAcc1">
-    <dgm:fillClrLst meth="repeat">
-      <a:schemeClr val="lt1"/>
-    </dgm:fillClrLst>
-    <dgm:linClrLst meth="repeat">
-      <a:schemeClr val="accent1"/>
-    </dgm:linClrLst>
-    <dgm:effectClrLst/>
-    <dgm:txLinClrLst/>
-    <dgm:txFillClrLst meth="repeat">
-      <a:schemeClr val="dk1"/>
-    </dgm:txFillClrLst>
-    <dgm:txEffectClrLst/>
-  </dgm:styleLbl>
-  <dgm:styleLbl name="solidAlignAcc1">
-    <dgm:fillClrLst meth="repeat">
-      <a:schemeClr val="lt1"/>
-    </dgm:fillClrLst>
-    <dgm:linClrLst meth="repeat">
-      <a:schemeClr val="accent1"/>
-    </dgm:linClrLst>
-    <dgm:effectClrLst/>
-    <dgm:txLinClrLst/>
-    <dgm:txFillClrLst meth="repeat">
-      <a:schemeClr val="dk1"/>
-    </dgm:txFillClrLst>
-    <dgm:txEffectClrLst/>
-  </dgm:styleLbl>
-  <dgm:styleLbl name="solidBgAcc1">
-    <dgm:fillClrLst meth="repeat">
-      <a:schemeClr val="lt1"/>
-    </dgm:fillClrLst>
-    <dgm:linClrLst meth="repeat">
-      <a:schemeClr val="accent1"/>
-    </dgm:linClrLst>
-    <dgm:effectClrLst/>
-    <dgm:txLinClrLst/>
-    <dgm:txFillClrLst meth="repeat">
-      <a:schemeClr val="dk1"/>
-    </dgm:txFillClrLst>
-    <dgm:txEffectClrLst/>
-  </dgm:styleLbl>
-  <dgm:styleLbl name="fgAccFollowNode1">
-    <dgm:fillClrLst meth="repeat">
-      <a:schemeClr val="accent1">
-        <a:alpha val="90000"/>
-        <a:tint val="40000"/>
-      </a:schemeClr>
-    </dgm:fillClrLst>
-    <dgm:linClrLst meth="repeat">
-      <a:schemeClr val="accent1">
-        <a:alpha val="90000"/>
-        <a:tint val="40000"/>
-      </a:schemeClr>
-    </dgm:linClrLst>
-    <dgm:effectClrLst/>
-    <dgm:txLinClrLst/>
-    <dgm:txFillClrLst meth="repeat">
-      <a:schemeClr val="dk1"/>
-    </dgm:txFillClrLst>
-    <dgm:txEffectClrLst/>
-  </dgm:styleLbl>
-  <dgm:styleLbl name="alignAccFollowNode1">
-    <dgm:fillClrLst meth="repeat">
-      <a:schemeClr val="accent1">
-        <a:alpha val="90000"/>
-        <a:tint val="40000"/>
-      </a:schemeClr>
-    </dgm:fillClrLst>
-    <dgm:linClrLst meth="repeat">
-      <a:schemeClr val="accent1">
-        <a:alpha val="90000"/>
-        <a:tint val="40000"/>
-      </a:schemeClr>
-    </dgm:linClrLst>
-    <dgm:effectClrLst/>
-    <dgm:txLinClrLst/>
-    <dgm:txFillClrLst meth="repeat">
-      <a:schemeClr val="dk1"/>
-    </dgm:txFillClrLst>
-    <dgm:txEffectClrLst/>
-  </dgm:styleLbl>
-  <dgm:styleLbl name="bgAccFollowNode1">
-    <dgm:fillClrLst meth="repeat">
-      <a:schemeClr val="accent1">
-        <a:alpha val="90000"/>
-        <a:tint val="40000"/>
-      </a:schemeClr>
-    </dgm:fillClrLst>
-    <dgm:linClrLst meth="repeat">
-      <a:schemeClr val="accent1">
-        <a:alpha val="90000"/>
-        <a:tint val="40000"/>
-      </a:schemeClr>
-    </dgm:linClrLst>
-    <dgm:effectClrLst/>
-    <dgm:txLinClrLst/>
-    <dgm:txFillClrLst meth="repeat">
-      <a:schemeClr val="dk1"/>
-    </dgm:txFillClrLst>
-    <dgm:txEffectClrLst/>
-  </dgm:styleLbl>
-  <dgm:styleLbl name="fgAcc0">
-    <dgm:fillClrLst meth="repeat">
-      <a:schemeClr val="lt1">
-        <a:alpha val="90000"/>
-      </a:schemeClr>
-    </dgm:fillClrLst>
-    <dgm:linClrLst meth="repeat">
-      <a:schemeClr val="accent1"/>
-    </dgm:linClrLst>
-    <dgm:effectClrLst/>
-    <dgm:txLinClrLst/>
-    <dgm:txFillClrLst meth="repeat">
-      <a:schemeClr val="dk1"/>
-    </dgm:txFillClrLst>
-    <dgm:txEffectClrLst/>
-  </dgm:styleLbl>
-  <dgm:styleLbl name="fgAcc2">
-    <dgm:fillClrLst meth="repeat">
-      <a:schemeClr val="lt1">
-        <a:alpha val="90000"/>
-      </a:schemeClr>
-    </dgm:fillClrLst>
-    <dgm:linClrLst meth="repeat">
-      <a:schemeClr val="accent1"/>
-    </dgm:linClrLst>
-    <dgm:effectClrLst/>
-    <dgm:txLinClrLst/>
-    <dgm:txFillClrLst meth="repeat">
-      <a:schemeClr val="dk1"/>
-    </dgm:txFillClrLst>
-    <dgm:txEffectClrLst/>
-  </dgm:styleLbl>
-  <dgm:styleLbl name="fgAcc3">
-    <dgm:fillClrLst meth="repeat">
-      <a:schemeClr val="lt1">
-        <a:alpha val="90000"/>
-      </a:schemeClr>
-    </dgm:fillClrLst>
-    <dgm:linClrLst meth="repeat">
-      <a:schemeClr val="accent1"/>
-    </dgm:linClrLst>
-    <dgm:effectClrLst/>
-    <dgm:txLinClrLst/>
-    <dgm:txFillClrLst meth="repeat">
-      <a:schemeClr val="dk1"/>
-    </dgm:txFillClrLst>
-    <dgm:txEffectClrLst/>
-  </dgm:styleLbl>
-  <dgm:styleLbl name="fgAcc4">
-    <dgm:fillClrLst meth="repeat">
-      <a:schemeClr val="lt1">
-        <a:alpha val="90000"/>
-      </a:schemeClr>
-    </dgm:fillClrLst>
-    <dgm:linClrLst meth="repeat">
-      <a:schemeClr val="accent1"/>
-    </dgm:linClrLst>
-    <dgm:effectClrLst/>
-    <dgm:txLinClrLst/>
-    <dgm:txFillClrLst meth="repeat">
-      <a:schemeClr val="dk1"/>
-    </dgm:txFillClrLst>
-    <dgm:txEffectClrLst/>
-  </dgm:styleLbl>
-  <dgm:styleLbl name="bgShp">
-    <dgm:fillClrLst meth="repeat">
-      <a:schemeClr val="bg1">
-        <a:lumMod val="95000"/>
-      </a:schemeClr>
-    </dgm:fillClrLst>
-    <dgm:linClrLst meth="repeat">
-      <a:schemeClr val="accent1"/>
-    </dgm:linClrLst>
-    <dgm:effectClrLst/>
-    <dgm:txLinClrLst/>
-    <dgm:txFillClrLst meth="repeat">
-      <a:schemeClr val="dk1"/>
-    </dgm:txFillClrLst>
-    <dgm:txEffectClrLst/>
-  </dgm:styleLbl>
-  <dgm:styleLbl name="dkBgShp">
-    <dgm:fillClrLst meth="repeat">
-      <a:schemeClr val="accent1">
-        <a:shade val="80000"/>
-      </a:schemeClr>
-    </dgm:fillClrLst>
-    <dgm:linClrLst meth="repeat">
-      <a:schemeClr val="accent1"/>
-    </dgm:linClrLst>
-    <dgm:effectClrLst/>
-    <dgm:txLinClrLst/>
-    <dgm:txFillClrLst meth="repeat">
-      <a:schemeClr val="lt1"/>
-    </dgm:txFillClrLst>
-    <dgm:txEffectClrLst/>
-  </dgm:styleLbl>
-  <dgm:styleLbl name="trBgShp">
-    <dgm:fillClrLst meth="repeat">
-      <a:schemeClr val="accent1">
-        <a:tint val="50000"/>
-        <a:alpha val="40000"/>
-      </a:schemeClr>
-    </dgm:fillClrLst>
-    <dgm:linClrLst meth="repeat">
-      <a:schemeClr val="accent1"/>
-    </dgm:linClrLst>
-    <dgm:effectClrLst/>
-    <dgm:txLinClrLst/>
-    <dgm:txFillClrLst meth="repeat">
-      <a:schemeClr val="lt1"/>
-    </dgm:txFillClrLst>
-    <dgm:txEffectClrLst/>
-  </dgm:styleLbl>
-  <dgm:styleLbl name="fgShp">
-    <dgm:fillClrLst meth="repeat">
-      <a:schemeClr val="accent1">
-        <a:tint val="60000"/>
-      </a:schemeClr>
-    </dgm:fillClrLst>
-    <dgm:linClrLst meth="repeat">
-      <a:schemeClr val="lt1"/>
-    </dgm:linClrLst>
-    <dgm:effectClrLst/>
-    <dgm:txLinClrLst/>
-    <dgm:txFillClrLst meth="repeat">
-      <a:schemeClr val="dk1"/>
-    </dgm:txFillClrLst>
-    <dgm:txEffectClrLst/>
-  </dgm:styleLbl>
-  <dgm:styleLbl name="revTx">
-    <dgm:fillClrLst meth="repeat">
-      <a:schemeClr val="lt1">
-        <a:alpha val="0"/>
-      </a:schemeClr>
-    </dgm:fillClrLst>
-    <dgm:linClrLst meth="repeat">
-      <a:schemeClr val="dk1">
-        <a:alpha val="0"/>
-      </a:schemeClr>
-    </dgm:linClrLst>
-    <dgm:effectClrLst/>
-    <dgm:txLinClrLst/>
-    <dgm:txFillClrLst meth="repeat">
-      <a:schemeClr val="tx1"/>
-    </dgm:txFillClrLst>
-    <dgm:txEffectClrLst/>
-  </dgm:styleLbl>
-</dgm:colorsDef>
-</file>
-
-<file path=ppt/diagrams/colors7.xml><?xml version="1.0" encoding="utf-8"?>
 <dgm:colorsDef xmlns:dgm="http://schemas.openxmlformats.org/drawingml/2006/diagram" xmlns:a="http://schemas.openxmlformats.org/drawingml/2006/main" uniqueId="urn:microsoft.com/office/officeart/2005/8/colors/accent0_3">
   <dgm:title val=""/>
   <dgm:desc val=""/>
@@ -5600,7 +4850,7 @@
 </dgm:colorsDef>
 </file>
 
-<file path=ppt/diagrams/colors8.xml><?xml version="1.0" encoding="utf-8"?>
+<file path=ppt/diagrams/colors7.xml><?xml version="1.0" encoding="utf-8"?>
 <dgm:colorsDef xmlns:dgm="http://schemas.openxmlformats.org/drawingml/2006/diagram" xmlns:a="http://schemas.openxmlformats.org/drawingml/2006/main" uniqueId="urn:microsoft.com/office/officeart/2005/8/colors/colorful5">
   <dgm:title val=""/>
   <dgm:desc val=""/>
@@ -6382,7 +5632,7 @@
 </dgm:colorsDef>
 </file>
 
-<file path=ppt/diagrams/colors9.xml><?xml version="1.0" encoding="utf-8"?>
+<file path=ppt/diagrams/colors8.xml><?xml version="1.0" encoding="utf-8"?>
 <dgm:colorsDef xmlns:dgm="http://schemas.openxmlformats.org/drawingml/2006/diagram" xmlns:a="http://schemas.openxmlformats.org/drawingml/2006/main" uniqueId="urn:microsoft.com/office/officeart/2005/8/colors/accent3_2">
   <dgm:title val=""/>
   <dgm:desc val=""/>
@@ -8381,10 +7631,10 @@
             <a:defRPr cap="all"/>
           </a:pPr>
           <a:r>
-            <a:rPr lang="es-ES_tradnl"/>
+            <a:rPr lang="es-ES_tradnl" strike="sngStrike" dirty="0"/>
             <a:t>Integridad</a:t>
           </a:r>
-          <a:endParaRPr lang="en-US"/>
+          <a:endParaRPr lang="en-US" strike="sngStrike" dirty="0"/>
         </a:p>
       </dgm:t>
     </dgm:pt>
@@ -8461,10 +7711,14 @@
             <a:defRPr cap="all"/>
           </a:pPr>
           <a:r>
-            <a:rPr lang="es-ES_tradnl"/>
-            <a:t>Autenticidad </a:t>
+            <a:rPr lang="es-ES_tradnl" strike="sngStrike" dirty="0"/>
+            <a:t>Autenticidad</a:t>
           </a:r>
-          <a:endParaRPr lang="en-US"/>
+          <a:r>
+            <a:rPr lang="es-ES_tradnl" dirty="0"/>
+            <a:t> </a:t>
+          </a:r>
+          <a:endParaRPr lang="en-US" dirty="0"/>
         </a:p>
       </dgm:t>
     </dgm:pt>
@@ -8692,341 +7946,6 @@
 </file>
 
 <file path=ppt/diagrams/data6.xml><?xml version="1.0" encoding="utf-8"?>
-<dgm:dataModel xmlns:dgm="http://schemas.openxmlformats.org/drawingml/2006/diagram" xmlns:a="http://schemas.openxmlformats.org/drawingml/2006/main">
-  <dgm:ptLst>
-    <dgm:pt modelId="{B9DCE5F2-2D28-417E-928C-8183502D9C31}" type="doc">
-      <dgm:prSet loTypeId="urn:microsoft.com/office/officeart/2018/5/layout/IconCircleLabelList" loCatId="icon" qsTypeId="urn:microsoft.com/office/officeart/2005/8/quickstyle/simple1" qsCatId="simple" csTypeId="urn:microsoft.com/office/officeart/2018/5/colors/Iconchunking_neutralbg_accent1_2" csCatId="accent1" phldr="1"/>
-      <dgm:spPr/>
-      <dgm:t>
-        <a:bodyPr/>
-        <a:lstStyle/>
-        <a:p>
-          <a:endParaRPr lang="en-US"/>
-        </a:p>
-      </dgm:t>
-    </dgm:pt>
-    <dgm:pt modelId="{7EBF6446-F6C4-4D89-AA83-96555B480742}">
-      <dgm:prSet/>
-      <dgm:spPr/>
-      <dgm:t>
-        <a:bodyPr/>
-        <a:lstStyle/>
-        <a:p>
-          <a:pPr>
-            <a:defRPr cap="all"/>
-          </a:pPr>
-          <a:r>
-            <a:rPr lang="es-ES_tradnl" strike="sngStrike" dirty="0"/>
-            <a:t>Integridad</a:t>
-          </a:r>
-          <a:endParaRPr lang="en-US" strike="sngStrike" dirty="0"/>
-        </a:p>
-      </dgm:t>
-    </dgm:pt>
-    <dgm:pt modelId="{8BD96D63-4F5A-4318-B47B-CD9C7A6A1F09}" type="parTrans" cxnId="{B1A84A56-C1B6-40B9-BBD0-44CA1266424E}">
-      <dgm:prSet/>
-      <dgm:spPr/>
-      <dgm:t>
-        <a:bodyPr/>
-        <a:lstStyle/>
-        <a:p>
-          <a:endParaRPr lang="en-US"/>
-        </a:p>
-      </dgm:t>
-    </dgm:pt>
-    <dgm:pt modelId="{3F0EBE6C-E28C-483D-8058-BA02BB25F5DD}" type="sibTrans" cxnId="{B1A84A56-C1B6-40B9-BBD0-44CA1266424E}">
-      <dgm:prSet/>
-      <dgm:spPr/>
-      <dgm:t>
-        <a:bodyPr/>
-        <a:lstStyle/>
-        <a:p>
-          <a:endParaRPr lang="en-US"/>
-        </a:p>
-      </dgm:t>
-    </dgm:pt>
-    <dgm:pt modelId="{F7B4FC59-3420-4B71-B780-03F580390539}">
-      <dgm:prSet/>
-      <dgm:spPr/>
-      <dgm:t>
-        <a:bodyPr/>
-        <a:lstStyle/>
-        <a:p>
-          <a:pPr>
-            <a:defRPr cap="all"/>
-          </a:pPr>
-          <a:r>
-            <a:rPr lang="es-ES_tradnl" strike="sngStrike" dirty="0"/>
-            <a:t>Confidencialidad</a:t>
-          </a:r>
-          <a:endParaRPr lang="en-US" strike="sngStrike" dirty="0"/>
-        </a:p>
-      </dgm:t>
-    </dgm:pt>
-    <dgm:pt modelId="{C16E2B8E-F957-41EB-B09E-AE3FD5DDCA63}" type="parTrans" cxnId="{E272B79E-6278-451E-8EB2-5BB7624B7625}">
-      <dgm:prSet/>
-      <dgm:spPr/>
-      <dgm:t>
-        <a:bodyPr/>
-        <a:lstStyle/>
-        <a:p>
-          <a:endParaRPr lang="en-US"/>
-        </a:p>
-      </dgm:t>
-    </dgm:pt>
-    <dgm:pt modelId="{8E645F21-55B0-4F5A-88F1-C7E14F5579C5}" type="sibTrans" cxnId="{E272B79E-6278-451E-8EB2-5BB7624B7625}">
-      <dgm:prSet/>
-      <dgm:spPr/>
-      <dgm:t>
-        <a:bodyPr/>
-        <a:lstStyle/>
-        <a:p>
-          <a:endParaRPr lang="en-US"/>
-        </a:p>
-      </dgm:t>
-    </dgm:pt>
-    <dgm:pt modelId="{3B5ED621-3791-42F4-9AC9-380E64A161E1}">
-      <dgm:prSet/>
-      <dgm:spPr/>
-      <dgm:t>
-        <a:bodyPr/>
-        <a:lstStyle/>
-        <a:p>
-          <a:pPr>
-            <a:defRPr cap="all"/>
-          </a:pPr>
-          <a:r>
-            <a:rPr lang="es-ES_tradnl"/>
-            <a:t>Autenticidad </a:t>
-          </a:r>
-          <a:endParaRPr lang="en-US"/>
-        </a:p>
-      </dgm:t>
-    </dgm:pt>
-    <dgm:pt modelId="{6D145F9F-CFAF-4B1E-8BC2-8EB51607290B}" type="parTrans" cxnId="{5A730949-590D-4963-85B2-D828F12E0A9C}">
-      <dgm:prSet/>
-      <dgm:spPr/>
-      <dgm:t>
-        <a:bodyPr/>
-        <a:lstStyle/>
-        <a:p>
-          <a:endParaRPr lang="en-US"/>
-        </a:p>
-      </dgm:t>
-    </dgm:pt>
-    <dgm:pt modelId="{985A20DE-5071-4276-A5E1-A2E38CBEF2ED}" type="sibTrans" cxnId="{5A730949-590D-4963-85B2-D828F12E0A9C}">
-      <dgm:prSet/>
-      <dgm:spPr/>
-      <dgm:t>
-        <a:bodyPr/>
-        <a:lstStyle/>
-        <a:p>
-          <a:endParaRPr lang="en-US"/>
-        </a:p>
-      </dgm:t>
-    </dgm:pt>
-    <dgm:pt modelId="{AE982C75-65E4-46AF-B29D-6356596452B5}" type="pres">
-      <dgm:prSet presAssocID="{B9DCE5F2-2D28-417E-928C-8183502D9C31}" presName="root" presStyleCnt="0">
-        <dgm:presLayoutVars>
-          <dgm:dir/>
-          <dgm:resizeHandles val="exact"/>
-        </dgm:presLayoutVars>
-      </dgm:prSet>
-      <dgm:spPr/>
-    </dgm:pt>
-    <dgm:pt modelId="{186CCF56-77FD-4ACB-8B16-065017AFA33D}" type="pres">
-      <dgm:prSet presAssocID="{7EBF6446-F6C4-4D89-AA83-96555B480742}" presName="compNode" presStyleCnt="0"/>
-      <dgm:spPr/>
-    </dgm:pt>
-    <dgm:pt modelId="{6AE76129-B04C-4D24-8268-E2D57B91584D}" type="pres">
-      <dgm:prSet presAssocID="{7EBF6446-F6C4-4D89-AA83-96555B480742}" presName="iconBgRect" presStyleLbl="bgShp" presStyleIdx="0" presStyleCnt="3"/>
-      <dgm:spPr/>
-    </dgm:pt>
-    <dgm:pt modelId="{00B469F6-B21B-4356-90BB-30A3A1001A00}" type="pres">
-      <dgm:prSet presAssocID="{7EBF6446-F6C4-4D89-AA83-96555B480742}" presName="iconRect" presStyleLbl="node1" presStyleIdx="0" presStyleCnt="3"/>
-      <dgm:spPr>
-        <a:blipFill>
-          <a:blip xmlns:r="http://schemas.openxmlformats.org/officeDocument/2006/relationships" r:embed="rId1">
-            <a:extLst>
-              <a:ext uri="{28A0092B-C50C-407E-A947-70E740481C1C}">
-                <a14:useLocalDpi xmlns:a14="http://schemas.microsoft.com/office/drawing/2010/main" val="0"/>
-              </a:ext>
-              <a:ext uri="{96DAC541-7B7A-43D3-8B79-37D633B846F1}">
-                <asvg:svgBlip xmlns:asvg="http://schemas.microsoft.com/office/drawing/2016/SVG/main" r:embed="rId2"/>
-              </a:ext>
-            </a:extLst>
-          </a:blip>
-          <a:stretch>
-            <a:fillRect/>
-          </a:stretch>
-        </a:blipFill>
-        <a:ln>
-          <a:noFill/>
-        </a:ln>
-      </dgm:spPr>
-      <dgm:extLst>
-        <a:ext uri="{E40237B7-FDA0-4F09-8148-C483321AD2D9}">
-          <dgm14:cNvPr xmlns:dgm14="http://schemas.microsoft.com/office/drawing/2010/diagram" id="0" name="" descr="Marca de verificación"/>
-        </a:ext>
-      </dgm:extLst>
-    </dgm:pt>
-    <dgm:pt modelId="{53C8091E-2E23-458B-A130-0819A0CACEDD}" type="pres">
-      <dgm:prSet presAssocID="{7EBF6446-F6C4-4D89-AA83-96555B480742}" presName="spaceRect" presStyleCnt="0"/>
-      <dgm:spPr/>
-    </dgm:pt>
-    <dgm:pt modelId="{3CCB6D46-87B8-4393-A5F3-F910AE2F0D95}" type="pres">
-      <dgm:prSet presAssocID="{7EBF6446-F6C4-4D89-AA83-96555B480742}" presName="textRect" presStyleLbl="revTx" presStyleIdx="0" presStyleCnt="3">
-        <dgm:presLayoutVars>
-          <dgm:chMax val="1"/>
-          <dgm:chPref val="1"/>
-        </dgm:presLayoutVars>
-      </dgm:prSet>
-      <dgm:spPr/>
-    </dgm:pt>
-    <dgm:pt modelId="{CD123488-478A-42E0-9386-98A70FD70FBB}" type="pres">
-      <dgm:prSet presAssocID="{3F0EBE6C-E28C-483D-8058-BA02BB25F5DD}" presName="sibTrans" presStyleCnt="0"/>
-      <dgm:spPr/>
-    </dgm:pt>
-    <dgm:pt modelId="{E8BF1A8D-AFF1-4CB9-8221-162DFDB0F663}" type="pres">
-      <dgm:prSet presAssocID="{F7B4FC59-3420-4B71-B780-03F580390539}" presName="compNode" presStyleCnt="0"/>
-      <dgm:spPr/>
-    </dgm:pt>
-    <dgm:pt modelId="{0E4AAEB2-7285-4E8C-8562-09B487B4744D}" type="pres">
-      <dgm:prSet presAssocID="{F7B4FC59-3420-4B71-B780-03F580390539}" presName="iconBgRect" presStyleLbl="bgShp" presStyleIdx="1" presStyleCnt="3"/>
-      <dgm:spPr/>
-    </dgm:pt>
-    <dgm:pt modelId="{53589C16-69BA-4D84-8FC0-7C9C57CBF283}" type="pres">
-      <dgm:prSet presAssocID="{F7B4FC59-3420-4B71-B780-03F580390539}" presName="iconRect" presStyleLbl="node1" presStyleIdx="1" presStyleCnt="3"/>
-      <dgm:spPr>
-        <a:blipFill>
-          <a:blip xmlns:r="http://schemas.openxmlformats.org/officeDocument/2006/relationships" r:embed="rId3">
-            <a:extLst>
-              <a:ext uri="{28A0092B-C50C-407E-A947-70E740481C1C}">
-                <a14:useLocalDpi xmlns:a14="http://schemas.microsoft.com/office/drawing/2010/main" val="0"/>
-              </a:ext>
-              <a:ext uri="{96DAC541-7B7A-43D3-8B79-37D633B846F1}">
-                <asvg:svgBlip xmlns:asvg="http://schemas.microsoft.com/office/drawing/2016/SVG/main" r:embed="rId4"/>
-              </a:ext>
-            </a:extLst>
-          </a:blip>
-          <a:stretch>
-            <a:fillRect/>
-          </a:stretch>
-        </a:blipFill>
-        <a:ln>
-          <a:noFill/>
-        </a:ln>
-      </dgm:spPr>
-      <dgm:extLst>
-        <a:ext uri="{E40237B7-FDA0-4F09-8148-C483321AD2D9}">
-          <dgm14:cNvPr xmlns:dgm14="http://schemas.microsoft.com/office/drawing/2010/diagram" id="0" name="" descr="Bloquear"/>
-        </a:ext>
-      </dgm:extLst>
-    </dgm:pt>
-    <dgm:pt modelId="{EE742E5A-23B3-4D17-B6AE-B4CA55F3FA6C}" type="pres">
-      <dgm:prSet presAssocID="{F7B4FC59-3420-4B71-B780-03F580390539}" presName="spaceRect" presStyleCnt="0"/>
-      <dgm:spPr/>
-    </dgm:pt>
-    <dgm:pt modelId="{8F02040F-85AA-4390-A915-8C784D9C92E7}" type="pres">
-      <dgm:prSet presAssocID="{F7B4FC59-3420-4B71-B780-03F580390539}" presName="textRect" presStyleLbl="revTx" presStyleIdx="1" presStyleCnt="3">
-        <dgm:presLayoutVars>
-          <dgm:chMax val="1"/>
-          <dgm:chPref val="1"/>
-        </dgm:presLayoutVars>
-      </dgm:prSet>
-      <dgm:spPr/>
-    </dgm:pt>
-    <dgm:pt modelId="{56416590-7531-4388-9D02-A8023642F0A6}" type="pres">
-      <dgm:prSet presAssocID="{8E645F21-55B0-4F5A-88F1-C7E14F5579C5}" presName="sibTrans" presStyleCnt="0"/>
-      <dgm:spPr/>
-    </dgm:pt>
-    <dgm:pt modelId="{DA6F478A-E63B-4799-A1CD-D608593DA8C5}" type="pres">
-      <dgm:prSet presAssocID="{3B5ED621-3791-42F4-9AC9-380E64A161E1}" presName="compNode" presStyleCnt="0"/>
-      <dgm:spPr/>
-    </dgm:pt>
-    <dgm:pt modelId="{9674A3ED-0FB3-4A50-82B6-637831690554}" type="pres">
-      <dgm:prSet presAssocID="{3B5ED621-3791-42F4-9AC9-380E64A161E1}" presName="iconBgRect" presStyleLbl="bgShp" presStyleIdx="2" presStyleCnt="3"/>
-      <dgm:spPr/>
-    </dgm:pt>
-    <dgm:pt modelId="{C1894696-0CF4-4201-83E0-B03F8126D092}" type="pres">
-      <dgm:prSet presAssocID="{3B5ED621-3791-42F4-9AC9-380E64A161E1}" presName="iconRect" presStyleLbl="node1" presStyleIdx="2" presStyleCnt="3"/>
-      <dgm:spPr>
-        <a:blipFill>
-          <a:blip xmlns:r="http://schemas.openxmlformats.org/officeDocument/2006/relationships" r:embed="rId5">
-            <a:extLst>
-              <a:ext uri="{28A0092B-C50C-407E-A947-70E740481C1C}">
-                <a14:useLocalDpi xmlns:a14="http://schemas.microsoft.com/office/drawing/2010/main" val="0"/>
-              </a:ext>
-              <a:ext uri="{96DAC541-7B7A-43D3-8B79-37D633B846F1}">
-                <asvg:svgBlip xmlns:asvg="http://schemas.microsoft.com/office/drawing/2016/SVG/main" r:embed="rId6"/>
-              </a:ext>
-            </a:extLst>
-          </a:blip>
-          <a:stretch>
-            <a:fillRect/>
-          </a:stretch>
-        </a:blipFill>
-        <a:ln>
-          <a:noFill/>
-        </a:ln>
-      </dgm:spPr>
-      <dgm:extLst>
-        <a:ext uri="{E40237B7-FDA0-4F09-8148-C483321AD2D9}">
-          <dgm14:cNvPr xmlns:dgm14="http://schemas.microsoft.com/office/drawing/2010/diagram" id="0" name="" descr="Corazón"/>
-        </a:ext>
-      </dgm:extLst>
-    </dgm:pt>
-    <dgm:pt modelId="{95DDFFBD-BCE4-4E91-A25E-ADEA4EB9B508}" type="pres">
-      <dgm:prSet presAssocID="{3B5ED621-3791-42F4-9AC9-380E64A161E1}" presName="spaceRect" presStyleCnt="0"/>
-      <dgm:spPr/>
-    </dgm:pt>
-    <dgm:pt modelId="{23B57531-8323-4904-87B9-09857A5D7F8C}" type="pres">
-      <dgm:prSet presAssocID="{3B5ED621-3791-42F4-9AC9-380E64A161E1}" presName="textRect" presStyleLbl="revTx" presStyleIdx="2" presStyleCnt="3">
-        <dgm:presLayoutVars>
-          <dgm:chMax val="1"/>
-          <dgm:chPref val="1"/>
-        </dgm:presLayoutVars>
-      </dgm:prSet>
-      <dgm:spPr/>
-    </dgm:pt>
-  </dgm:ptLst>
-  <dgm:cxnLst>
-    <dgm:cxn modelId="{5A730949-590D-4963-85B2-D828F12E0A9C}" srcId="{B9DCE5F2-2D28-417E-928C-8183502D9C31}" destId="{3B5ED621-3791-42F4-9AC9-380E64A161E1}" srcOrd="2" destOrd="0" parTransId="{6D145F9F-CFAF-4B1E-8BC2-8EB51607290B}" sibTransId="{985A20DE-5071-4276-A5E1-A2E38CBEF2ED}"/>
-    <dgm:cxn modelId="{B1A84A56-C1B6-40B9-BBD0-44CA1266424E}" srcId="{B9DCE5F2-2D28-417E-928C-8183502D9C31}" destId="{7EBF6446-F6C4-4D89-AA83-96555B480742}" srcOrd="0" destOrd="0" parTransId="{8BD96D63-4F5A-4318-B47B-CD9C7A6A1F09}" sibTransId="{3F0EBE6C-E28C-483D-8058-BA02BB25F5DD}"/>
-    <dgm:cxn modelId="{058FE469-3681-45D1-B4FF-238B54EC1CDF}" type="presOf" srcId="{F7B4FC59-3420-4B71-B780-03F580390539}" destId="{8F02040F-85AA-4390-A915-8C784D9C92E7}" srcOrd="0" destOrd="0" presId="urn:microsoft.com/office/officeart/2018/5/layout/IconCircleLabelList"/>
-    <dgm:cxn modelId="{EBA84082-1F93-4059-BDEC-D91CC30879F2}" type="presOf" srcId="{3B5ED621-3791-42F4-9AC9-380E64A161E1}" destId="{23B57531-8323-4904-87B9-09857A5D7F8C}" srcOrd="0" destOrd="0" presId="urn:microsoft.com/office/officeart/2018/5/layout/IconCircleLabelList"/>
-    <dgm:cxn modelId="{E272B79E-6278-451E-8EB2-5BB7624B7625}" srcId="{B9DCE5F2-2D28-417E-928C-8183502D9C31}" destId="{F7B4FC59-3420-4B71-B780-03F580390539}" srcOrd="1" destOrd="0" parTransId="{C16E2B8E-F957-41EB-B09E-AE3FD5DDCA63}" sibTransId="{8E645F21-55B0-4F5A-88F1-C7E14F5579C5}"/>
-    <dgm:cxn modelId="{8A0435A9-21F8-468E-B77E-DED5A7C5DEF8}" type="presOf" srcId="{B9DCE5F2-2D28-417E-928C-8183502D9C31}" destId="{AE982C75-65E4-46AF-B29D-6356596452B5}" srcOrd="0" destOrd="0" presId="urn:microsoft.com/office/officeart/2018/5/layout/IconCircleLabelList"/>
-    <dgm:cxn modelId="{64BDCCAA-3B97-4DE6-873C-E92B76A7A7D3}" type="presOf" srcId="{7EBF6446-F6C4-4D89-AA83-96555B480742}" destId="{3CCB6D46-87B8-4393-A5F3-F910AE2F0D95}" srcOrd="0" destOrd="0" presId="urn:microsoft.com/office/officeart/2018/5/layout/IconCircleLabelList"/>
-    <dgm:cxn modelId="{AA7245F5-1D67-4057-9F6B-C99D8E20669A}" type="presParOf" srcId="{AE982C75-65E4-46AF-B29D-6356596452B5}" destId="{186CCF56-77FD-4ACB-8B16-065017AFA33D}" srcOrd="0" destOrd="0" presId="urn:microsoft.com/office/officeart/2018/5/layout/IconCircleLabelList"/>
-    <dgm:cxn modelId="{815F8C7C-429E-4979-8297-F728316878DA}" type="presParOf" srcId="{186CCF56-77FD-4ACB-8B16-065017AFA33D}" destId="{6AE76129-B04C-4D24-8268-E2D57B91584D}" srcOrd="0" destOrd="0" presId="urn:microsoft.com/office/officeart/2018/5/layout/IconCircleLabelList"/>
-    <dgm:cxn modelId="{476CC9F9-F5AA-4A2D-B746-9150D38BE755}" type="presParOf" srcId="{186CCF56-77FD-4ACB-8B16-065017AFA33D}" destId="{00B469F6-B21B-4356-90BB-30A3A1001A00}" srcOrd="1" destOrd="0" presId="urn:microsoft.com/office/officeart/2018/5/layout/IconCircleLabelList"/>
-    <dgm:cxn modelId="{451F6880-273F-46D0-AFAE-6C1CF81A9743}" type="presParOf" srcId="{186CCF56-77FD-4ACB-8B16-065017AFA33D}" destId="{53C8091E-2E23-458B-A130-0819A0CACEDD}" srcOrd="2" destOrd="0" presId="urn:microsoft.com/office/officeart/2018/5/layout/IconCircleLabelList"/>
-    <dgm:cxn modelId="{F634AC86-CDE0-4E82-B3D1-E117CD3A69DB}" type="presParOf" srcId="{186CCF56-77FD-4ACB-8B16-065017AFA33D}" destId="{3CCB6D46-87B8-4393-A5F3-F910AE2F0D95}" srcOrd="3" destOrd="0" presId="urn:microsoft.com/office/officeart/2018/5/layout/IconCircleLabelList"/>
-    <dgm:cxn modelId="{ABF23D83-E084-416F-A051-D1D21C0DDE77}" type="presParOf" srcId="{AE982C75-65E4-46AF-B29D-6356596452B5}" destId="{CD123488-478A-42E0-9386-98A70FD70FBB}" srcOrd="1" destOrd="0" presId="urn:microsoft.com/office/officeart/2018/5/layout/IconCircleLabelList"/>
-    <dgm:cxn modelId="{1EFFE01E-7F9D-44EE-9F5D-6B7D8C731CD7}" type="presParOf" srcId="{AE982C75-65E4-46AF-B29D-6356596452B5}" destId="{E8BF1A8D-AFF1-4CB9-8221-162DFDB0F663}" srcOrd="2" destOrd="0" presId="urn:microsoft.com/office/officeart/2018/5/layout/IconCircleLabelList"/>
-    <dgm:cxn modelId="{101A6C51-DFB8-4FBD-A04C-2F780B3F6A36}" type="presParOf" srcId="{E8BF1A8D-AFF1-4CB9-8221-162DFDB0F663}" destId="{0E4AAEB2-7285-4E8C-8562-09B487B4744D}" srcOrd="0" destOrd="0" presId="urn:microsoft.com/office/officeart/2018/5/layout/IconCircleLabelList"/>
-    <dgm:cxn modelId="{8A814456-275E-43A6-9B2A-350FF504239E}" type="presParOf" srcId="{E8BF1A8D-AFF1-4CB9-8221-162DFDB0F663}" destId="{53589C16-69BA-4D84-8FC0-7C9C57CBF283}" srcOrd="1" destOrd="0" presId="urn:microsoft.com/office/officeart/2018/5/layout/IconCircleLabelList"/>
-    <dgm:cxn modelId="{0EDA7EEB-5007-4E3D-8DBD-E4BC26877926}" type="presParOf" srcId="{E8BF1A8D-AFF1-4CB9-8221-162DFDB0F663}" destId="{EE742E5A-23B3-4D17-B6AE-B4CA55F3FA6C}" srcOrd="2" destOrd="0" presId="urn:microsoft.com/office/officeart/2018/5/layout/IconCircleLabelList"/>
-    <dgm:cxn modelId="{D7D50DBC-AF65-4889-B7A5-DCD6F48E8C3D}" type="presParOf" srcId="{E8BF1A8D-AFF1-4CB9-8221-162DFDB0F663}" destId="{8F02040F-85AA-4390-A915-8C784D9C92E7}" srcOrd="3" destOrd="0" presId="urn:microsoft.com/office/officeart/2018/5/layout/IconCircleLabelList"/>
-    <dgm:cxn modelId="{209C2568-A57C-4A64-ABFC-725CB1D5B720}" type="presParOf" srcId="{AE982C75-65E4-46AF-B29D-6356596452B5}" destId="{56416590-7531-4388-9D02-A8023642F0A6}" srcOrd="3" destOrd="0" presId="urn:microsoft.com/office/officeart/2018/5/layout/IconCircleLabelList"/>
-    <dgm:cxn modelId="{B43ACE8B-D258-4C72-A1BC-30A6C7833628}" type="presParOf" srcId="{AE982C75-65E4-46AF-B29D-6356596452B5}" destId="{DA6F478A-E63B-4799-A1CD-D608593DA8C5}" srcOrd="4" destOrd="0" presId="urn:microsoft.com/office/officeart/2018/5/layout/IconCircleLabelList"/>
-    <dgm:cxn modelId="{85BAE487-6C38-46DD-9549-3CDEFAF2090F}" type="presParOf" srcId="{DA6F478A-E63B-4799-A1CD-D608593DA8C5}" destId="{9674A3ED-0FB3-4A50-82B6-637831690554}" srcOrd="0" destOrd="0" presId="urn:microsoft.com/office/officeart/2018/5/layout/IconCircleLabelList"/>
-    <dgm:cxn modelId="{29BB894C-610E-4158-9A33-54A8399B20DC}" type="presParOf" srcId="{DA6F478A-E63B-4799-A1CD-D608593DA8C5}" destId="{C1894696-0CF4-4201-83E0-B03F8126D092}" srcOrd="1" destOrd="0" presId="urn:microsoft.com/office/officeart/2018/5/layout/IconCircleLabelList"/>
-    <dgm:cxn modelId="{56DBE95B-F3A9-4DEF-95EA-C3DC1B7C3AE0}" type="presParOf" srcId="{DA6F478A-E63B-4799-A1CD-D608593DA8C5}" destId="{95DDFFBD-BCE4-4E91-A25E-ADEA4EB9B508}" srcOrd="2" destOrd="0" presId="urn:microsoft.com/office/officeart/2018/5/layout/IconCircleLabelList"/>
-    <dgm:cxn modelId="{320E8541-95C4-47C6-8CEC-0A35AC95079D}" type="presParOf" srcId="{DA6F478A-E63B-4799-A1CD-D608593DA8C5}" destId="{23B57531-8323-4904-87B9-09857A5D7F8C}" srcOrd="3" destOrd="0" presId="urn:microsoft.com/office/officeart/2018/5/layout/IconCircleLabelList"/>
-  </dgm:cxnLst>
-  <dgm:bg/>
-  <dgm:whole/>
-  <dgm:extLst>
-    <a:ext uri="http://schemas.microsoft.com/office/drawing/2008/diagram">
-      <dsp:dataModelExt xmlns:dsp="http://schemas.microsoft.com/office/drawing/2008/diagram" relId="rId6" minVer="http://schemas.openxmlformats.org/drawingml/2006/diagram"/>
-    </a:ext>
-  </dgm:extLst>
-</dgm:dataModel>
-</file>
-
-<file path=ppt/diagrams/data7.xml><?xml version="1.0" encoding="utf-8"?>
 <dgm:dataModel xmlns:dgm="http://schemas.openxmlformats.org/drawingml/2006/diagram" xmlns:a="http://schemas.openxmlformats.org/drawingml/2006/main">
   <dgm:ptLst>
     <dgm:pt modelId="{CC23B8D3-0EC8-47EB-A6D7-8507418FF820}" type="doc">
@@ -9338,7 +8257,7 @@
 </dgm:dataModel>
 </file>
 
-<file path=ppt/diagrams/data8.xml><?xml version="1.0" encoding="utf-8"?>
+<file path=ppt/diagrams/data7.xml><?xml version="1.0" encoding="utf-8"?>
 <dgm:dataModel xmlns:dgm="http://schemas.openxmlformats.org/drawingml/2006/diagram" xmlns:a="http://schemas.openxmlformats.org/drawingml/2006/main">
   <dgm:ptLst>
     <dgm:pt modelId="{921FBF86-915A-4ABD-AB2E-8788D62DC029}" type="doc">
@@ -9640,7 +8559,7 @@
 </dgm:dataModel>
 </file>
 
-<file path=ppt/diagrams/data9.xml><?xml version="1.0" encoding="utf-8"?>
+<file path=ppt/diagrams/data8.xml><?xml version="1.0" encoding="utf-8"?>
 <dgm:dataModel xmlns:dgm="http://schemas.openxmlformats.org/drawingml/2006/diagram" xmlns:a="http://schemas.openxmlformats.org/drawingml/2006/main">
   <dgm:ptLst>
     <dgm:pt modelId="{11F28634-D439-4B4E-A42A-88178BAD8153}" type="doc">
@@ -11781,10 +10700,10 @@
             <a:defRPr cap="all"/>
           </a:pPr>
           <a:r>
-            <a:rPr lang="es-ES_tradnl" sz="2700" kern="1200"/>
+            <a:rPr lang="es-ES_tradnl" sz="2700" strike="sngStrike" kern="1200" dirty="0"/>
             <a:t>Integridad</a:t>
           </a:r>
-          <a:endParaRPr lang="en-US" sz="2700" kern="1200"/>
+          <a:endParaRPr lang="en-US" sz="2700" strike="sngStrike" kern="1200" dirty="0"/>
         </a:p>
       </dsp:txBody>
       <dsp:txXfrm>
@@ -12083,10 +11002,14 @@
             <a:defRPr cap="all"/>
           </a:pPr>
           <a:r>
-            <a:rPr lang="es-ES_tradnl" sz="2700" kern="1200"/>
-            <a:t>Autenticidad </a:t>
+            <a:rPr lang="es-ES_tradnl" sz="2700" strike="sngStrike" kern="1200" dirty="0"/>
+            <a:t>Autenticidad</a:t>
           </a:r>
-          <a:endParaRPr lang="en-US" sz="2700" kern="1200"/>
+          <a:r>
+            <a:rPr lang="es-ES_tradnl" sz="2700" kern="1200" dirty="0"/>
+            <a:t> </a:t>
+          </a:r>
+          <a:endParaRPr lang="en-US" sz="2700" kern="1200" dirty="0"/>
         </a:p>
       </dsp:txBody>
       <dsp:txXfrm>
@@ -12099,474 +11022,6 @@
 </file>
 
 <file path=ppt/diagrams/drawing6.xml><?xml version="1.0" encoding="utf-8"?>
-<dsp:drawing xmlns:dgm="http://schemas.openxmlformats.org/drawingml/2006/diagram" xmlns:dsp="http://schemas.microsoft.com/office/drawing/2008/diagram" xmlns:a="http://schemas.openxmlformats.org/drawingml/2006/main">
-  <dsp:spTree>
-    <dsp:nvGrpSpPr>
-      <dsp:cNvPr id="0" name=""/>
-      <dsp:cNvGrpSpPr/>
-    </dsp:nvGrpSpPr>
-    <dsp:grpSpPr/>
-    <dsp:sp modelId="{6AE76129-B04C-4D24-8268-E2D57B91584D}">
-      <dsp:nvSpPr>
-        <dsp:cNvPr id="0" name=""/>
-        <dsp:cNvSpPr/>
-      </dsp:nvSpPr>
-      <dsp:spPr>
-        <a:xfrm>
-          <a:off x="718664" y="453902"/>
-          <a:ext cx="1955812" cy="1955812"/>
-        </a:xfrm>
-        <a:prstGeom prst="ellipse">
-          <a:avLst/>
-        </a:prstGeom>
-        <a:solidFill>
-          <a:schemeClr val="bg1">
-            <a:lumMod val="95000"/>
-            <a:hueOff val="0"/>
-            <a:satOff val="0"/>
-            <a:lumOff val="0"/>
-            <a:alphaOff val="0"/>
-          </a:schemeClr>
-        </a:solidFill>
-        <a:ln>
-          <a:noFill/>
-        </a:ln>
-        <a:effectLst/>
-      </dsp:spPr>
-      <dsp:style>
-        <a:lnRef idx="0">
-          <a:scrgbClr r="0" g="0" b="0"/>
-        </a:lnRef>
-        <a:fillRef idx="1">
-          <a:scrgbClr r="0" g="0" b="0"/>
-        </a:fillRef>
-        <a:effectRef idx="0">
-          <a:scrgbClr r="0" g="0" b="0"/>
-        </a:effectRef>
-        <a:fontRef idx="minor"/>
-      </dsp:style>
-    </dsp:sp>
-    <dsp:sp modelId="{00B469F6-B21B-4356-90BB-30A3A1001A00}">
-      <dsp:nvSpPr>
-        <dsp:cNvPr id="0" name=""/>
-        <dsp:cNvSpPr/>
-      </dsp:nvSpPr>
-      <dsp:spPr>
-        <a:xfrm>
-          <a:off x="1135476" y="870715"/>
-          <a:ext cx="1122187" cy="1122187"/>
-        </a:xfrm>
-        <a:prstGeom prst="rect">
-          <a:avLst/>
-        </a:prstGeom>
-        <a:blipFill>
-          <a:blip xmlns:r="http://schemas.openxmlformats.org/officeDocument/2006/relationships" r:embed="rId1">
-            <a:extLst>
-              <a:ext uri="{28A0092B-C50C-407E-A947-70E740481C1C}">
-                <a14:useLocalDpi xmlns:a14="http://schemas.microsoft.com/office/drawing/2010/main" val="0"/>
-              </a:ext>
-              <a:ext uri="{96DAC541-7B7A-43D3-8B79-37D633B846F1}">
-                <asvg:svgBlip xmlns:asvg="http://schemas.microsoft.com/office/drawing/2016/SVG/main" r:embed="rId2"/>
-              </a:ext>
-            </a:extLst>
-          </a:blip>
-          <a:stretch>
-            <a:fillRect/>
-          </a:stretch>
-        </a:blipFill>
-        <a:ln w="19050" cap="flat" cmpd="sng" algn="ctr">
-          <a:noFill/>
-          <a:prstDash val="solid"/>
-          <a:miter lim="800000"/>
-        </a:ln>
-        <a:effectLst/>
-      </dsp:spPr>
-      <dsp:style>
-        <a:lnRef idx="2">
-          <a:scrgbClr r="0" g="0" b="0"/>
-        </a:lnRef>
-        <a:fillRef idx="1">
-          <a:scrgbClr r="0" g="0" b="0"/>
-        </a:fillRef>
-        <a:effectRef idx="0">
-          <a:scrgbClr r="0" g="0" b="0"/>
-        </a:effectRef>
-        <a:fontRef idx="minor">
-          <a:schemeClr val="lt1"/>
-        </a:fontRef>
-      </dsp:style>
-    </dsp:sp>
-    <dsp:sp modelId="{3CCB6D46-87B8-4393-A5F3-F910AE2F0D95}">
-      <dsp:nvSpPr>
-        <dsp:cNvPr id="0" name=""/>
-        <dsp:cNvSpPr/>
-      </dsp:nvSpPr>
-      <dsp:spPr>
-        <a:xfrm>
-          <a:off x="93445" y="3018902"/>
-          <a:ext cx="3206250" cy="720000"/>
-        </a:xfrm>
-        <a:prstGeom prst="rect">
-          <a:avLst/>
-        </a:prstGeom>
-        <a:noFill/>
-        <a:ln>
-          <a:noFill/>
-        </a:ln>
-        <a:effectLst/>
-      </dsp:spPr>
-      <dsp:style>
-        <a:lnRef idx="0">
-          <a:scrgbClr r="0" g="0" b="0"/>
-        </a:lnRef>
-        <a:fillRef idx="0">
-          <a:scrgbClr r="0" g="0" b="0"/>
-        </a:fillRef>
-        <a:effectRef idx="0">
-          <a:scrgbClr r="0" g="0" b="0"/>
-        </a:effectRef>
-        <a:fontRef idx="minor"/>
-      </dsp:style>
-      <dsp:txBody>
-        <a:bodyPr spcFirstLastPara="0" vert="horz" wrap="square" lIns="0" tIns="0" rIns="0" bIns="0" numCol="1" spcCol="1270" anchor="t" anchorCtr="0">
-          <a:noAutofit/>
-        </a:bodyPr>
-        <a:lstStyle/>
-        <a:p>
-          <a:pPr marL="0" lvl="0" indent="0" algn="ctr" defTabSz="1200150">
-            <a:lnSpc>
-              <a:spcPct val="90000"/>
-            </a:lnSpc>
-            <a:spcBef>
-              <a:spcPct val="0"/>
-            </a:spcBef>
-            <a:spcAft>
-              <a:spcPct val="35000"/>
-            </a:spcAft>
-            <a:buNone/>
-            <a:defRPr cap="all"/>
-          </a:pPr>
-          <a:r>
-            <a:rPr lang="es-ES_tradnl" sz="2700" strike="sngStrike" kern="1200" dirty="0"/>
-            <a:t>Integridad</a:t>
-          </a:r>
-          <a:endParaRPr lang="en-US" sz="2700" strike="sngStrike" kern="1200" dirty="0"/>
-        </a:p>
-      </dsp:txBody>
-      <dsp:txXfrm>
-        <a:off x="93445" y="3018902"/>
-        <a:ext cx="3206250" cy="720000"/>
-      </dsp:txXfrm>
-    </dsp:sp>
-    <dsp:sp modelId="{0E4AAEB2-7285-4E8C-8562-09B487B4744D}">
-      <dsp:nvSpPr>
-        <dsp:cNvPr id="0" name=""/>
-        <dsp:cNvSpPr/>
-      </dsp:nvSpPr>
-      <dsp:spPr>
-        <a:xfrm>
-          <a:off x="4486008" y="453902"/>
-          <a:ext cx="1955812" cy="1955812"/>
-        </a:xfrm>
-        <a:prstGeom prst="ellipse">
-          <a:avLst/>
-        </a:prstGeom>
-        <a:solidFill>
-          <a:schemeClr val="bg1">
-            <a:lumMod val="95000"/>
-            <a:hueOff val="0"/>
-            <a:satOff val="0"/>
-            <a:lumOff val="0"/>
-            <a:alphaOff val="0"/>
-          </a:schemeClr>
-        </a:solidFill>
-        <a:ln>
-          <a:noFill/>
-        </a:ln>
-        <a:effectLst/>
-      </dsp:spPr>
-      <dsp:style>
-        <a:lnRef idx="0">
-          <a:scrgbClr r="0" g="0" b="0"/>
-        </a:lnRef>
-        <a:fillRef idx="1">
-          <a:scrgbClr r="0" g="0" b="0"/>
-        </a:fillRef>
-        <a:effectRef idx="0">
-          <a:scrgbClr r="0" g="0" b="0"/>
-        </a:effectRef>
-        <a:fontRef idx="minor"/>
-      </dsp:style>
-    </dsp:sp>
-    <dsp:sp modelId="{53589C16-69BA-4D84-8FC0-7C9C57CBF283}">
-      <dsp:nvSpPr>
-        <dsp:cNvPr id="0" name=""/>
-        <dsp:cNvSpPr/>
-      </dsp:nvSpPr>
-      <dsp:spPr>
-        <a:xfrm>
-          <a:off x="4902820" y="870715"/>
-          <a:ext cx="1122187" cy="1122187"/>
-        </a:xfrm>
-        <a:prstGeom prst="rect">
-          <a:avLst/>
-        </a:prstGeom>
-        <a:blipFill>
-          <a:blip xmlns:r="http://schemas.openxmlformats.org/officeDocument/2006/relationships" r:embed="rId3">
-            <a:extLst>
-              <a:ext uri="{28A0092B-C50C-407E-A947-70E740481C1C}">
-                <a14:useLocalDpi xmlns:a14="http://schemas.microsoft.com/office/drawing/2010/main" val="0"/>
-              </a:ext>
-              <a:ext uri="{96DAC541-7B7A-43D3-8B79-37D633B846F1}">
-                <asvg:svgBlip xmlns:asvg="http://schemas.microsoft.com/office/drawing/2016/SVG/main" r:embed="rId4"/>
-              </a:ext>
-            </a:extLst>
-          </a:blip>
-          <a:stretch>
-            <a:fillRect/>
-          </a:stretch>
-        </a:blipFill>
-        <a:ln w="19050" cap="flat" cmpd="sng" algn="ctr">
-          <a:noFill/>
-          <a:prstDash val="solid"/>
-          <a:miter lim="800000"/>
-        </a:ln>
-        <a:effectLst/>
-      </dsp:spPr>
-      <dsp:style>
-        <a:lnRef idx="2">
-          <a:scrgbClr r="0" g="0" b="0"/>
-        </a:lnRef>
-        <a:fillRef idx="1">
-          <a:scrgbClr r="0" g="0" b="0"/>
-        </a:fillRef>
-        <a:effectRef idx="0">
-          <a:scrgbClr r="0" g="0" b="0"/>
-        </a:effectRef>
-        <a:fontRef idx="minor">
-          <a:schemeClr val="lt1"/>
-        </a:fontRef>
-      </dsp:style>
-    </dsp:sp>
-    <dsp:sp modelId="{8F02040F-85AA-4390-A915-8C784D9C92E7}">
-      <dsp:nvSpPr>
-        <dsp:cNvPr id="0" name=""/>
-        <dsp:cNvSpPr/>
-      </dsp:nvSpPr>
-      <dsp:spPr>
-        <a:xfrm>
-          <a:off x="3860789" y="3018902"/>
-          <a:ext cx="3206250" cy="720000"/>
-        </a:xfrm>
-        <a:prstGeom prst="rect">
-          <a:avLst/>
-        </a:prstGeom>
-        <a:noFill/>
-        <a:ln>
-          <a:noFill/>
-        </a:ln>
-        <a:effectLst/>
-      </dsp:spPr>
-      <dsp:style>
-        <a:lnRef idx="0">
-          <a:scrgbClr r="0" g="0" b="0"/>
-        </a:lnRef>
-        <a:fillRef idx="0">
-          <a:scrgbClr r="0" g="0" b="0"/>
-        </a:fillRef>
-        <a:effectRef idx="0">
-          <a:scrgbClr r="0" g="0" b="0"/>
-        </a:effectRef>
-        <a:fontRef idx="minor"/>
-      </dsp:style>
-      <dsp:txBody>
-        <a:bodyPr spcFirstLastPara="0" vert="horz" wrap="square" lIns="0" tIns="0" rIns="0" bIns="0" numCol="1" spcCol="1270" anchor="t" anchorCtr="0">
-          <a:noAutofit/>
-        </a:bodyPr>
-        <a:lstStyle/>
-        <a:p>
-          <a:pPr marL="0" lvl="0" indent="0" algn="ctr" defTabSz="1200150">
-            <a:lnSpc>
-              <a:spcPct val="90000"/>
-            </a:lnSpc>
-            <a:spcBef>
-              <a:spcPct val="0"/>
-            </a:spcBef>
-            <a:spcAft>
-              <a:spcPct val="35000"/>
-            </a:spcAft>
-            <a:buNone/>
-            <a:defRPr cap="all"/>
-          </a:pPr>
-          <a:r>
-            <a:rPr lang="es-ES_tradnl" sz="2700" strike="sngStrike" kern="1200" dirty="0"/>
-            <a:t>Confidencialidad</a:t>
-          </a:r>
-          <a:endParaRPr lang="en-US" sz="2700" strike="sngStrike" kern="1200" dirty="0"/>
-        </a:p>
-      </dsp:txBody>
-      <dsp:txXfrm>
-        <a:off x="3860789" y="3018902"/>
-        <a:ext cx="3206250" cy="720000"/>
-      </dsp:txXfrm>
-    </dsp:sp>
-    <dsp:sp modelId="{9674A3ED-0FB3-4A50-82B6-637831690554}">
-      <dsp:nvSpPr>
-        <dsp:cNvPr id="0" name=""/>
-        <dsp:cNvSpPr/>
-      </dsp:nvSpPr>
-      <dsp:spPr>
-        <a:xfrm>
-          <a:off x="8253352" y="453902"/>
-          <a:ext cx="1955812" cy="1955812"/>
-        </a:xfrm>
-        <a:prstGeom prst="ellipse">
-          <a:avLst/>
-        </a:prstGeom>
-        <a:solidFill>
-          <a:schemeClr val="bg1">
-            <a:lumMod val="95000"/>
-            <a:hueOff val="0"/>
-            <a:satOff val="0"/>
-            <a:lumOff val="0"/>
-            <a:alphaOff val="0"/>
-          </a:schemeClr>
-        </a:solidFill>
-        <a:ln>
-          <a:noFill/>
-        </a:ln>
-        <a:effectLst/>
-      </dsp:spPr>
-      <dsp:style>
-        <a:lnRef idx="0">
-          <a:scrgbClr r="0" g="0" b="0"/>
-        </a:lnRef>
-        <a:fillRef idx="1">
-          <a:scrgbClr r="0" g="0" b="0"/>
-        </a:fillRef>
-        <a:effectRef idx="0">
-          <a:scrgbClr r="0" g="0" b="0"/>
-        </a:effectRef>
-        <a:fontRef idx="minor"/>
-      </dsp:style>
-    </dsp:sp>
-    <dsp:sp modelId="{C1894696-0CF4-4201-83E0-B03F8126D092}">
-      <dsp:nvSpPr>
-        <dsp:cNvPr id="0" name=""/>
-        <dsp:cNvSpPr/>
-      </dsp:nvSpPr>
-      <dsp:spPr>
-        <a:xfrm>
-          <a:off x="8670164" y="870715"/>
-          <a:ext cx="1122187" cy="1122187"/>
-        </a:xfrm>
-        <a:prstGeom prst="rect">
-          <a:avLst/>
-        </a:prstGeom>
-        <a:blipFill>
-          <a:blip xmlns:r="http://schemas.openxmlformats.org/officeDocument/2006/relationships" r:embed="rId5">
-            <a:extLst>
-              <a:ext uri="{28A0092B-C50C-407E-A947-70E740481C1C}">
-                <a14:useLocalDpi xmlns:a14="http://schemas.microsoft.com/office/drawing/2010/main" val="0"/>
-              </a:ext>
-              <a:ext uri="{96DAC541-7B7A-43D3-8B79-37D633B846F1}">
-                <asvg:svgBlip xmlns:asvg="http://schemas.microsoft.com/office/drawing/2016/SVG/main" r:embed="rId6"/>
-              </a:ext>
-            </a:extLst>
-          </a:blip>
-          <a:stretch>
-            <a:fillRect/>
-          </a:stretch>
-        </a:blipFill>
-        <a:ln w="19050" cap="flat" cmpd="sng" algn="ctr">
-          <a:noFill/>
-          <a:prstDash val="solid"/>
-          <a:miter lim="800000"/>
-        </a:ln>
-        <a:effectLst/>
-      </dsp:spPr>
-      <dsp:style>
-        <a:lnRef idx="2">
-          <a:scrgbClr r="0" g="0" b="0"/>
-        </a:lnRef>
-        <a:fillRef idx="1">
-          <a:scrgbClr r="0" g="0" b="0"/>
-        </a:fillRef>
-        <a:effectRef idx="0">
-          <a:scrgbClr r="0" g="0" b="0"/>
-        </a:effectRef>
-        <a:fontRef idx="minor">
-          <a:schemeClr val="lt1"/>
-        </a:fontRef>
-      </dsp:style>
-    </dsp:sp>
-    <dsp:sp modelId="{23B57531-8323-4904-87B9-09857A5D7F8C}">
-      <dsp:nvSpPr>
-        <dsp:cNvPr id="0" name=""/>
-        <dsp:cNvSpPr/>
-      </dsp:nvSpPr>
-      <dsp:spPr>
-        <a:xfrm>
-          <a:off x="7628133" y="3018902"/>
-          <a:ext cx="3206250" cy="720000"/>
-        </a:xfrm>
-        <a:prstGeom prst="rect">
-          <a:avLst/>
-        </a:prstGeom>
-        <a:noFill/>
-        <a:ln>
-          <a:noFill/>
-        </a:ln>
-        <a:effectLst/>
-      </dsp:spPr>
-      <dsp:style>
-        <a:lnRef idx="0">
-          <a:scrgbClr r="0" g="0" b="0"/>
-        </a:lnRef>
-        <a:fillRef idx="0">
-          <a:scrgbClr r="0" g="0" b="0"/>
-        </a:fillRef>
-        <a:effectRef idx="0">
-          <a:scrgbClr r="0" g="0" b="0"/>
-        </a:effectRef>
-        <a:fontRef idx="minor"/>
-      </dsp:style>
-      <dsp:txBody>
-        <a:bodyPr spcFirstLastPara="0" vert="horz" wrap="square" lIns="0" tIns="0" rIns="0" bIns="0" numCol="1" spcCol="1270" anchor="t" anchorCtr="0">
-          <a:noAutofit/>
-        </a:bodyPr>
-        <a:lstStyle/>
-        <a:p>
-          <a:pPr marL="0" lvl="0" indent="0" algn="ctr" defTabSz="1200150">
-            <a:lnSpc>
-              <a:spcPct val="90000"/>
-            </a:lnSpc>
-            <a:spcBef>
-              <a:spcPct val="0"/>
-            </a:spcBef>
-            <a:spcAft>
-              <a:spcPct val="35000"/>
-            </a:spcAft>
-            <a:buNone/>
-            <a:defRPr cap="all"/>
-          </a:pPr>
-          <a:r>
-            <a:rPr lang="es-ES_tradnl" sz="2700" kern="1200"/>
-            <a:t>Autenticidad </a:t>
-          </a:r>
-          <a:endParaRPr lang="en-US" sz="2700" kern="1200"/>
-        </a:p>
-      </dsp:txBody>
-      <dsp:txXfrm>
-        <a:off x="7628133" y="3018902"/>
-        <a:ext cx="3206250" cy="720000"/>
-      </dsp:txXfrm>
-    </dsp:sp>
-  </dsp:spTree>
-</dsp:drawing>
-</file>
-
-<file path=ppt/diagrams/drawing7.xml><?xml version="1.0" encoding="utf-8"?>
 <dsp:drawing xmlns:dgm="http://schemas.openxmlformats.org/drawingml/2006/diagram" xmlns:dsp="http://schemas.microsoft.com/office/drawing/2008/diagram" xmlns:a="http://schemas.openxmlformats.org/drawingml/2006/main">
   <dsp:spTree>
     <dsp:nvGrpSpPr>
@@ -13106,7 +11561,7 @@
 </dsp:drawing>
 </file>
 
-<file path=ppt/diagrams/drawing8.xml><?xml version="1.0" encoding="utf-8"?>
+<file path=ppt/diagrams/drawing7.xml><?xml version="1.0" encoding="utf-8"?>
 <dsp:drawing xmlns:dgm="http://schemas.openxmlformats.org/drawingml/2006/diagram" xmlns:dsp="http://schemas.microsoft.com/office/drawing/2008/diagram" xmlns:a="http://schemas.openxmlformats.org/drawingml/2006/main">
   <dsp:spTree>
     <dsp:nvGrpSpPr>
@@ -13618,7 +12073,7 @@
 </dsp:drawing>
 </file>
 
-<file path=ppt/diagrams/drawing9.xml><?xml version="1.0" encoding="utf-8"?>
+<file path=ppt/diagrams/drawing8.xml><?xml version="1.0" encoding="utf-8"?>
 <dsp:drawing xmlns:dgm="http://schemas.openxmlformats.org/drawingml/2006/diagram" xmlns:dsp="http://schemas.microsoft.com/office/drawing/2008/diagram" xmlns:a="http://schemas.openxmlformats.org/drawingml/2006/main">
   <dsp:spTree>
     <dsp:nvGrpSpPr>
@@ -14953,221 +13408,6 @@
 </file>
 
 <file path=ppt/diagrams/layout6.xml><?xml version="1.0" encoding="utf-8"?>
-<dgm:layoutDef xmlns:dgm="http://schemas.openxmlformats.org/drawingml/2006/diagram" xmlns:a="http://schemas.openxmlformats.org/drawingml/2006/main" uniqueId="urn:microsoft.com/office/officeart/2018/5/layout/IconCircleLabelList">
-  <dgm:title val="Icon Circle Label List"/>
-  <dgm:desc val="Use to show non-sequential or grouped chunks of information accompanied by a related visuals. Works best with icons or small pictures with short text captions."/>
-  <dgm:catLst>
-    <dgm:cat type="icon" pri="500"/>
-  </dgm:catLst>
-  <dgm:sampData useDef="1">
-    <dgm:dataModel>
-      <dgm:ptLst/>
-      <dgm:bg/>
-      <dgm:whole/>
-    </dgm:dataModel>
-  </dgm:sampData>
-  <dgm:styleData useDef="1">
-    <dgm:dataModel>
-      <dgm:ptLst/>
-      <dgm:bg/>
-      <dgm:whole/>
-    </dgm:dataModel>
-  </dgm:styleData>
-  <dgm:clrData useDef="1">
-    <dgm:dataModel>
-      <dgm:ptLst/>
-      <dgm:bg/>
-      <dgm:whole/>
-    </dgm:dataModel>
-  </dgm:clrData>
-  <dgm:layoutNode name="root">
-    <dgm:varLst>
-      <dgm:dir/>
-      <dgm:resizeHandles val="exact"/>
-    </dgm:varLst>
-    <dgm:choose name="Name0">
-      <dgm:if name="Name1" axis="self" func="var" arg="dir" op="equ" val="norm">
-        <dgm:alg type="snake">
-          <dgm:param type="grDir" val="tL"/>
-          <dgm:param type="flowDir" val="row"/>
-          <dgm:param type="contDir" val="sameDir"/>
-          <dgm:param type="off" val="ctr"/>
-          <dgm:param type="vertAlign" val="mid"/>
-          <dgm:param type="horzAlign" val="ctr"/>
-        </dgm:alg>
-      </dgm:if>
-      <dgm:else name="Name2">
-        <dgm:alg type="snake">
-          <dgm:param type="grDir" val="tR"/>
-          <dgm:param type="flowDir" val="row"/>
-          <dgm:param type="contDir" val="sameDir"/>
-          <dgm:param type="off" val="ctr"/>
-          <dgm:param type="vertAlign" val="mid"/>
-          <dgm:param type="horzAlign" val="ctr"/>
-        </dgm:alg>
-      </dgm:else>
-    </dgm:choose>
-    <dgm:shape xmlns:r="http://schemas.openxmlformats.org/officeDocument/2006/relationships" r:blip="">
-      <dgm:adjLst/>
-    </dgm:shape>
-    <dgm:presOf/>
-    <dgm:choose name="Name3">
-      <dgm:if name="Name4" axis="ch" ptType="node" func="cnt" op="lte" val="2">
-        <dgm:constrLst>
-          <dgm:constr type="h" for="ch" forName="compNode" refType="h" fact="0.4"/>
-          <dgm:constr type="w" for="ch" forName="compNode" val="100"/>
-          <dgm:constr type="w" for="ch" forName="sibTrans" refType="w" refFor="ch" refForName="compNode" fact="0.175"/>
-          <dgm:constr type="sp" refType="w" refFor="ch" refForName="compNode" op="equ" fact="0.25"/>
-          <dgm:constr type="primFontSz" for="des" ptType="node" op="equ" val="44"/>
-          <dgm:constr type="h" for="des" forName="compNode" op="equ"/>
-          <dgm:constr type="h" for="des" forName="textRect" op="equ"/>
-        </dgm:constrLst>
-      </dgm:if>
-      <dgm:if name="Name5" axis="ch" ptType="node" func="cnt" op="lte" val="3">
-        <dgm:constrLst>
-          <dgm:constr type="h" for="ch" forName="compNode" refType="h" fact="0.4"/>
-          <dgm:constr type="w" for="ch" forName="compNode" val="100"/>
-          <dgm:constr type="w" for="ch" forName="sibTrans" refType="w" refFor="ch" refForName="compNode" fact="0.175"/>
-          <dgm:constr type="sp" refType="w" refFor="ch" refForName="compNode" op="equ" fact="0.25"/>
-          <dgm:constr type="primFontSz" for="des" ptType="node" op="equ" val="40"/>
-          <dgm:constr type="h" for="des" forName="compNode" op="equ"/>
-          <dgm:constr type="h" for="des" forName="textRect" op="equ"/>
-        </dgm:constrLst>
-      </dgm:if>
-      <dgm:if name="Name6" axis="ch" ptType="node" func="cnt" op="lte" val="4">
-        <dgm:constrLst>
-          <dgm:constr type="h" for="ch" forName="compNode" refType="h" fact="0.4"/>
-          <dgm:constr type="w" for="ch" forName="compNode" refType="w"/>
-          <dgm:constr type="w" for="ch" forName="sibTrans" refType="w" refFor="ch" refForName="compNode" fact="0.175"/>
-          <dgm:constr type="sp" refType="w" refFor="ch" refForName="compNode" op="equ" fact="0.25"/>
-          <dgm:constr type="primFontSz" for="des" ptType="node" op="equ" val="32"/>
-          <dgm:constr type="h" for="des" forName="compNode" op="equ"/>
-          <dgm:constr type="h" for="des" forName="textRect" op="equ"/>
-        </dgm:constrLst>
-      </dgm:if>
-      <dgm:else name="Name7">
-        <dgm:constrLst>
-          <dgm:constr type="h" for="ch" forName="compNode" refType="h" fact="0.4"/>
-          <dgm:constr type="w" for="ch" forName="compNode" refType="w"/>
-          <dgm:constr type="w" for="ch" forName="sibTrans" refType="w" refFor="ch" refForName="compNode" fact="0.175"/>
-          <dgm:constr type="sp" refType="w" refFor="ch" refForName="compNode" op="equ" fact="0.25"/>
-          <dgm:constr type="primFontSz" for="des" ptType="node" op="equ" val="24"/>
-          <dgm:constr type="h" for="des" forName="compNode" op="equ"/>
-          <dgm:constr type="h" for="des" forName="textRect" op="equ"/>
-        </dgm:constrLst>
-      </dgm:else>
-    </dgm:choose>
-    <dgm:ruleLst>
-      <dgm:rule type="w" for="ch" forName="compNode" val="50" fact="NaN" max="NaN"/>
-    </dgm:ruleLst>
-    <dgm:forEach name="Name8" axis="ch" ptType="node">
-      <dgm:layoutNode name="compNode">
-        <dgm:alg type="composite"/>
-        <dgm:shape xmlns:r="http://schemas.openxmlformats.org/officeDocument/2006/relationships" r:blip="">
-          <dgm:adjLst/>
-        </dgm:shape>
-        <dgm:presOf axis="self"/>
-        <dgm:constrLst>
-          <dgm:constr type="w" for="ch" forName="iconBgRect" refType="w" fact="0.61"/>
-          <dgm:constr type="h" for="ch" forName="iconBgRect" refType="w" refFor="ch" refForName="iconBgRect"/>
-          <dgm:constr type="t" for="ch" forName="iconBgRect"/>
-          <dgm:constr type="ctrX" for="ch" forName="iconBgRect" refType="w" fact="0.5"/>
-          <dgm:constr type="w" for="ch" forName="iconRect" refType="w" fact="0.35"/>
-          <dgm:constr type="h" for="ch" forName="iconRect" refType="w" refFor="ch" refForName="iconRect"/>
-          <dgm:constr type="ctrX" for="ch" forName="iconRect" refType="ctrX" refFor="ch" refForName="iconBgRect"/>
-          <dgm:constr type="ctrY" for="ch" forName="iconRect" refType="ctrY" refFor="ch" refForName="iconBgRect"/>
-          <dgm:constr type="h" for="ch" forName="spaceRect" refType="w" fact="0.19"/>
-          <dgm:constr type="w" for="ch" forName="spaceRect" refType="w"/>
-          <dgm:constr type="l" for="ch" forName="spaceRect"/>
-          <dgm:constr type="t" for="ch" forName="spaceRect" refType="b" refFor="ch" refForName="iconBgRect"/>
-          <dgm:constr type="h" for="ch" forName="textRect" val="20"/>
-          <dgm:constr type="w" for="ch" forName="textRect" refType="w"/>
-          <dgm:constr type="l" for="ch" forName="textRect"/>
-          <dgm:constr type="t" for="ch" forName="textRect" refType="b" refFor="ch" refForName="spaceRect"/>
-        </dgm:constrLst>
-        <dgm:ruleLst>
-          <dgm:rule type="h" val="INF" fact="NaN" max="NaN"/>
-        </dgm:ruleLst>
-        <dgm:layoutNode name="iconBgRect" styleLbl="bgShp">
-          <dgm:alg type="sp"/>
-          <dgm:shape xmlns:r="http://schemas.openxmlformats.org/officeDocument/2006/relationships" type="ellipse" r:blip="">
-            <dgm:adjLst/>
-          </dgm:shape>
-          <dgm:presOf/>
-          <dgm:constrLst/>
-          <dgm:ruleLst/>
-        </dgm:layoutNode>
-        <dgm:layoutNode name="iconRect" styleLbl="node1">
-          <dgm:alg type="sp"/>
-          <dgm:shape xmlns:r="http://schemas.openxmlformats.org/officeDocument/2006/relationships" type="rect" r:blip="" blipPhldr="1">
-            <dgm:adjLst/>
-          </dgm:shape>
-          <dgm:presOf/>
-          <dgm:constrLst/>
-          <dgm:ruleLst/>
-        </dgm:layoutNode>
-        <dgm:layoutNode name="spaceRect">
-          <dgm:alg type="sp"/>
-          <dgm:shape xmlns:r="http://schemas.openxmlformats.org/officeDocument/2006/relationships" r:blip="">
-            <dgm:adjLst/>
-          </dgm:shape>
-          <dgm:presOf/>
-          <dgm:constrLst/>
-          <dgm:ruleLst/>
-        </dgm:layoutNode>
-        <dgm:layoutNode name="textRect" styleLbl="revTx">
-          <dgm:varLst>
-            <dgm:chMax val="1"/>
-            <dgm:chPref val="1"/>
-          </dgm:varLst>
-          <dgm:alg type="tx">
-            <dgm:param type="txAnchorVert" val="t"/>
-          </dgm:alg>
-          <dgm:shape xmlns:r="http://schemas.openxmlformats.org/officeDocument/2006/relationships" type="rect" r:blip="">
-            <dgm:adjLst/>
-          </dgm:shape>
-          <dgm:presOf axis="self" ptType="node"/>
-          <dgm:constrLst>
-            <dgm:constr type="lMarg"/>
-            <dgm:constr type="rMarg"/>
-            <dgm:constr type="tMarg"/>
-            <dgm:constr type="bMarg"/>
-          </dgm:constrLst>
-          <dgm:ruleLst>
-            <dgm:rule type="primFontSz" val="11" fact="NaN" max="NaN"/>
-            <dgm:rule type="h" val="INF" fact="NaN" max="NaN"/>
-          </dgm:ruleLst>
-        </dgm:layoutNode>
-      </dgm:layoutNode>
-      <dgm:forEach name="Name9" axis="followSib" ptType="sibTrans" cnt="1">
-        <dgm:layoutNode name="sibTrans">
-          <dgm:alg type="sp"/>
-          <dgm:shape xmlns:r="http://schemas.openxmlformats.org/officeDocument/2006/relationships" r:blip="">
-            <dgm:adjLst/>
-          </dgm:shape>
-          <dgm:presOf axis="self"/>
-          <dgm:constrLst/>
-          <dgm:ruleLst/>
-        </dgm:layoutNode>
-      </dgm:forEach>
-    </dgm:forEach>
-  </dgm:layoutNode>
-  <dgm:extLst>
-    <a:ext uri="{68A01E43-0DF5-4B5B-8FA6-DAF915123BFB}">
-      <dgm1612:lstStyle xmlns:dgm1612="http://schemas.microsoft.com/office/drawing/2016/12/diagram">
-        <a:lvl1pPr>
-          <a:lnSpc>
-            <a:spcPct val="100000"/>
-          </a:lnSpc>
-          <a:defRPr cap="all"/>
-        </a:lvl1pPr>
-      </dgm1612:lstStyle>
-    </a:ext>
-  </dgm:extLst>
-</dgm:layoutDef>
-</file>
-
-<file path=ppt/diagrams/layout7.xml><?xml version="1.0" encoding="utf-8"?>
 <dgm:layoutDef xmlns:dgm="http://schemas.openxmlformats.org/drawingml/2006/diagram" xmlns:a="http://schemas.openxmlformats.org/drawingml/2006/main" uniqueId="urn:microsoft.com/office/officeart/2005/8/layout/hierarchy1">
   <dgm:title val=""/>
   <dgm:desc val=""/>
@@ -15730,7 +13970,7 @@
 </dgm:layoutDef>
 </file>
 
-<file path=ppt/diagrams/layout8.xml><?xml version="1.0" encoding="utf-8"?>
+<file path=ppt/diagrams/layout7.xml><?xml version="1.0" encoding="utf-8"?>
 <dgm:layoutDef xmlns:dgm="http://schemas.openxmlformats.org/drawingml/2006/diagram" xmlns:a="http://schemas.openxmlformats.org/drawingml/2006/main" uniqueId="urn:microsoft.com/office/officeart/2005/8/layout/vList2">
   <dgm:title val=""/>
   <dgm:desc val=""/>
@@ -15897,7 +14137,7 @@
 </dgm:layoutDef>
 </file>
 
-<file path=ppt/diagrams/layout9.xml><?xml version="1.0" encoding="utf-8"?>
+<file path=ppt/diagrams/layout8.xml><?xml version="1.0" encoding="utf-8"?>
 <dgm:layoutDef xmlns:dgm="http://schemas.openxmlformats.org/drawingml/2006/diagram" xmlns:a="http://schemas.openxmlformats.org/drawingml/2006/main" uniqueId="urn:microsoft.com/office/officeart/2005/8/layout/vList2">
   <dgm:title val=""/>
   <dgm:desc val=""/>
@@ -22269,1040 +20509,6 @@
 </file>
 
 <file path=ppt/diagrams/quickStyle7.xml><?xml version="1.0" encoding="utf-8"?>
-<dgm:styleDef xmlns:dgm="http://schemas.openxmlformats.org/drawingml/2006/diagram" xmlns:a="http://schemas.openxmlformats.org/drawingml/2006/main" uniqueId="urn:microsoft.com/office/officeart/2005/8/quickstyle/simple1">
-  <dgm:title val=""/>
-  <dgm:desc val=""/>
-  <dgm:catLst>
-    <dgm:cat type="simple" pri="10100"/>
-  </dgm:catLst>
-  <dgm:scene3d>
-    <a:camera prst="orthographicFront"/>
-    <a:lightRig rig="threePt" dir="t"/>
-  </dgm:scene3d>
-  <dgm:styleLbl name="node0">
-    <dgm:scene3d>
-      <a:camera prst="orthographicFront"/>
-      <a:lightRig rig="threePt" dir="t"/>
-    </dgm:scene3d>
-    <dgm:sp3d/>
-    <dgm:txPr/>
-    <dgm:style>
-      <a:lnRef idx="2">
-        <a:scrgbClr r="0" g="0" b="0"/>
-      </a:lnRef>
-      <a:fillRef idx="1">
-        <a:scrgbClr r="0" g="0" b="0"/>
-      </a:fillRef>
-      <a:effectRef idx="0">
-        <a:scrgbClr r="0" g="0" b="0"/>
-      </a:effectRef>
-      <a:fontRef idx="minor">
-        <a:schemeClr val="lt1"/>
-      </a:fontRef>
-    </dgm:style>
-  </dgm:styleLbl>
-  <dgm:styleLbl name="lnNode1">
-    <dgm:scene3d>
-      <a:camera prst="orthographicFront"/>
-      <a:lightRig rig="threePt" dir="t"/>
-    </dgm:scene3d>
-    <dgm:sp3d/>
-    <dgm:txPr/>
-    <dgm:style>
-      <a:lnRef idx="2">
-        <a:scrgbClr r="0" g="0" b="0"/>
-      </a:lnRef>
-      <a:fillRef idx="1">
-        <a:scrgbClr r="0" g="0" b="0"/>
-      </a:fillRef>
-      <a:effectRef idx="0">
-        <a:scrgbClr r="0" g="0" b="0"/>
-      </a:effectRef>
-      <a:fontRef idx="minor">
-        <a:schemeClr val="lt1"/>
-      </a:fontRef>
-    </dgm:style>
-  </dgm:styleLbl>
-  <dgm:styleLbl name="vennNode1">
-    <dgm:scene3d>
-      <a:camera prst="orthographicFront"/>
-      <a:lightRig rig="threePt" dir="t"/>
-    </dgm:scene3d>
-    <dgm:sp3d/>
-    <dgm:txPr/>
-    <dgm:style>
-      <a:lnRef idx="2">
-        <a:scrgbClr r="0" g="0" b="0"/>
-      </a:lnRef>
-      <a:fillRef idx="1">
-        <a:scrgbClr r="0" g="0" b="0"/>
-      </a:fillRef>
-      <a:effectRef idx="0">
-        <a:scrgbClr r="0" g="0" b="0"/>
-      </a:effectRef>
-      <a:fontRef idx="minor">
-        <a:schemeClr val="tx1"/>
-      </a:fontRef>
-    </dgm:style>
-  </dgm:styleLbl>
-  <dgm:styleLbl name="alignNode1">
-    <dgm:scene3d>
-      <a:camera prst="orthographicFront"/>
-      <a:lightRig rig="threePt" dir="t"/>
-    </dgm:scene3d>
-    <dgm:sp3d/>
-    <dgm:txPr/>
-    <dgm:style>
-      <a:lnRef idx="2">
-        <a:scrgbClr r="0" g="0" b="0"/>
-      </a:lnRef>
-      <a:fillRef idx="1">
-        <a:scrgbClr r="0" g="0" b="0"/>
-      </a:fillRef>
-      <a:effectRef idx="0">
-        <a:scrgbClr r="0" g="0" b="0"/>
-      </a:effectRef>
-      <a:fontRef idx="minor">
-        <a:schemeClr val="lt1"/>
-      </a:fontRef>
-    </dgm:style>
-  </dgm:styleLbl>
-  <dgm:styleLbl name="node1">
-    <dgm:scene3d>
-      <a:camera prst="orthographicFront"/>
-      <a:lightRig rig="threePt" dir="t"/>
-    </dgm:scene3d>
-    <dgm:sp3d/>
-    <dgm:txPr/>
-    <dgm:style>
-      <a:lnRef idx="2">
-        <a:scrgbClr r="0" g="0" b="0"/>
-      </a:lnRef>
-      <a:fillRef idx="1">
-        <a:scrgbClr r="0" g="0" b="0"/>
-      </a:fillRef>
-      <a:effectRef idx="0">
-        <a:scrgbClr r="0" g="0" b="0"/>
-      </a:effectRef>
-      <a:fontRef idx="minor">
-        <a:schemeClr val="lt1"/>
-      </a:fontRef>
-    </dgm:style>
-  </dgm:styleLbl>
-  <dgm:styleLbl name="node2">
-    <dgm:scene3d>
-      <a:camera prst="orthographicFront"/>
-      <a:lightRig rig="threePt" dir="t"/>
-    </dgm:scene3d>
-    <dgm:sp3d/>
-    <dgm:txPr/>
-    <dgm:style>
-      <a:lnRef idx="2">
-        <a:scrgbClr r="0" g="0" b="0"/>
-      </a:lnRef>
-      <a:fillRef idx="1">
-        <a:scrgbClr r="0" g="0" b="0"/>
-      </a:fillRef>
-      <a:effectRef idx="0">
-        <a:scrgbClr r="0" g="0" b="0"/>
-      </a:effectRef>
-      <a:fontRef idx="minor">
-        <a:schemeClr val="lt1"/>
-      </a:fontRef>
-    </dgm:style>
-  </dgm:styleLbl>
-  <dgm:styleLbl name="node3">
-    <dgm:scene3d>
-      <a:camera prst="orthographicFront"/>
-      <a:lightRig rig="threePt" dir="t"/>
-    </dgm:scene3d>
-    <dgm:sp3d/>
-    <dgm:txPr/>
-    <dgm:style>
-      <a:lnRef idx="2">
-        <a:scrgbClr r="0" g="0" b="0"/>
-      </a:lnRef>
-      <a:fillRef idx="1">
-        <a:scrgbClr r="0" g="0" b="0"/>
-      </a:fillRef>
-      <a:effectRef idx="0">
-        <a:scrgbClr r="0" g="0" b="0"/>
-      </a:effectRef>
-      <a:fontRef idx="minor">
-        <a:schemeClr val="lt1"/>
-      </a:fontRef>
-    </dgm:style>
-  </dgm:styleLbl>
-  <dgm:styleLbl name="node4">
-    <dgm:scene3d>
-      <a:camera prst="orthographicFront"/>
-      <a:lightRig rig="threePt" dir="t"/>
-    </dgm:scene3d>
-    <dgm:sp3d/>
-    <dgm:txPr/>
-    <dgm:style>
-      <a:lnRef idx="2">
-        <a:scrgbClr r="0" g="0" b="0"/>
-      </a:lnRef>
-      <a:fillRef idx="1">
-        <a:scrgbClr r="0" g="0" b="0"/>
-      </a:fillRef>
-      <a:effectRef idx="0">
-        <a:scrgbClr r="0" g="0" b="0"/>
-      </a:effectRef>
-      <a:fontRef idx="minor">
-        <a:schemeClr val="lt1"/>
-      </a:fontRef>
-    </dgm:style>
-  </dgm:styleLbl>
-  <dgm:styleLbl name="fgImgPlace1">
-    <dgm:scene3d>
-      <a:camera prst="orthographicFront"/>
-      <a:lightRig rig="threePt" dir="t"/>
-    </dgm:scene3d>
-    <dgm:sp3d/>
-    <dgm:txPr/>
-    <dgm:style>
-      <a:lnRef idx="2">
-        <a:scrgbClr r="0" g="0" b="0"/>
-      </a:lnRef>
-      <a:fillRef idx="1">
-        <a:scrgbClr r="0" g="0" b="0"/>
-      </a:fillRef>
-      <a:effectRef idx="0">
-        <a:scrgbClr r="0" g="0" b="0"/>
-      </a:effectRef>
-      <a:fontRef idx="minor"/>
-    </dgm:style>
-  </dgm:styleLbl>
-  <dgm:styleLbl name="alignImgPlace1">
-    <dgm:scene3d>
-      <a:camera prst="orthographicFront"/>
-      <a:lightRig rig="threePt" dir="t"/>
-    </dgm:scene3d>
-    <dgm:sp3d/>
-    <dgm:txPr/>
-    <dgm:style>
-      <a:lnRef idx="2">
-        <a:scrgbClr r="0" g="0" b="0"/>
-      </a:lnRef>
-      <a:fillRef idx="1">
-        <a:scrgbClr r="0" g="0" b="0"/>
-      </a:fillRef>
-      <a:effectRef idx="0">
-        <a:scrgbClr r="0" g="0" b="0"/>
-      </a:effectRef>
-      <a:fontRef idx="minor"/>
-    </dgm:style>
-  </dgm:styleLbl>
-  <dgm:styleLbl name="bgImgPlace1">
-    <dgm:scene3d>
-      <a:camera prst="orthographicFront"/>
-      <a:lightRig rig="threePt" dir="t"/>
-    </dgm:scene3d>
-    <dgm:sp3d/>
-    <dgm:txPr/>
-    <dgm:style>
-      <a:lnRef idx="2">
-        <a:scrgbClr r="0" g="0" b="0"/>
-      </a:lnRef>
-      <a:fillRef idx="1">
-        <a:scrgbClr r="0" g="0" b="0"/>
-      </a:fillRef>
-      <a:effectRef idx="0">
-        <a:scrgbClr r="0" g="0" b="0"/>
-      </a:effectRef>
-      <a:fontRef idx="minor"/>
-    </dgm:style>
-  </dgm:styleLbl>
-  <dgm:styleLbl name="sibTrans2D1">
-    <dgm:scene3d>
-      <a:camera prst="orthographicFront"/>
-      <a:lightRig rig="threePt" dir="t"/>
-    </dgm:scene3d>
-    <dgm:sp3d/>
-    <dgm:txPr/>
-    <dgm:style>
-      <a:lnRef idx="0">
-        <a:scrgbClr r="0" g="0" b="0"/>
-      </a:lnRef>
-      <a:fillRef idx="1">
-        <a:scrgbClr r="0" g="0" b="0"/>
-      </a:fillRef>
-      <a:effectRef idx="0">
-        <a:scrgbClr r="0" g="0" b="0"/>
-      </a:effectRef>
-      <a:fontRef idx="minor">
-        <a:schemeClr val="lt1"/>
-      </a:fontRef>
-    </dgm:style>
-  </dgm:styleLbl>
-  <dgm:styleLbl name="fgSibTrans2D1">
-    <dgm:scene3d>
-      <a:camera prst="orthographicFront"/>
-      <a:lightRig rig="threePt" dir="t"/>
-    </dgm:scene3d>
-    <dgm:sp3d/>
-    <dgm:txPr/>
-    <dgm:style>
-      <a:lnRef idx="0">
-        <a:scrgbClr r="0" g="0" b="0"/>
-      </a:lnRef>
-      <a:fillRef idx="1">
-        <a:scrgbClr r="0" g="0" b="0"/>
-      </a:fillRef>
-      <a:effectRef idx="0">
-        <a:scrgbClr r="0" g="0" b="0"/>
-      </a:effectRef>
-      <a:fontRef idx="minor">
-        <a:schemeClr val="lt1"/>
-      </a:fontRef>
-    </dgm:style>
-  </dgm:styleLbl>
-  <dgm:styleLbl name="bgSibTrans2D1">
-    <dgm:scene3d>
-      <a:camera prst="orthographicFront"/>
-      <a:lightRig rig="threePt" dir="t"/>
-    </dgm:scene3d>
-    <dgm:sp3d/>
-    <dgm:txPr/>
-    <dgm:style>
-      <a:lnRef idx="0">
-        <a:scrgbClr r="0" g="0" b="0"/>
-      </a:lnRef>
-      <a:fillRef idx="1">
-        <a:scrgbClr r="0" g="0" b="0"/>
-      </a:fillRef>
-      <a:effectRef idx="0">
-        <a:scrgbClr r="0" g="0" b="0"/>
-      </a:effectRef>
-      <a:fontRef idx="minor">
-        <a:schemeClr val="lt1"/>
-      </a:fontRef>
-    </dgm:style>
-  </dgm:styleLbl>
-  <dgm:styleLbl name="sibTrans1D1">
-    <dgm:scene3d>
-      <a:camera prst="orthographicFront"/>
-      <a:lightRig rig="threePt" dir="t"/>
-    </dgm:scene3d>
-    <dgm:sp3d/>
-    <dgm:txPr/>
-    <dgm:style>
-      <a:lnRef idx="1">
-        <a:scrgbClr r="0" g="0" b="0"/>
-      </a:lnRef>
-      <a:fillRef idx="0">
-        <a:scrgbClr r="0" g="0" b="0"/>
-      </a:fillRef>
-      <a:effectRef idx="0">
-        <a:scrgbClr r="0" g="0" b="0"/>
-      </a:effectRef>
-      <a:fontRef idx="minor"/>
-    </dgm:style>
-  </dgm:styleLbl>
-  <dgm:styleLbl name="callout">
-    <dgm:scene3d>
-      <a:camera prst="orthographicFront"/>
-      <a:lightRig rig="threePt" dir="t"/>
-    </dgm:scene3d>
-    <dgm:sp3d/>
-    <dgm:txPr/>
-    <dgm:style>
-      <a:lnRef idx="2">
-        <a:scrgbClr r="0" g="0" b="0"/>
-      </a:lnRef>
-      <a:fillRef idx="1">
-        <a:scrgbClr r="0" g="0" b="0"/>
-      </a:fillRef>
-      <a:effectRef idx="0">
-        <a:scrgbClr r="0" g="0" b="0"/>
-      </a:effectRef>
-      <a:fontRef idx="minor"/>
-    </dgm:style>
-  </dgm:styleLbl>
-  <dgm:styleLbl name="asst0">
-    <dgm:scene3d>
-      <a:camera prst="orthographicFront"/>
-      <a:lightRig rig="threePt" dir="t"/>
-    </dgm:scene3d>
-    <dgm:sp3d/>
-    <dgm:txPr/>
-    <dgm:style>
-      <a:lnRef idx="2">
-        <a:scrgbClr r="0" g="0" b="0"/>
-      </a:lnRef>
-      <a:fillRef idx="1">
-        <a:scrgbClr r="0" g="0" b="0"/>
-      </a:fillRef>
-      <a:effectRef idx="0">
-        <a:scrgbClr r="0" g="0" b="0"/>
-      </a:effectRef>
-      <a:fontRef idx="minor">
-        <a:schemeClr val="lt1"/>
-      </a:fontRef>
-    </dgm:style>
-  </dgm:styleLbl>
-  <dgm:styleLbl name="asst1">
-    <dgm:scene3d>
-      <a:camera prst="orthographicFront"/>
-      <a:lightRig rig="threePt" dir="t"/>
-    </dgm:scene3d>
-    <dgm:sp3d/>
-    <dgm:txPr/>
-    <dgm:style>
-      <a:lnRef idx="2">
-        <a:scrgbClr r="0" g="0" b="0"/>
-      </a:lnRef>
-      <a:fillRef idx="1">
-        <a:scrgbClr r="0" g="0" b="0"/>
-      </a:fillRef>
-      <a:effectRef idx="0">
-        <a:scrgbClr r="0" g="0" b="0"/>
-      </a:effectRef>
-      <a:fontRef idx="minor">
-        <a:schemeClr val="lt1"/>
-      </a:fontRef>
-    </dgm:style>
-  </dgm:styleLbl>
-  <dgm:styleLbl name="asst2">
-    <dgm:scene3d>
-      <a:camera prst="orthographicFront"/>
-      <a:lightRig rig="threePt" dir="t"/>
-    </dgm:scene3d>
-    <dgm:sp3d/>
-    <dgm:txPr/>
-    <dgm:style>
-      <a:lnRef idx="2">
-        <a:scrgbClr r="0" g="0" b="0"/>
-      </a:lnRef>
-      <a:fillRef idx="1">
-        <a:scrgbClr r="0" g="0" b="0"/>
-      </a:fillRef>
-      <a:effectRef idx="0">
-        <a:scrgbClr r="0" g="0" b="0"/>
-      </a:effectRef>
-      <a:fontRef idx="minor">
-        <a:schemeClr val="lt1"/>
-      </a:fontRef>
-    </dgm:style>
-  </dgm:styleLbl>
-  <dgm:styleLbl name="asst3">
-    <dgm:scene3d>
-      <a:camera prst="orthographicFront"/>
-      <a:lightRig rig="threePt" dir="t"/>
-    </dgm:scene3d>
-    <dgm:sp3d/>
-    <dgm:txPr/>
-    <dgm:style>
-      <a:lnRef idx="2">
-        <a:scrgbClr r="0" g="0" b="0"/>
-      </a:lnRef>
-      <a:fillRef idx="1">
-        <a:scrgbClr r="0" g="0" b="0"/>
-      </a:fillRef>
-      <a:effectRef idx="0">
-        <a:scrgbClr r="0" g="0" b="0"/>
-      </a:effectRef>
-      <a:fontRef idx="minor">
-        <a:schemeClr val="lt1"/>
-      </a:fontRef>
-    </dgm:style>
-  </dgm:styleLbl>
-  <dgm:styleLbl name="asst4">
-    <dgm:scene3d>
-      <a:camera prst="orthographicFront"/>
-      <a:lightRig rig="threePt" dir="t"/>
-    </dgm:scene3d>
-    <dgm:sp3d/>
-    <dgm:txPr/>
-    <dgm:style>
-      <a:lnRef idx="2">
-        <a:scrgbClr r="0" g="0" b="0"/>
-      </a:lnRef>
-      <a:fillRef idx="1">
-        <a:scrgbClr r="0" g="0" b="0"/>
-      </a:fillRef>
-      <a:effectRef idx="0">
-        <a:scrgbClr r="0" g="0" b="0"/>
-      </a:effectRef>
-      <a:fontRef idx="minor">
-        <a:schemeClr val="lt1"/>
-      </a:fontRef>
-    </dgm:style>
-  </dgm:styleLbl>
-  <dgm:styleLbl name="parChTrans2D1">
-    <dgm:scene3d>
-      <a:camera prst="orthographicFront"/>
-      <a:lightRig rig="threePt" dir="t"/>
-    </dgm:scene3d>
-    <dgm:sp3d/>
-    <dgm:txPr/>
-    <dgm:style>
-      <a:lnRef idx="2">
-        <a:scrgbClr r="0" g="0" b="0"/>
-      </a:lnRef>
-      <a:fillRef idx="1">
-        <a:scrgbClr r="0" g="0" b="0"/>
-      </a:fillRef>
-      <a:effectRef idx="0">
-        <a:scrgbClr r="0" g="0" b="0"/>
-      </a:effectRef>
-      <a:fontRef idx="minor">
-        <a:schemeClr val="lt1"/>
-      </a:fontRef>
-    </dgm:style>
-  </dgm:styleLbl>
-  <dgm:styleLbl name="parChTrans2D2">
-    <dgm:scene3d>
-      <a:camera prst="orthographicFront"/>
-      <a:lightRig rig="threePt" dir="t"/>
-    </dgm:scene3d>
-    <dgm:sp3d/>
-    <dgm:txPr/>
-    <dgm:style>
-      <a:lnRef idx="2">
-        <a:scrgbClr r="0" g="0" b="0"/>
-      </a:lnRef>
-      <a:fillRef idx="1">
-        <a:scrgbClr r="0" g="0" b="0"/>
-      </a:fillRef>
-      <a:effectRef idx="0">
-        <a:scrgbClr r="0" g="0" b="0"/>
-      </a:effectRef>
-      <a:fontRef idx="minor">
-        <a:schemeClr val="lt1"/>
-      </a:fontRef>
-    </dgm:style>
-  </dgm:styleLbl>
-  <dgm:styleLbl name="parChTrans2D3">
-    <dgm:scene3d>
-      <a:camera prst="orthographicFront"/>
-      <a:lightRig rig="threePt" dir="t"/>
-    </dgm:scene3d>
-    <dgm:sp3d/>
-    <dgm:txPr/>
-    <dgm:style>
-      <a:lnRef idx="2">
-        <a:scrgbClr r="0" g="0" b="0"/>
-      </a:lnRef>
-      <a:fillRef idx="1">
-        <a:scrgbClr r="0" g="0" b="0"/>
-      </a:fillRef>
-      <a:effectRef idx="0">
-        <a:scrgbClr r="0" g="0" b="0"/>
-      </a:effectRef>
-      <a:fontRef idx="minor">
-        <a:schemeClr val="lt1"/>
-      </a:fontRef>
-    </dgm:style>
-  </dgm:styleLbl>
-  <dgm:styleLbl name="parChTrans2D4">
-    <dgm:scene3d>
-      <a:camera prst="orthographicFront"/>
-      <a:lightRig rig="threePt" dir="t"/>
-    </dgm:scene3d>
-    <dgm:sp3d/>
-    <dgm:txPr/>
-    <dgm:style>
-      <a:lnRef idx="2">
-        <a:scrgbClr r="0" g="0" b="0"/>
-      </a:lnRef>
-      <a:fillRef idx="1">
-        <a:scrgbClr r="0" g="0" b="0"/>
-      </a:fillRef>
-      <a:effectRef idx="0">
-        <a:scrgbClr r="0" g="0" b="0"/>
-      </a:effectRef>
-      <a:fontRef idx="minor">
-        <a:schemeClr val="lt1"/>
-      </a:fontRef>
-    </dgm:style>
-  </dgm:styleLbl>
-  <dgm:styleLbl name="parChTrans1D1">
-    <dgm:scene3d>
-      <a:camera prst="orthographicFront"/>
-      <a:lightRig rig="threePt" dir="t"/>
-    </dgm:scene3d>
-    <dgm:sp3d/>
-    <dgm:txPr/>
-    <dgm:style>
-      <a:lnRef idx="2">
-        <a:scrgbClr r="0" g="0" b="0"/>
-      </a:lnRef>
-      <a:fillRef idx="0">
-        <a:scrgbClr r="0" g="0" b="0"/>
-      </a:fillRef>
-      <a:effectRef idx="0">
-        <a:scrgbClr r="0" g="0" b="0"/>
-      </a:effectRef>
-      <a:fontRef idx="minor"/>
-    </dgm:style>
-  </dgm:styleLbl>
-  <dgm:styleLbl name="parChTrans1D2">
-    <dgm:scene3d>
-      <a:camera prst="orthographicFront"/>
-      <a:lightRig rig="threePt" dir="t"/>
-    </dgm:scene3d>
-    <dgm:sp3d/>
-    <dgm:txPr/>
-    <dgm:style>
-      <a:lnRef idx="2">
-        <a:scrgbClr r="0" g="0" b="0"/>
-      </a:lnRef>
-      <a:fillRef idx="0">
-        <a:scrgbClr r="0" g="0" b="0"/>
-      </a:fillRef>
-      <a:effectRef idx="0">
-        <a:scrgbClr r="0" g="0" b="0"/>
-      </a:effectRef>
-      <a:fontRef idx="minor"/>
-    </dgm:style>
-  </dgm:styleLbl>
-  <dgm:styleLbl name="parChTrans1D3">
-    <dgm:scene3d>
-      <a:camera prst="orthographicFront"/>
-      <a:lightRig rig="threePt" dir="t"/>
-    </dgm:scene3d>
-    <dgm:sp3d/>
-    <dgm:txPr/>
-    <dgm:style>
-      <a:lnRef idx="2">
-        <a:scrgbClr r="0" g="0" b="0"/>
-      </a:lnRef>
-      <a:fillRef idx="0">
-        <a:scrgbClr r="0" g="0" b="0"/>
-      </a:fillRef>
-      <a:effectRef idx="0">
-        <a:scrgbClr r="0" g="0" b="0"/>
-      </a:effectRef>
-      <a:fontRef idx="minor"/>
-    </dgm:style>
-  </dgm:styleLbl>
-  <dgm:styleLbl name="parChTrans1D4">
-    <dgm:scene3d>
-      <a:camera prst="orthographicFront"/>
-      <a:lightRig rig="threePt" dir="t"/>
-    </dgm:scene3d>
-    <dgm:sp3d/>
-    <dgm:txPr/>
-    <dgm:style>
-      <a:lnRef idx="2">
-        <a:scrgbClr r="0" g="0" b="0"/>
-      </a:lnRef>
-      <a:fillRef idx="0">
-        <a:scrgbClr r="0" g="0" b="0"/>
-      </a:fillRef>
-      <a:effectRef idx="0">
-        <a:scrgbClr r="0" g="0" b="0"/>
-      </a:effectRef>
-      <a:fontRef idx="minor"/>
-    </dgm:style>
-  </dgm:styleLbl>
-  <dgm:styleLbl name="fgAcc1">
-    <dgm:scene3d>
-      <a:camera prst="orthographicFront"/>
-      <a:lightRig rig="threePt" dir="t"/>
-    </dgm:scene3d>
-    <dgm:sp3d/>
-    <dgm:txPr/>
-    <dgm:style>
-      <a:lnRef idx="2">
-        <a:scrgbClr r="0" g="0" b="0"/>
-      </a:lnRef>
-      <a:fillRef idx="1">
-        <a:scrgbClr r="0" g="0" b="0"/>
-      </a:fillRef>
-      <a:effectRef idx="0">
-        <a:scrgbClr r="0" g="0" b="0"/>
-      </a:effectRef>
-      <a:fontRef idx="minor"/>
-    </dgm:style>
-  </dgm:styleLbl>
-  <dgm:styleLbl name="conFgAcc1">
-    <dgm:scene3d>
-      <a:camera prst="orthographicFront"/>
-      <a:lightRig rig="threePt" dir="t"/>
-    </dgm:scene3d>
-    <dgm:sp3d/>
-    <dgm:txPr/>
-    <dgm:style>
-      <a:lnRef idx="2">
-        <a:scrgbClr r="0" g="0" b="0"/>
-      </a:lnRef>
-      <a:fillRef idx="1">
-        <a:scrgbClr r="0" g="0" b="0"/>
-      </a:fillRef>
-      <a:effectRef idx="0">
-        <a:scrgbClr r="0" g="0" b="0"/>
-      </a:effectRef>
-      <a:fontRef idx="minor"/>
-    </dgm:style>
-  </dgm:styleLbl>
-  <dgm:styleLbl name="alignAcc1">
-    <dgm:scene3d>
-      <a:camera prst="orthographicFront"/>
-      <a:lightRig rig="threePt" dir="t"/>
-    </dgm:scene3d>
-    <dgm:sp3d/>
-    <dgm:txPr/>
-    <dgm:style>
-      <a:lnRef idx="2">
-        <a:scrgbClr r="0" g="0" b="0"/>
-      </a:lnRef>
-      <a:fillRef idx="1">
-        <a:scrgbClr r="0" g="0" b="0"/>
-      </a:fillRef>
-      <a:effectRef idx="0">
-        <a:scrgbClr r="0" g="0" b="0"/>
-      </a:effectRef>
-      <a:fontRef idx="minor"/>
-    </dgm:style>
-  </dgm:styleLbl>
-  <dgm:styleLbl name="trAlignAcc1">
-    <dgm:scene3d>
-      <a:camera prst="orthographicFront"/>
-      <a:lightRig rig="threePt" dir="t"/>
-    </dgm:scene3d>
-    <dgm:sp3d/>
-    <dgm:txPr/>
-    <dgm:style>
-      <a:lnRef idx="1">
-        <a:scrgbClr r="0" g="0" b="0"/>
-      </a:lnRef>
-      <a:fillRef idx="1">
-        <a:scrgbClr r="0" g="0" b="0"/>
-      </a:fillRef>
-      <a:effectRef idx="0">
-        <a:scrgbClr r="0" g="0" b="0"/>
-      </a:effectRef>
-      <a:fontRef idx="minor"/>
-    </dgm:style>
-  </dgm:styleLbl>
-  <dgm:styleLbl name="bgAcc1">
-    <dgm:scene3d>
-      <a:camera prst="orthographicFront"/>
-      <a:lightRig rig="threePt" dir="t"/>
-    </dgm:scene3d>
-    <dgm:sp3d/>
-    <dgm:txPr/>
-    <dgm:style>
-      <a:lnRef idx="2">
-        <a:scrgbClr r="0" g="0" b="0"/>
-      </a:lnRef>
-      <a:fillRef idx="1">
-        <a:scrgbClr r="0" g="0" b="0"/>
-      </a:fillRef>
-      <a:effectRef idx="0">
-        <a:scrgbClr r="0" g="0" b="0"/>
-      </a:effectRef>
-      <a:fontRef idx="minor"/>
-    </dgm:style>
-  </dgm:styleLbl>
-  <dgm:styleLbl name="solidFgAcc1">
-    <dgm:scene3d>
-      <a:camera prst="orthographicFront"/>
-      <a:lightRig rig="threePt" dir="t"/>
-    </dgm:scene3d>
-    <dgm:sp3d/>
-    <dgm:txPr/>
-    <dgm:style>
-      <a:lnRef idx="2">
-        <a:scrgbClr r="0" g="0" b="0"/>
-      </a:lnRef>
-      <a:fillRef idx="1">
-        <a:scrgbClr r="0" g="0" b="0"/>
-      </a:fillRef>
-      <a:effectRef idx="0">
-        <a:scrgbClr r="0" g="0" b="0"/>
-      </a:effectRef>
-      <a:fontRef idx="minor"/>
-    </dgm:style>
-  </dgm:styleLbl>
-  <dgm:styleLbl name="solidAlignAcc1">
-    <dgm:scene3d>
-      <a:camera prst="orthographicFront"/>
-      <a:lightRig rig="threePt" dir="t"/>
-    </dgm:scene3d>
-    <dgm:sp3d/>
-    <dgm:txPr/>
-    <dgm:style>
-      <a:lnRef idx="2">
-        <a:scrgbClr r="0" g="0" b="0"/>
-      </a:lnRef>
-      <a:fillRef idx="1">
-        <a:scrgbClr r="0" g="0" b="0"/>
-      </a:fillRef>
-      <a:effectRef idx="0">
-        <a:scrgbClr r="0" g="0" b="0"/>
-      </a:effectRef>
-      <a:fontRef idx="minor"/>
-    </dgm:style>
-  </dgm:styleLbl>
-  <dgm:styleLbl name="solidBgAcc1">
-    <dgm:scene3d>
-      <a:camera prst="orthographicFront"/>
-      <a:lightRig rig="threePt" dir="t"/>
-    </dgm:scene3d>
-    <dgm:sp3d/>
-    <dgm:txPr/>
-    <dgm:style>
-      <a:lnRef idx="2">
-        <a:scrgbClr r="0" g="0" b="0"/>
-      </a:lnRef>
-      <a:fillRef idx="1">
-        <a:scrgbClr r="0" g="0" b="0"/>
-      </a:fillRef>
-      <a:effectRef idx="0">
-        <a:scrgbClr r="0" g="0" b="0"/>
-      </a:effectRef>
-      <a:fontRef idx="minor"/>
-    </dgm:style>
-  </dgm:styleLbl>
-  <dgm:styleLbl name="fgAccFollowNode1">
-    <dgm:scene3d>
-      <a:camera prst="orthographicFront"/>
-      <a:lightRig rig="threePt" dir="t"/>
-    </dgm:scene3d>
-    <dgm:sp3d/>
-    <dgm:txPr/>
-    <dgm:style>
-      <a:lnRef idx="2">
-        <a:scrgbClr r="0" g="0" b="0"/>
-      </a:lnRef>
-      <a:fillRef idx="1">
-        <a:scrgbClr r="0" g="0" b="0"/>
-      </a:fillRef>
-      <a:effectRef idx="0">
-        <a:scrgbClr r="0" g="0" b="0"/>
-      </a:effectRef>
-      <a:fontRef idx="minor"/>
-    </dgm:style>
-  </dgm:styleLbl>
-  <dgm:styleLbl name="alignAccFollowNode1">
-    <dgm:scene3d>
-      <a:camera prst="orthographicFront"/>
-      <a:lightRig rig="threePt" dir="t"/>
-    </dgm:scene3d>
-    <dgm:sp3d/>
-    <dgm:txPr/>
-    <dgm:style>
-      <a:lnRef idx="2">
-        <a:scrgbClr r="0" g="0" b="0"/>
-      </a:lnRef>
-      <a:fillRef idx="1">
-        <a:scrgbClr r="0" g="0" b="0"/>
-      </a:fillRef>
-      <a:effectRef idx="0">
-        <a:scrgbClr r="0" g="0" b="0"/>
-      </a:effectRef>
-      <a:fontRef idx="minor"/>
-    </dgm:style>
-  </dgm:styleLbl>
-  <dgm:styleLbl name="bgAccFollowNode1">
-    <dgm:scene3d>
-      <a:camera prst="orthographicFront"/>
-      <a:lightRig rig="threePt" dir="t"/>
-    </dgm:scene3d>
-    <dgm:sp3d/>
-    <dgm:txPr/>
-    <dgm:style>
-      <a:lnRef idx="2">
-        <a:scrgbClr r="0" g="0" b="0"/>
-      </a:lnRef>
-      <a:fillRef idx="1">
-        <a:scrgbClr r="0" g="0" b="0"/>
-      </a:fillRef>
-      <a:effectRef idx="0">
-        <a:scrgbClr r="0" g="0" b="0"/>
-      </a:effectRef>
-      <a:fontRef idx="minor"/>
-    </dgm:style>
-  </dgm:styleLbl>
-  <dgm:styleLbl name="fgAcc0">
-    <dgm:scene3d>
-      <a:camera prst="orthographicFront"/>
-      <a:lightRig rig="threePt" dir="t"/>
-    </dgm:scene3d>
-    <dgm:sp3d/>
-    <dgm:txPr/>
-    <dgm:style>
-      <a:lnRef idx="2">
-        <a:scrgbClr r="0" g="0" b="0"/>
-      </a:lnRef>
-      <a:fillRef idx="1">
-        <a:scrgbClr r="0" g="0" b="0"/>
-      </a:fillRef>
-      <a:effectRef idx="0">
-        <a:scrgbClr r="0" g="0" b="0"/>
-      </a:effectRef>
-      <a:fontRef idx="minor"/>
-    </dgm:style>
-  </dgm:styleLbl>
-  <dgm:styleLbl name="fgAcc2">
-    <dgm:scene3d>
-      <a:camera prst="orthographicFront"/>
-      <a:lightRig rig="threePt" dir="t"/>
-    </dgm:scene3d>
-    <dgm:sp3d/>
-    <dgm:txPr/>
-    <dgm:style>
-      <a:lnRef idx="2">
-        <a:scrgbClr r="0" g="0" b="0"/>
-      </a:lnRef>
-      <a:fillRef idx="1">
-        <a:scrgbClr r="0" g="0" b="0"/>
-      </a:fillRef>
-      <a:effectRef idx="0">
-        <a:scrgbClr r="0" g="0" b="0"/>
-      </a:effectRef>
-      <a:fontRef idx="minor"/>
-    </dgm:style>
-  </dgm:styleLbl>
-  <dgm:styleLbl name="fgAcc3">
-    <dgm:scene3d>
-      <a:camera prst="orthographicFront"/>
-      <a:lightRig rig="threePt" dir="t"/>
-    </dgm:scene3d>
-    <dgm:sp3d/>
-    <dgm:txPr/>
-    <dgm:style>
-      <a:lnRef idx="2">
-        <a:scrgbClr r="0" g="0" b="0"/>
-      </a:lnRef>
-      <a:fillRef idx="1">
-        <a:scrgbClr r="0" g="0" b="0"/>
-      </a:fillRef>
-      <a:effectRef idx="0">
-        <a:scrgbClr r="0" g="0" b="0"/>
-      </a:effectRef>
-      <a:fontRef idx="minor"/>
-    </dgm:style>
-  </dgm:styleLbl>
-  <dgm:styleLbl name="fgAcc4">
-    <dgm:scene3d>
-      <a:camera prst="orthographicFront"/>
-      <a:lightRig rig="threePt" dir="t"/>
-    </dgm:scene3d>
-    <dgm:sp3d/>
-    <dgm:txPr/>
-    <dgm:style>
-      <a:lnRef idx="2">
-        <a:scrgbClr r="0" g="0" b="0"/>
-      </a:lnRef>
-      <a:fillRef idx="1">
-        <a:scrgbClr r="0" g="0" b="0"/>
-      </a:fillRef>
-      <a:effectRef idx="0">
-        <a:scrgbClr r="0" g="0" b="0"/>
-      </a:effectRef>
-      <a:fontRef idx="minor"/>
-    </dgm:style>
-  </dgm:styleLbl>
-  <dgm:styleLbl name="bgShp">
-    <dgm:scene3d>
-      <a:camera prst="orthographicFront"/>
-      <a:lightRig rig="threePt" dir="t"/>
-    </dgm:scene3d>
-    <dgm:sp3d/>
-    <dgm:txPr/>
-    <dgm:style>
-      <a:lnRef idx="0">
-        <a:scrgbClr r="0" g="0" b="0"/>
-      </a:lnRef>
-      <a:fillRef idx="1">
-        <a:scrgbClr r="0" g="0" b="0"/>
-      </a:fillRef>
-      <a:effectRef idx="0">
-        <a:scrgbClr r="0" g="0" b="0"/>
-      </a:effectRef>
-      <a:fontRef idx="minor"/>
-    </dgm:style>
-  </dgm:styleLbl>
-  <dgm:styleLbl name="dkBgShp">
-    <dgm:scene3d>
-      <a:camera prst="orthographicFront"/>
-      <a:lightRig rig="threePt" dir="t"/>
-    </dgm:scene3d>
-    <dgm:sp3d/>
-    <dgm:txPr/>
-    <dgm:style>
-      <a:lnRef idx="0">
-        <a:scrgbClr r="0" g="0" b="0"/>
-      </a:lnRef>
-      <a:fillRef idx="1">
-        <a:scrgbClr r="0" g="0" b="0"/>
-      </a:fillRef>
-      <a:effectRef idx="0">
-        <a:scrgbClr r="0" g="0" b="0"/>
-      </a:effectRef>
-      <a:fontRef idx="minor"/>
-    </dgm:style>
-  </dgm:styleLbl>
-  <dgm:styleLbl name="trBgShp">
-    <dgm:scene3d>
-      <a:camera prst="orthographicFront"/>
-      <a:lightRig rig="threePt" dir="t"/>
-    </dgm:scene3d>
-    <dgm:sp3d/>
-    <dgm:txPr/>
-    <dgm:style>
-      <a:lnRef idx="0">
-        <a:scrgbClr r="0" g="0" b="0"/>
-      </a:lnRef>
-      <a:fillRef idx="1">
-        <a:scrgbClr r="0" g="0" b="0"/>
-      </a:fillRef>
-      <a:effectRef idx="0">
-        <a:scrgbClr r="0" g="0" b="0"/>
-      </a:effectRef>
-      <a:fontRef idx="minor"/>
-    </dgm:style>
-  </dgm:styleLbl>
-  <dgm:styleLbl name="fgShp">
-    <dgm:scene3d>
-      <a:camera prst="orthographicFront"/>
-      <a:lightRig rig="threePt" dir="t"/>
-    </dgm:scene3d>
-    <dgm:sp3d/>
-    <dgm:txPr/>
-    <dgm:style>
-      <a:lnRef idx="2">
-        <a:scrgbClr r="0" g="0" b="0"/>
-      </a:lnRef>
-      <a:fillRef idx="1">
-        <a:scrgbClr r="0" g="0" b="0"/>
-      </a:fillRef>
-      <a:effectRef idx="0">
-        <a:scrgbClr r="0" g="0" b="0"/>
-      </a:effectRef>
-      <a:fontRef idx="minor"/>
-    </dgm:style>
-  </dgm:styleLbl>
-  <dgm:styleLbl name="revTx">
-    <dgm:scene3d>
-      <a:camera prst="orthographicFront"/>
-      <a:lightRig rig="threePt" dir="t"/>
-    </dgm:scene3d>
-    <dgm:sp3d/>
-    <dgm:txPr/>
-    <dgm:style>
-      <a:lnRef idx="0">
-        <a:scrgbClr r="0" g="0" b="0"/>
-      </a:lnRef>
-      <a:fillRef idx="0">
-        <a:scrgbClr r="0" g="0" b="0"/>
-      </a:fillRef>
-      <a:effectRef idx="0">
-        <a:scrgbClr r="0" g="0" b="0"/>
-      </a:effectRef>
-      <a:fontRef idx="minor"/>
-    </dgm:style>
-  </dgm:styleLbl>
-</dgm:styleDef>
-</file>
-
-<file path=ppt/diagrams/quickStyle8.xml><?xml version="1.0" encoding="utf-8"?>
 <dgm:styleDef xmlns:dgm="http://schemas.openxmlformats.org/drawingml/2006/diagram" xmlns:a="http://schemas.openxmlformats.org/drawingml/2006/main" uniqueId="urn:microsoft.com/office/officeart/2005/8/quickstyle/simple4">
   <dgm:title val=""/>
   <dgm:desc val=""/>
@@ -24336,7 +21542,7 @@
 </dgm:styleDef>
 </file>
 
-<file path=ppt/diagrams/quickStyle9.xml><?xml version="1.0" encoding="utf-8"?>
+<file path=ppt/diagrams/quickStyle8.xml><?xml version="1.0" encoding="utf-8"?>
 <dgm:styleDef xmlns:dgm="http://schemas.openxmlformats.org/drawingml/2006/diagram" xmlns:a="http://schemas.openxmlformats.org/drawingml/2006/main" uniqueId="urn:microsoft.com/office/officeart/2005/8/quickstyle/simple1">
   <dgm:title val=""/>
   <dgm:desc val=""/>
@@ -33208,7 +30414,7 @@
             <p:ph idx="1"/>
             <p:extLst>
               <p:ext uri="{D42A27DB-BD31-4B8C-83A1-F6EECF244321}">
-                <p14:modId xmlns:p14="http://schemas.microsoft.com/office/powerpoint/2010/main" val="4227633510"/>
+                <p14:modId xmlns:p14="http://schemas.microsoft.com/office/powerpoint/2010/main" val="234366587"/>
               </p:ext>
             </p:extLst>
           </p:nvPr>
@@ -33237,422 +30443,6 @@
 </file>
 
 <file path=ppt/slides/slide17.xml><?xml version="1.0" encoding="utf-8"?>
-<p:sld xmlns:a="http://schemas.openxmlformats.org/drawingml/2006/main" xmlns:r="http://schemas.openxmlformats.org/officeDocument/2006/relationships" xmlns:p="http://schemas.openxmlformats.org/presentationml/2006/main">
-  <p:cSld>
-    <p:bg>
-      <p:bgPr>
-        <a:solidFill>
-          <a:schemeClr val="bg1"/>
-        </a:solidFill>
-        <a:effectLst/>
-      </p:bgPr>
-    </p:bg>
-    <p:spTree>
-      <p:nvGrpSpPr>
-        <p:cNvPr id="1" name="">
-          <a:extLst>
-            <a:ext uri="{FF2B5EF4-FFF2-40B4-BE49-F238E27FC236}">
-              <a16:creationId xmlns:a16="http://schemas.microsoft.com/office/drawing/2014/main" id="{B60227B8-8298-3F6B-E3EC-F3E03E25C3F5}"/>
-            </a:ext>
-          </a:extLst>
-        </p:cNvPr>
-        <p:cNvGrpSpPr/>
-        <p:nvPr/>
-      </p:nvGrpSpPr>
-      <p:grpSpPr>
-        <a:xfrm>
-          <a:off x="0" y="0"/>
-          <a:ext cx="0" cy="0"/>
-          <a:chOff x="0" y="0"/>
-          <a:chExt cx="0" cy="0"/>
-        </a:xfrm>
-      </p:grpSpPr>
-      <p:sp useBgFill="1">
-        <p:nvSpPr>
-          <p:cNvPr id="17" name="Rectangle 8">
-            <a:extLst>
-              <a:ext uri="{FF2B5EF4-FFF2-40B4-BE49-F238E27FC236}">
-                <a16:creationId xmlns:a16="http://schemas.microsoft.com/office/drawing/2014/main" id="{BACC6370-2D7E-4714-9D71-7542949D7D5D}"/>
-              </a:ext>
-              <a:ext uri="{C183D7F6-B498-43B3-948B-1728B52AA6E4}">
-                <adec:decorative xmlns:adec="http://schemas.microsoft.com/office/drawing/2017/decorative" val="1"/>
-              </a:ext>
-            </a:extLst>
-          </p:cNvPr>
-          <p:cNvSpPr>
-            <a:spLocks noGrp="1" noRot="1" noChangeAspect="1" noMove="1" noResize="1" noEditPoints="1" noAdjustHandles="1" noChangeArrowheads="1" noChangeShapeType="1" noTextEdit="1"/>
-          </p:cNvSpPr>
-          <p:nvPr>
-            <p:extLst>
-              <p:ext uri="{386F3935-93C4-4BCD-93E2-E3B085C9AB24}">
-                <p16:designElem xmlns:p16="http://schemas.microsoft.com/office/powerpoint/2015/main" val="1"/>
-              </p:ext>
-            </p:extLst>
-          </p:nvPr>
-        </p:nvSpPr>
-        <p:spPr>
-          <a:xfrm>
-            <a:off x="0" y="0"/>
-            <a:ext cx="12192000" cy="6858000"/>
-          </a:xfrm>
-          <a:prstGeom prst="rect">
-            <a:avLst/>
-          </a:prstGeom>
-          <a:ln w="12700" cap="flat" cmpd="sng" algn="ctr">
-            <a:noFill/>
-            <a:prstDash val="solid"/>
-            <a:miter lim="800000"/>
-          </a:ln>
-          <a:effectLst/>
-          <a:extLst>
-            <a:ext uri="{91240B29-F687-4F45-9708-019B960494DF}">
-              <a14:hiddenLine xmlns:a14="http://schemas.microsoft.com/office/drawing/2010/main" w="12700" cap="flat" cmpd="sng" algn="ctr">
-                <a:solidFill>
-                  <a:schemeClr val="accent1">
-                    <a:shade val="50000"/>
-                  </a:schemeClr>
-                </a:solidFill>
-                <a:prstDash val="solid"/>
-                <a:miter lim="800000"/>
-              </a14:hiddenLine>
-            </a:ext>
-          </a:extLst>
-        </p:spPr>
-        <p:style>
-          <a:lnRef idx="2">
-            <a:schemeClr val="accent1">
-              <a:shade val="50000"/>
-            </a:schemeClr>
-          </a:lnRef>
-          <a:fillRef idx="1">
-            <a:schemeClr val="accent1"/>
-          </a:fillRef>
-          <a:effectRef idx="0">
-            <a:schemeClr val="accent1"/>
-          </a:effectRef>
-          <a:fontRef idx="minor">
-            <a:schemeClr val="lt1"/>
-          </a:fontRef>
-        </p:style>
-        <p:txBody>
-          <a:bodyPr rtlCol="0" anchor="ctr"/>
-          <a:lstStyle/>
-          <a:p>
-            <a:pPr algn="ctr"/>
-            <a:endParaRPr lang="en-US"/>
-          </a:p>
-        </p:txBody>
-      </p:sp>
-      <p:sp>
-        <p:nvSpPr>
-          <p:cNvPr id="18" name="Rectangle 10">
-            <a:extLst>
-              <a:ext uri="{FF2B5EF4-FFF2-40B4-BE49-F238E27FC236}">
-                <a16:creationId xmlns:a16="http://schemas.microsoft.com/office/drawing/2014/main" id="{F68B3F68-107C-434F-AA38-110D5EA91B85}"/>
-              </a:ext>
-              <a:ext uri="{C183D7F6-B498-43B3-948B-1728B52AA6E4}">
-                <adec:decorative xmlns:adec="http://schemas.microsoft.com/office/drawing/2017/decorative" val="1"/>
-              </a:ext>
-            </a:extLst>
-          </p:cNvPr>
-          <p:cNvSpPr>
-            <a:spLocks noGrp="1" noRot="1" noChangeAspect="1" noMove="1" noResize="1" noEditPoints="1" noAdjustHandles="1" noChangeArrowheads="1" noChangeShapeType="1" noTextEdit="1"/>
-          </p:cNvSpPr>
-          <p:nvPr>
-            <p:extLst>
-              <p:ext uri="{386F3935-93C4-4BCD-93E2-E3B085C9AB24}">
-                <p16:designElem xmlns:p16="http://schemas.microsoft.com/office/powerpoint/2015/main" val="1"/>
-              </p:ext>
-            </p:extLst>
-          </p:nvPr>
-        </p:nvSpPr>
-        <p:spPr>
-          <a:xfrm flipH="1">
-            <a:off x="2" y="0"/>
-            <a:ext cx="12191998" cy="1575955"/>
-          </a:xfrm>
-          <a:prstGeom prst="rect">
-            <a:avLst/>
-          </a:prstGeom>
-          <a:gradFill>
-            <a:gsLst>
-              <a:gs pos="0">
-                <a:srgbClr val="000000">
-                  <a:alpha val="96000"/>
-                </a:srgbClr>
-              </a:gs>
-              <a:gs pos="100000">
-                <a:schemeClr val="accent1">
-                  <a:lumMod val="75000"/>
-                </a:schemeClr>
-              </a:gs>
-            </a:gsLst>
-            <a:lin ang="8400000" scaled="0"/>
-          </a:gradFill>
-          <a:ln>
-            <a:noFill/>
-          </a:ln>
-        </p:spPr>
-        <p:style>
-          <a:lnRef idx="2">
-            <a:schemeClr val="accent1">
-              <a:shade val="50000"/>
-            </a:schemeClr>
-          </a:lnRef>
-          <a:fillRef idx="1">
-            <a:schemeClr val="accent1"/>
-          </a:fillRef>
-          <a:effectRef idx="0">
-            <a:schemeClr val="accent1"/>
-          </a:effectRef>
-          <a:fontRef idx="minor">
-            <a:schemeClr val="lt1"/>
-          </a:fontRef>
-        </p:style>
-        <p:txBody>
-          <a:bodyPr rtlCol="0" anchor="ctr"/>
-          <a:lstStyle/>
-          <a:p>
-            <a:pPr algn="ctr"/>
-            <a:endParaRPr lang="en-US"/>
-          </a:p>
-        </p:txBody>
-      </p:sp>
-      <p:sp>
-        <p:nvSpPr>
-          <p:cNvPr id="19" name="Rectangle 12">
-            <a:extLst>
-              <a:ext uri="{FF2B5EF4-FFF2-40B4-BE49-F238E27FC236}">
-                <a16:creationId xmlns:a16="http://schemas.microsoft.com/office/drawing/2014/main" id="{AAD0DBB9-1A4B-4391-81D4-CB19F9AB918A}"/>
-              </a:ext>
-              <a:ext uri="{C183D7F6-B498-43B3-948B-1728B52AA6E4}">
-                <adec:decorative xmlns:adec="http://schemas.microsoft.com/office/drawing/2017/decorative" val="1"/>
-              </a:ext>
-            </a:extLst>
-          </p:cNvPr>
-          <p:cNvSpPr>
-            <a:spLocks noGrp="1" noRot="1" noChangeAspect="1" noMove="1" noResize="1" noEditPoints="1" noAdjustHandles="1" noChangeArrowheads="1" noChangeShapeType="1" noTextEdit="1"/>
-          </p:cNvSpPr>
-          <p:nvPr>
-            <p:extLst>
-              <p:ext uri="{386F3935-93C4-4BCD-93E2-E3B085C9AB24}">
-                <p16:designElem xmlns:p16="http://schemas.microsoft.com/office/powerpoint/2015/main" val="1"/>
-              </p:ext>
-            </p:extLst>
-          </p:nvPr>
-        </p:nvSpPr>
-        <p:spPr>
-          <a:xfrm rot="10800000" flipH="1">
-            <a:off x="8128857" y="0"/>
-            <a:ext cx="4063143" cy="1576412"/>
-          </a:xfrm>
-          <a:prstGeom prst="rect">
-            <a:avLst/>
-          </a:prstGeom>
-          <a:gradFill>
-            <a:gsLst>
-              <a:gs pos="19000">
-                <a:schemeClr val="accent1">
-                  <a:lumMod val="50000"/>
-                  <a:alpha val="68000"/>
-                </a:schemeClr>
-              </a:gs>
-              <a:gs pos="100000">
-                <a:schemeClr val="accent1">
-                  <a:alpha val="79000"/>
-                </a:schemeClr>
-              </a:gs>
-            </a:gsLst>
-            <a:lin ang="19200000" scaled="0"/>
-          </a:gradFill>
-          <a:ln>
-            <a:noFill/>
-          </a:ln>
-        </p:spPr>
-        <p:style>
-          <a:lnRef idx="2">
-            <a:schemeClr val="accent1">
-              <a:shade val="50000"/>
-            </a:schemeClr>
-          </a:lnRef>
-          <a:fillRef idx="1">
-            <a:schemeClr val="accent1"/>
-          </a:fillRef>
-          <a:effectRef idx="0">
-            <a:schemeClr val="accent1"/>
-          </a:effectRef>
-          <a:fontRef idx="minor">
-            <a:schemeClr val="lt1"/>
-          </a:fontRef>
-        </p:style>
-        <p:txBody>
-          <a:bodyPr rtlCol="0" anchor="ctr"/>
-          <a:lstStyle/>
-          <a:p>
-            <a:pPr algn="ctr"/>
-            <a:endParaRPr lang="en-US"/>
-          </a:p>
-        </p:txBody>
-      </p:sp>
-      <p:sp>
-        <p:nvSpPr>
-          <p:cNvPr id="20" name="Rectangle 14">
-            <a:extLst>
-              <a:ext uri="{FF2B5EF4-FFF2-40B4-BE49-F238E27FC236}">
-                <a16:creationId xmlns:a16="http://schemas.microsoft.com/office/drawing/2014/main" id="{063BBA22-50EA-4C4D-BE05-F1CE4E63AA56}"/>
-              </a:ext>
-              <a:ext uri="{C183D7F6-B498-43B3-948B-1728B52AA6E4}">
-                <adec:decorative xmlns:adec="http://schemas.microsoft.com/office/drawing/2017/decorative" val="1"/>
-              </a:ext>
-            </a:extLst>
-          </p:cNvPr>
-          <p:cNvSpPr>
-            <a:spLocks noGrp="1" noRot="1" noChangeAspect="1" noMove="1" noResize="1" noEditPoints="1" noAdjustHandles="1" noChangeArrowheads="1" noChangeShapeType="1" noTextEdit="1"/>
-          </p:cNvSpPr>
-          <p:nvPr>
-            <p:extLst>
-              <p:ext uri="{386F3935-93C4-4BCD-93E2-E3B085C9AB24}">
-                <p16:designElem xmlns:p16="http://schemas.microsoft.com/office/powerpoint/2015/main" val="1"/>
-              </p:ext>
-            </p:extLst>
-          </p:nvPr>
-        </p:nvSpPr>
-        <p:spPr>
-          <a:xfrm rot="5400000">
-            <a:off x="5307777" y="-5307778"/>
-            <a:ext cx="1576446" cy="12192002"/>
-          </a:xfrm>
-          <a:prstGeom prst="rect">
-            <a:avLst/>
-          </a:prstGeom>
-          <a:gradFill>
-            <a:gsLst>
-              <a:gs pos="23000">
-                <a:schemeClr val="accent1">
-                  <a:alpha val="0"/>
-                </a:schemeClr>
-              </a:gs>
-              <a:gs pos="99000">
-                <a:srgbClr val="000000">
-                  <a:alpha val="74000"/>
-                </a:srgbClr>
-              </a:gs>
-            </a:gsLst>
-            <a:lin ang="20400000" scaled="0"/>
-          </a:gradFill>
-          <a:ln>
-            <a:noFill/>
-          </a:ln>
-        </p:spPr>
-        <p:style>
-          <a:lnRef idx="2">
-            <a:schemeClr val="accent1">
-              <a:shade val="50000"/>
-            </a:schemeClr>
-          </a:lnRef>
-          <a:fillRef idx="1">
-            <a:schemeClr val="accent1"/>
-          </a:fillRef>
-          <a:effectRef idx="0">
-            <a:schemeClr val="accent1"/>
-          </a:effectRef>
-          <a:fontRef idx="minor">
-            <a:schemeClr val="lt1"/>
-          </a:fontRef>
-        </p:style>
-        <p:txBody>
-          <a:bodyPr rtlCol="0" anchor="ctr"/>
-          <a:lstStyle/>
-          <a:p>
-            <a:pPr algn="ctr"/>
-            <a:endParaRPr lang="en-US" dirty="0"/>
-          </a:p>
-        </p:txBody>
-      </p:sp>
-      <p:sp>
-        <p:nvSpPr>
-          <p:cNvPr id="2" name="Título 1">
-            <a:extLst>
-              <a:ext uri="{FF2B5EF4-FFF2-40B4-BE49-F238E27FC236}">
-                <a16:creationId xmlns:a16="http://schemas.microsoft.com/office/drawing/2014/main" id="{558C1278-3E60-2021-1BD8-E96086ACBADB}"/>
-              </a:ext>
-            </a:extLst>
-          </p:cNvPr>
-          <p:cNvSpPr>
-            <a:spLocks noGrp="1"/>
-          </p:cNvSpPr>
-          <p:nvPr>
-            <p:ph type="title"/>
-          </p:nvPr>
-        </p:nvSpPr>
-        <p:spPr>
-          <a:xfrm>
-            <a:off x="1371597" y="348865"/>
-            <a:ext cx="10044023" cy="877729"/>
-          </a:xfrm>
-        </p:spPr>
-        <p:txBody>
-          <a:bodyPr anchor="ctr">
-            <a:normAutofit/>
-          </a:bodyPr>
-          <a:lstStyle/>
-          <a:p>
-            <a:r>
-              <a:rPr lang="es-ES_tradnl" sz="4000">
-                <a:solidFill>
-                  <a:srgbClr val="FFFFFF"/>
-                </a:solidFill>
-              </a:rPr>
-              <a:t>¿Qué servicio de seguridad provee AES?</a:t>
-            </a:r>
-          </a:p>
-        </p:txBody>
-      </p:sp>
-      <p:graphicFrame>
-        <p:nvGraphicFramePr>
-          <p:cNvPr id="21" name="Marcador de contenido 2">
-            <a:extLst>
-              <a:ext uri="{FF2B5EF4-FFF2-40B4-BE49-F238E27FC236}">
-                <a16:creationId xmlns:a16="http://schemas.microsoft.com/office/drawing/2014/main" id="{290E521B-A498-8831-2A54-E7B545037363}"/>
-              </a:ext>
-            </a:extLst>
-          </p:cNvPr>
-          <p:cNvGraphicFramePr>
-            <a:graphicFrameLocks noGrp="1"/>
-          </p:cNvGraphicFramePr>
-          <p:nvPr>
-            <p:ph idx="1"/>
-            <p:extLst>
-              <p:ext uri="{D42A27DB-BD31-4B8C-83A1-F6EECF244321}">
-                <p14:modId xmlns:p14="http://schemas.microsoft.com/office/powerpoint/2010/main" val="3868710454"/>
-              </p:ext>
-            </p:extLst>
-          </p:nvPr>
-        </p:nvGraphicFramePr>
-        <p:xfrm>
-          <a:off x="644056" y="2112579"/>
-          <a:ext cx="10927829" cy="4192805"/>
-        </p:xfrm>
-        <a:graphic>
-          <a:graphicData uri="http://schemas.openxmlformats.org/drawingml/2006/diagram">
-            <dgm:relIds xmlns:dgm="http://schemas.openxmlformats.org/drawingml/2006/diagram" xmlns:r="http://schemas.openxmlformats.org/officeDocument/2006/relationships" r:dm="rId2" r:lo="rId3" r:qs="rId4" r:cs="rId5"/>
-          </a:graphicData>
-        </a:graphic>
-      </p:graphicFrame>
-    </p:spTree>
-    <p:extLst>
-      <p:ext uri="{BB962C8B-B14F-4D97-AF65-F5344CB8AC3E}">
-        <p14:creationId xmlns:p14="http://schemas.microsoft.com/office/powerpoint/2010/main" val="3634773456"/>
-      </p:ext>
-    </p:extLst>
-  </p:cSld>
-  <p:clrMapOvr>
-    <a:masterClrMapping/>
-  </p:clrMapOvr>
-</p:sld>
-</file>
-
-<file path=ppt/slides/slide18.xml><?xml version="1.0" encoding="utf-8"?>
 <p:sld xmlns:a="http://schemas.openxmlformats.org/drawingml/2006/main" xmlns:r="http://schemas.openxmlformats.org/officeDocument/2006/relationships" xmlns:p="http://schemas.openxmlformats.org/presentationml/2006/main">
   <p:cSld>
     <p:bg>
@@ -33955,7 +30745,7 @@
 </p:sld>
 </file>
 
-<file path=ppt/slides/slide19.xml><?xml version="1.0" encoding="utf-8"?>
+<file path=ppt/slides/slide18.xml><?xml version="1.0" encoding="utf-8"?>
 <p:sld xmlns:a="http://schemas.openxmlformats.org/drawingml/2006/main" xmlns:r="http://schemas.openxmlformats.org/officeDocument/2006/relationships" xmlns:p="http://schemas.openxmlformats.org/presentationml/2006/main">
   <p:cSld>
     <p:bg>
@@ -34428,418 +31218,7 @@
 </p:sld>
 </file>
 
-<file path=ppt/slides/slide2.xml><?xml version="1.0" encoding="utf-8"?>
-<p:sld xmlns:a="http://schemas.openxmlformats.org/drawingml/2006/main" xmlns:r="http://schemas.openxmlformats.org/officeDocument/2006/relationships" xmlns:p="http://schemas.openxmlformats.org/presentationml/2006/main">
-  <p:cSld>
-    <p:bg>
-      <p:bgPr>
-        <a:solidFill>
-          <a:schemeClr val="bg1"/>
-        </a:solidFill>
-        <a:effectLst/>
-      </p:bgPr>
-    </p:bg>
-    <p:spTree>
-      <p:nvGrpSpPr>
-        <p:cNvPr id="1" name=""/>
-        <p:cNvGrpSpPr/>
-        <p:nvPr/>
-      </p:nvGrpSpPr>
-      <p:grpSpPr>
-        <a:xfrm>
-          <a:off x="0" y="0"/>
-          <a:ext cx="0" cy="0"/>
-          <a:chOff x="0" y="0"/>
-          <a:chExt cx="0" cy="0"/>
-        </a:xfrm>
-      </p:grpSpPr>
-      <p:sp useBgFill="1">
-        <p:nvSpPr>
-          <p:cNvPr id="9" name="Rectangle 8">
-            <a:extLst>
-              <a:ext uri="{FF2B5EF4-FFF2-40B4-BE49-F238E27FC236}">
-                <a16:creationId xmlns:a16="http://schemas.microsoft.com/office/drawing/2014/main" id="{BACC6370-2D7E-4714-9D71-7542949D7D5D}"/>
-              </a:ext>
-              <a:ext uri="{C183D7F6-B498-43B3-948B-1728B52AA6E4}">
-                <adec:decorative xmlns:adec="http://schemas.microsoft.com/office/drawing/2017/decorative" val="1"/>
-              </a:ext>
-            </a:extLst>
-          </p:cNvPr>
-          <p:cNvSpPr>
-            <a:spLocks noGrp="1" noRot="1" noChangeAspect="1" noMove="1" noResize="1" noEditPoints="1" noAdjustHandles="1" noChangeArrowheads="1" noChangeShapeType="1" noTextEdit="1"/>
-          </p:cNvSpPr>
-          <p:nvPr>
-            <p:extLst>
-              <p:ext uri="{386F3935-93C4-4BCD-93E2-E3B085C9AB24}">
-                <p16:designElem xmlns:p16="http://schemas.microsoft.com/office/powerpoint/2015/main" val="1"/>
-              </p:ext>
-            </p:extLst>
-          </p:nvPr>
-        </p:nvSpPr>
-        <p:spPr>
-          <a:xfrm>
-            <a:off x="0" y="0"/>
-            <a:ext cx="12192000" cy="6858000"/>
-          </a:xfrm>
-          <a:prstGeom prst="rect">
-            <a:avLst/>
-          </a:prstGeom>
-          <a:ln w="12700" cap="flat" cmpd="sng" algn="ctr">
-            <a:noFill/>
-            <a:prstDash val="solid"/>
-            <a:miter lim="800000"/>
-          </a:ln>
-          <a:effectLst/>
-          <a:extLst>
-            <a:ext uri="{91240B29-F687-4F45-9708-019B960494DF}">
-              <a14:hiddenLine xmlns:a14="http://schemas.microsoft.com/office/drawing/2010/main" w="12700" cap="flat" cmpd="sng" algn="ctr">
-                <a:solidFill>
-                  <a:schemeClr val="accent1">
-                    <a:shade val="50000"/>
-                  </a:schemeClr>
-                </a:solidFill>
-                <a:prstDash val="solid"/>
-                <a:miter lim="800000"/>
-              </a14:hiddenLine>
-            </a:ext>
-          </a:extLst>
-        </p:spPr>
-        <p:style>
-          <a:lnRef idx="2">
-            <a:schemeClr val="accent1">
-              <a:shade val="50000"/>
-            </a:schemeClr>
-          </a:lnRef>
-          <a:fillRef idx="1">
-            <a:schemeClr val="accent1"/>
-          </a:fillRef>
-          <a:effectRef idx="0">
-            <a:schemeClr val="accent1"/>
-          </a:effectRef>
-          <a:fontRef idx="minor">
-            <a:schemeClr val="lt1"/>
-          </a:fontRef>
-        </p:style>
-        <p:txBody>
-          <a:bodyPr rtlCol="0" anchor="ctr"/>
-          <a:lstStyle/>
-          <a:p>
-            <a:pPr algn="ctr"/>
-            <a:endParaRPr lang="en-US"/>
-          </a:p>
-        </p:txBody>
-      </p:sp>
-      <p:sp>
-        <p:nvSpPr>
-          <p:cNvPr id="11" name="Rectangle 10">
-            <a:extLst>
-              <a:ext uri="{FF2B5EF4-FFF2-40B4-BE49-F238E27FC236}">
-                <a16:creationId xmlns:a16="http://schemas.microsoft.com/office/drawing/2014/main" id="{F68B3F68-107C-434F-AA38-110D5EA91B85}"/>
-              </a:ext>
-              <a:ext uri="{C183D7F6-B498-43B3-948B-1728B52AA6E4}">
-                <adec:decorative xmlns:adec="http://schemas.microsoft.com/office/drawing/2017/decorative" val="1"/>
-              </a:ext>
-            </a:extLst>
-          </p:cNvPr>
-          <p:cNvSpPr>
-            <a:spLocks noGrp="1" noRot="1" noChangeAspect="1" noMove="1" noResize="1" noEditPoints="1" noAdjustHandles="1" noChangeArrowheads="1" noChangeShapeType="1" noTextEdit="1"/>
-          </p:cNvSpPr>
-          <p:nvPr>
-            <p:extLst>
-              <p:ext uri="{386F3935-93C4-4BCD-93E2-E3B085C9AB24}">
-                <p16:designElem xmlns:p16="http://schemas.microsoft.com/office/powerpoint/2015/main" val="1"/>
-              </p:ext>
-            </p:extLst>
-          </p:nvPr>
-        </p:nvSpPr>
-        <p:spPr>
-          <a:xfrm flipH="1">
-            <a:off x="2" y="0"/>
-            <a:ext cx="12191998" cy="2170031"/>
-          </a:xfrm>
-          <a:prstGeom prst="rect">
-            <a:avLst/>
-          </a:prstGeom>
-          <a:gradFill>
-            <a:gsLst>
-              <a:gs pos="0">
-                <a:srgbClr val="000000">
-                  <a:alpha val="96000"/>
-                </a:srgbClr>
-              </a:gs>
-              <a:gs pos="100000">
-                <a:schemeClr val="accent1">
-                  <a:lumMod val="75000"/>
-                </a:schemeClr>
-              </a:gs>
-            </a:gsLst>
-            <a:lin ang="19800000" scaled="0"/>
-          </a:gradFill>
-          <a:ln>
-            <a:noFill/>
-          </a:ln>
-        </p:spPr>
-        <p:style>
-          <a:lnRef idx="2">
-            <a:schemeClr val="accent1">
-              <a:shade val="50000"/>
-            </a:schemeClr>
-          </a:lnRef>
-          <a:fillRef idx="1">
-            <a:schemeClr val="accent1"/>
-          </a:fillRef>
-          <a:effectRef idx="0">
-            <a:schemeClr val="accent1"/>
-          </a:effectRef>
-          <a:fontRef idx="minor">
-            <a:schemeClr val="lt1"/>
-          </a:fontRef>
-        </p:style>
-        <p:txBody>
-          <a:bodyPr rtlCol="0" anchor="ctr"/>
-          <a:lstStyle/>
-          <a:p>
-            <a:pPr algn="ctr"/>
-            <a:endParaRPr lang="en-US"/>
-          </a:p>
-        </p:txBody>
-      </p:sp>
-      <p:sp>
-        <p:nvSpPr>
-          <p:cNvPr id="13" name="Rectangle 12">
-            <a:extLst>
-              <a:ext uri="{FF2B5EF4-FFF2-40B4-BE49-F238E27FC236}">
-                <a16:creationId xmlns:a16="http://schemas.microsoft.com/office/drawing/2014/main" id="{AAD0DBB9-1A4B-4391-81D4-CB19F9AB918A}"/>
-              </a:ext>
-              <a:ext uri="{C183D7F6-B498-43B3-948B-1728B52AA6E4}">
-                <adec:decorative xmlns:adec="http://schemas.microsoft.com/office/drawing/2017/decorative" val="1"/>
-              </a:ext>
-            </a:extLst>
-          </p:cNvPr>
-          <p:cNvSpPr>
-            <a:spLocks noGrp="1" noRot="1" noChangeAspect="1" noMove="1" noResize="1" noEditPoints="1" noAdjustHandles="1" noChangeArrowheads="1" noChangeShapeType="1" noTextEdit="1"/>
-          </p:cNvSpPr>
-          <p:nvPr>
-            <p:extLst>
-              <p:ext uri="{386F3935-93C4-4BCD-93E2-E3B085C9AB24}">
-                <p16:designElem xmlns:p16="http://schemas.microsoft.com/office/powerpoint/2015/main" val="1"/>
-              </p:ext>
-            </p:extLst>
-          </p:nvPr>
-        </p:nvSpPr>
-        <p:spPr>
-          <a:xfrm flipH="1">
-            <a:off x="8082819" y="0"/>
-            <a:ext cx="4097211" cy="2170661"/>
-          </a:xfrm>
-          <a:prstGeom prst="rect">
-            <a:avLst/>
-          </a:prstGeom>
-          <a:gradFill>
-            <a:gsLst>
-              <a:gs pos="19000">
-                <a:schemeClr val="accent1">
-                  <a:lumMod val="50000"/>
-                  <a:alpha val="68000"/>
-                </a:schemeClr>
-              </a:gs>
-              <a:gs pos="100000">
-                <a:schemeClr val="accent1">
-                  <a:alpha val="48000"/>
-                </a:schemeClr>
-              </a:gs>
-            </a:gsLst>
-            <a:lin ang="19200000" scaled="0"/>
-          </a:gradFill>
-          <a:ln>
-            <a:noFill/>
-          </a:ln>
-        </p:spPr>
-        <p:style>
-          <a:lnRef idx="2">
-            <a:schemeClr val="accent1">
-              <a:shade val="50000"/>
-            </a:schemeClr>
-          </a:lnRef>
-          <a:fillRef idx="1">
-            <a:schemeClr val="accent1"/>
-          </a:fillRef>
-          <a:effectRef idx="0">
-            <a:schemeClr val="accent1"/>
-          </a:effectRef>
-          <a:fontRef idx="minor">
-            <a:schemeClr val="lt1"/>
-          </a:fontRef>
-        </p:style>
-        <p:txBody>
-          <a:bodyPr rtlCol="0" anchor="ctr"/>
-          <a:lstStyle/>
-          <a:p>
-            <a:pPr algn="ctr"/>
-            <a:endParaRPr lang="en-US"/>
-          </a:p>
-        </p:txBody>
-      </p:sp>
-      <p:sp>
-        <p:nvSpPr>
-          <p:cNvPr id="15" name="Rectangle 14">
-            <a:extLst>
-              <a:ext uri="{FF2B5EF4-FFF2-40B4-BE49-F238E27FC236}">
-                <a16:creationId xmlns:a16="http://schemas.microsoft.com/office/drawing/2014/main" id="{063BBA22-50EA-4C4D-BE05-F1CE4E63AA56}"/>
-              </a:ext>
-              <a:ext uri="{C183D7F6-B498-43B3-948B-1728B52AA6E4}">
-                <adec:decorative xmlns:adec="http://schemas.microsoft.com/office/drawing/2017/decorative" val="1"/>
-              </a:ext>
-            </a:extLst>
-          </p:cNvPr>
-          <p:cNvSpPr>
-            <a:spLocks noGrp="1" noRot="1" noChangeAspect="1" noMove="1" noResize="1" noEditPoints="1" noAdjustHandles="1" noChangeArrowheads="1" noChangeShapeType="1" noTextEdit="1"/>
-          </p:cNvSpPr>
-          <p:nvPr>
-            <p:extLst>
-              <p:ext uri="{386F3935-93C4-4BCD-93E2-E3B085C9AB24}">
-                <p16:designElem xmlns:p16="http://schemas.microsoft.com/office/powerpoint/2015/main" val="1"/>
-              </p:ext>
-            </p:extLst>
-          </p:nvPr>
-        </p:nvSpPr>
-        <p:spPr>
-          <a:xfrm rot="16200000" flipH="1">
-            <a:off x="5010646" y="-5010043"/>
-            <a:ext cx="2170709" cy="12192000"/>
-          </a:xfrm>
-          <a:prstGeom prst="rect">
-            <a:avLst/>
-          </a:prstGeom>
-          <a:gradFill>
-            <a:gsLst>
-              <a:gs pos="23000">
-                <a:schemeClr val="accent1">
-                  <a:lumMod val="75000"/>
-                  <a:alpha val="16000"/>
-                </a:schemeClr>
-              </a:gs>
-              <a:gs pos="99000">
-                <a:srgbClr val="000000">
-                  <a:alpha val="45000"/>
-                </a:srgbClr>
-              </a:gs>
-            </a:gsLst>
-            <a:lin ang="21000000" scaled="0"/>
-          </a:gradFill>
-          <a:ln>
-            <a:noFill/>
-          </a:ln>
-        </p:spPr>
-        <p:style>
-          <a:lnRef idx="2">
-            <a:schemeClr val="accent1">
-              <a:shade val="50000"/>
-            </a:schemeClr>
-          </a:lnRef>
-          <a:fillRef idx="1">
-            <a:schemeClr val="accent1"/>
-          </a:fillRef>
-          <a:effectRef idx="0">
-            <a:schemeClr val="accent1"/>
-          </a:effectRef>
-          <a:fontRef idx="minor">
-            <a:schemeClr val="lt1"/>
-          </a:fontRef>
-        </p:style>
-        <p:txBody>
-          <a:bodyPr rtlCol="0" anchor="ctr"/>
-          <a:lstStyle/>
-          <a:p>
-            <a:pPr algn="ctr"/>
-            <a:endParaRPr lang="en-US" dirty="0"/>
-          </a:p>
-        </p:txBody>
-      </p:sp>
-      <p:sp>
-        <p:nvSpPr>
-          <p:cNvPr id="2" name="Título 1">
-            <a:extLst>
-              <a:ext uri="{FF2B5EF4-FFF2-40B4-BE49-F238E27FC236}">
-                <a16:creationId xmlns:a16="http://schemas.microsoft.com/office/drawing/2014/main" id="{7130DFE3-E624-B541-4F2A-558A56210957}"/>
-              </a:ext>
-            </a:extLst>
-          </p:cNvPr>
-          <p:cNvSpPr>
-            <a:spLocks noGrp="1"/>
-          </p:cNvSpPr>
-          <p:nvPr>
-            <p:ph type="title"/>
-          </p:nvPr>
-        </p:nvSpPr>
-        <p:spPr>
-          <a:xfrm>
-            <a:off x="1383564" y="348865"/>
-            <a:ext cx="9718111" cy="1576446"/>
-          </a:xfrm>
-        </p:spPr>
-        <p:txBody>
-          <a:bodyPr anchor="ctr">
-            <a:normAutofit/>
-          </a:bodyPr>
-          <a:lstStyle/>
-          <a:p>
-            <a:r>
-              <a:rPr lang="es-ES_tradnl" sz="4000" dirty="0">
-                <a:solidFill>
-                  <a:srgbClr val="FFFFFF"/>
-                </a:solidFill>
-              </a:rPr>
-              <a:t>¿Cuáles son los servicios básicos de la seguridad?</a:t>
-            </a:r>
-          </a:p>
-        </p:txBody>
-      </p:sp>
-      <p:graphicFrame>
-        <p:nvGraphicFramePr>
-          <p:cNvPr id="6" name="Marcador de contenido 2">
-            <a:extLst>
-              <a:ext uri="{FF2B5EF4-FFF2-40B4-BE49-F238E27FC236}">
-                <a16:creationId xmlns:a16="http://schemas.microsoft.com/office/drawing/2014/main" id="{9FB9C357-6A22-E8D7-DD69-89151046FED8}"/>
-              </a:ext>
-            </a:extLst>
-          </p:cNvPr>
-          <p:cNvGraphicFramePr>
-            <a:graphicFrameLocks noGrp="1"/>
-          </p:cNvGraphicFramePr>
-          <p:nvPr>
-            <p:ph idx="1"/>
-            <p:extLst>
-              <p:ext uri="{D42A27DB-BD31-4B8C-83A1-F6EECF244321}">
-                <p14:modId xmlns:p14="http://schemas.microsoft.com/office/powerpoint/2010/main" val="2858260871"/>
-              </p:ext>
-            </p:extLst>
-          </p:nvPr>
-        </p:nvGraphicFramePr>
-        <p:xfrm>
-          <a:off x="644056" y="2615979"/>
-          <a:ext cx="10927829" cy="3689405"/>
-        </p:xfrm>
-        <a:graphic>
-          <a:graphicData uri="http://schemas.openxmlformats.org/drawingml/2006/diagram">
-            <dgm:relIds xmlns:dgm="http://schemas.openxmlformats.org/drawingml/2006/diagram" xmlns:r="http://schemas.openxmlformats.org/officeDocument/2006/relationships" r:dm="rId2" r:lo="rId3" r:qs="rId4" r:cs="rId5"/>
-          </a:graphicData>
-        </a:graphic>
-      </p:graphicFrame>
-    </p:spTree>
-    <p:extLst>
-      <p:ext uri="{BB962C8B-B14F-4D97-AF65-F5344CB8AC3E}">
-        <p14:creationId xmlns:p14="http://schemas.microsoft.com/office/powerpoint/2010/main" val="2637326759"/>
-      </p:ext>
-    </p:extLst>
-  </p:cSld>
-  <p:clrMapOvr>
-    <a:masterClrMapping/>
-  </p:clrMapOvr>
-</p:sld>
-</file>
-
-<file path=ppt/slides/slide20.xml><?xml version="1.0" encoding="utf-8"?>
+<file path=ppt/slides/slide19.xml><?xml version="1.0" encoding="utf-8"?>
 <p:sld xmlns:a="http://schemas.openxmlformats.org/drawingml/2006/main" xmlns:r="http://schemas.openxmlformats.org/officeDocument/2006/relationships" xmlns:p="http://schemas.openxmlformats.org/presentationml/2006/main">
   <p:cSld>
     <p:bg>
@@ -35764,7 +32143,418 @@
 </p:sld>
 </file>
 
-<file path=ppt/slides/slide21.xml><?xml version="1.0" encoding="utf-8"?>
+<file path=ppt/slides/slide2.xml><?xml version="1.0" encoding="utf-8"?>
+<p:sld xmlns:a="http://schemas.openxmlformats.org/drawingml/2006/main" xmlns:r="http://schemas.openxmlformats.org/officeDocument/2006/relationships" xmlns:p="http://schemas.openxmlformats.org/presentationml/2006/main">
+  <p:cSld>
+    <p:bg>
+      <p:bgPr>
+        <a:solidFill>
+          <a:schemeClr val="bg1"/>
+        </a:solidFill>
+        <a:effectLst/>
+      </p:bgPr>
+    </p:bg>
+    <p:spTree>
+      <p:nvGrpSpPr>
+        <p:cNvPr id="1" name=""/>
+        <p:cNvGrpSpPr/>
+        <p:nvPr/>
+      </p:nvGrpSpPr>
+      <p:grpSpPr>
+        <a:xfrm>
+          <a:off x="0" y="0"/>
+          <a:ext cx="0" cy="0"/>
+          <a:chOff x="0" y="0"/>
+          <a:chExt cx="0" cy="0"/>
+        </a:xfrm>
+      </p:grpSpPr>
+      <p:sp useBgFill="1">
+        <p:nvSpPr>
+          <p:cNvPr id="9" name="Rectangle 8">
+            <a:extLst>
+              <a:ext uri="{FF2B5EF4-FFF2-40B4-BE49-F238E27FC236}">
+                <a16:creationId xmlns:a16="http://schemas.microsoft.com/office/drawing/2014/main" id="{BACC6370-2D7E-4714-9D71-7542949D7D5D}"/>
+              </a:ext>
+              <a:ext uri="{C183D7F6-B498-43B3-948B-1728B52AA6E4}">
+                <adec:decorative xmlns:adec="http://schemas.microsoft.com/office/drawing/2017/decorative" val="1"/>
+              </a:ext>
+            </a:extLst>
+          </p:cNvPr>
+          <p:cNvSpPr>
+            <a:spLocks noGrp="1" noRot="1" noChangeAspect="1" noMove="1" noResize="1" noEditPoints="1" noAdjustHandles="1" noChangeArrowheads="1" noChangeShapeType="1" noTextEdit="1"/>
+          </p:cNvSpPr>
+          <p:nvPr>
+            <p:extLst>
+              <p:ext uri="{386F3935-93C4-4BCD-93E2-E3B085C9AB24}">
+                <p16:designElem xmlns:p16="http://schemas.microsoft.com/office/powerpoint/2015/main" val="1"/>
+              </p:ext>
+            </p:extLst>
+          </p:nvPr>
+        </p:nvSpPr>
+        <p:spPr>
+          <a:xfrm>
+            <a:off x="0" y="0"/>
+            <a:ext cx="12192000" cy="6858000"/>
+          </a:xfrm>
+          <a:prstGeom prst="rect">
+            <a:avLst/>
+          </a:prstGeom>
+          <a:ln w="12700" cap="flat" cmpd="sng" algn="ctr">
+            <a:noFill/>
+            <a:prstDash val="solid"/>
+            <a:miter lim="800000"/>
+          </a:ln>
+          <a:effectLst/>
+          <a:extLst>
+            <a:ext uri="{91240B29-F687-4F45-9708-019B960494DF}">
+              <a14:hiddenLine xmlns:a14="http://schemas.microsoft.com/office/drawing/2010/main" w="12700" cap="flat" cmpd="sng" algn="ctr">
+                <a:solidFill>
+                  <a:schemeClr val="accent1">
+                    <a:shade val="50000"/>
+                  </a:schemeClr>
+                </a:solidFill>
+                <a:prstDash val="solid"/>
+                <a:miter lim="800000"/>
+              </a14:hiddenLine>
+            </a:ext>
+          </a:extLst>
+        </p:spPr>
+        <p:style>
+          <a:lnRef idx="2">
+            <a:schemeClr val="accent1">
+              <a:shade val="50000"/>
+            </a:schemeClr>
+          </a:lnRef>
+          <a:fillRef idx="1">
+            <a:schemeClr val="accent1"/>
+          </a:fillRef>
+          <a:effectRef idx="0">
+            <a:schemeClr val="accent1"/>
+          </a:effectRef>
+          <a:fontRef idx="minor">
+            <a:schemeClr val="lt1"/>
+          </a:fontRef>
+        </p:style>
+        <p:txBody>
+          <a:bodyPr rtlCol="0" anchor="ctr"/>
+          <a:lstStyle/>
+          <a:p>
+            <a:pPr algn="ctr"/>
+            <a:endParaRPr lang="en-US"/>
+          </a:p>
+        </p:txBody>
+      </p:sp>
+      <p:sp>
+        <p:nvSpPr>
+          <p:cNvPr id="11" name="Rectangle 10">
+            <a:extLst>
+              <a:ext uri="{FF2B5EF4-FFF2-40B4-BE49-F238E27FC236}">
+                <a16:creationId xmlns:a16="http://schemas.microsoft.com/office/drawing/2014/main" id="{F68B3F68-107C-434F-AA38-110D5EA91B85}"/>
+              </a:ext>
+              <a:ext uri="{C183D7F6-B498-43B3-948B-1728B52AA6E4}">
+                <adec:decorative xmlns:adec="http://schemas.microsoft.com/office/drawing/2017/decorative" val="1"/>
+              </a:ext>
+            </a:extLst>
+          </p:cNvPr>
+          <p:cNvSpPr>
+            <a:spLocks noGrp="1" noRot="1" noChangeAspect="1" noMove="1" noResize="1" noEditPoints="1" noAdjustHandles="1" noChangeArrowheads="1" noChangeShapeType="1" noTextEdit="1"/>
+          </p:cNvSpPr>
+          <p:nvPr>
+            <p:extLst>
+              <p:ext uri="{386F3935-93C4-4BCD-93E2-E3B085C9AB24}">
+                <p16:designElem xmlns:p16="http://schemas.microsoft.com/office/powerpoint/2015/main" val="1"/>
+              </p:ext>
+            </p:extLst>
+          </p:nvPr>
+        </p:nvSpPr>
+        <p:spPr>
+          <a:xfrm flipH="1">
+            <a:off x="2" y="0"/>
+            <a:ext cx="12191998" cy="2170031"/>
+          </a:xfrm>
+          <a:prstGeom prst="rect">
+            <a:avLst/>
+          </a:prstGeom>
+          <a:gradFill>
+            <a:gsLst>
+              <a:gs pos="0">
+                <a:srgbClr val="000000">
+                  <a:alpha val="96000"/>
+                </a:srgbClr>
+              </a:gs>
+              <a:gs pos="100000">
+                <a:schemeClr val="accent1">
+                  <a:lumMod val="75000"/>
+                </a:schemeClr>
+              </a:gs>
+            </a:gsLst>
+            <a:lin ang="19800000" scaled="0"/>
+          </a:gradFill>
+          <a:ln>
+            <a:noFill/>
+          </a:ln>
+        </p:spPr>
+        <p:style>
+          <a:lnRef idx="2">
+            <a:schemeClr val="accent1">
+              <a:shade val="50000"/>
+            </a:schemeClr>
+          </a:lnRef>
+          <a:fillRef idx="1">
+            <a:schemeClr val="accent1"/>
+          </a:fillRef>
+          <a:effectRef idx="0">
+            <a:schemeClr val="accent1"/>
+          </a:effectRef>
+          <a:fontRef idx="minor">
+            <a:schemeClr val="lt1"/>
+          </a:fontRef>
+        </p:style>
+        <p:txBody>
+          <a:bodyPr rtlCol="0" anchor="ctr"/>
+          <a:lstStyle/>
+          <a:p>
+            <a:pPr algn="ctr"/>
+            <a:endParaRPr lang="en-US"/>
+          </a:p>
+        </p:txBody>
+      </p:sp>
+      <p:sp>
+        <p:nvSpPr>
+          <p:cNvPr id="13" name="Rectangle 12">
+            <a:extLst>
+              <a:ext uri="{FF2B5EF4-FFF2-40B4-BE49-F238E27FC236}">
+                <a16:creationId xmlns:a16="http://schemas.microsoft.com/office/drawing/2014/main" id="{AAD0DBB9-1A4B-4391-81D4-CB19F9AB918A}"/>
+              </a:ext>
+              <a:ext uri="{C183D7F6-B498-43B3-948B-1728B52AA6E4}">
+                <adec:decorative xmlns:adec="http://schemas.microsoft.com/office/drawing/2017/decorative" val="1"/>
+              </a:ext>
+            </a:extLst>
+          </p:cNvPr>
+          <p:cNvSpPr>
+            <a:spLocks noGrp="1" noRot="1" noChangeAspect="1" noMove="1" noResize="1" noEditPoints="1" noAdjustHandles="1" noChangeArrowheads="1" noChangeShapeType="1" noTextEdit="1"/>
+          </p:cNvSpPr>
+          <p:nvPr>
+            <p:extLst>
+              <p:ext uri="{386F3935-93C4-4BCD-93E2-E3B085C9AB24}">
+                <p16:designElem xmlns:p16="http://schemas.microsoft.com/office/powerpoint/2015/main" val="1"/>
+              </p:ext>
+            </p:extLst>
+          </p:nvPr>
+        </p:nvSpPr>
+        <p:spPr>
+          <a:xfrm flipH="1">
+            <a:off x="8082819" y="0"/>
+            <a:ext cx="4097211" cy="2170661"/>
+          </a:xfrm>
+          <a:prstGeom prst="rect">
+            <a:avLst/>
+          </a:prstGeom>
+          <a:gradFill>
+            <a:gsLst>
+              <a:gs pos="19000">
+                <a:schemeClr val="accent1">
+                  <a:lumMod val="50000"/>
+                  <a:alpha val="68000"/>
+                </a:schemeClr>
+              </a:gs>
+              <a:gs pos="100000">
+                <a:schemeClr val="accent1">
+                  <a:alpha val="48000"/>
+                </a:schemeClr>
+              </a:gs>
+            </a:gsLst>
+            <a:lin ang="19200000" scaled="0"/>
+          </a:gradFill>
+          <a:ln>
+            <a:noFill/>
+          </a:ln>
+        </p:spPr>
+        <p:style>
+          <a:lnRef idx="2">
+            <a:schemeClr val="accent1">
+              <a:shade val="50000"/>
+            </a:schemeClr>
+          </a:lnRef>
+          <a:fillRef idx="1">
+            <a:schemeClr val="accent1"/>
+          </a:fillRef>
+          <a:effectRef idx="0">
+            <a:schemeClr val="accent1"/>
+          </a:effectRef>
+          <a:fontRef idx="minor">
+            <a:schemeClr val="lt1"/>
+          </a:fontRef>
+        </p:style>
+        <p:txBody>
+          <a:bodyPr rtlCol="0" anchor="ctr"/>
+          <a:lstStyle/>
+          <a:p>
+            <a:pPr algn="ctr"/>
+            <a:endParaRPr lang="en-US"/>
+          </a:p>
+        </p:txBody>
+      </p:sp>
+      <p:sp>
+        <p:nvSpPr>
+          <p:cNvPr id="15" name="Rectangle 14">
+            <a:extLst>
+              <a:ext uri="{FF2B5EF4-FFF2-40B4-BE49-F238E27FC236}">
+                <a16:creationId xmlns:a16="http://schemas.microsoft.com/office/drawing/2014/main" id="{063BBA22-50EA-4C4D-BE05-F1CE4E63AA56}"/>
+              </a:ext>
+              <a:ext uri="{C183D7F6-B498-43B3-948B-1728B52AA6E4}">
+                <adec:decorative xmlns:adec="http://schemas.microsoft.com/office/drawing/2017/decorative" val="1"/>
+              </a:ext>
+            </a:extLst>
+          </p:cNvPr>
+          <p:cNvSpPr>
+            <a:spLocks noGrp="1" noRot="1" noChangeAspect="1" noMove="1" noResize="1" noEditPoints="1" noAdjustHandles="1" noChangeArrowheads="1" noChangeShapeType="1" noTextEdit="1"/>
+          </p:cNvSpPr>
+          <p:nvPr>
+            <p:extLst>
+              <p:ext uri="{386F3935-93C4-4BCD-93E2-E3B085C9AB24}">
+                <p16:designElem xmlns:p16="http://schemas.microsoft.com/office/powerpoint/2015/main" val="1"/>
+              </p:ext>
+            </p:extLst>
+          </p:nvPr>
+        </p:nvSpPr>
+        <p:spPr>
+          <a:xfrm rot="16200000" flipH="1">
+            <a:off x="5010646" y="-5010043"/>
+            <a:ext cx="2170709" cy="12192000"/>
+          </a:xfrm>
+          <a:prstGeom prst="rect">
+            <a:avLst/>
+          </a:prstGeom>
+          <a:gradFill>
+            <a:gsLst>
+              <a:gs pos="23000">
+                <a:schemeClr val="accent1">
+                  <a:lumMod val="75000"/>
+                  <a:alpha val="16000"/>
+                </a:schemeClr>
+              </a:gs>
+              <a:gs pos="99000">
+                <a:srgbClr val="000000">
+                  <a:alpha val="45000"/>
+                </a:srgbClr>
+              </a:gs>
+            </a:gsLst>
+            <a:lin ang="21000000" scaled="0"/>
+          </a:gradFill>
+          <a:ln>
+            <a:noFill/>
+          </a:ln>
+        </p:spPr>
+        <p:style>
+          <a:lnRef idx="2">
+            <a:schemeClr val="accent1">
+              <a:shade val="50000"/>
+            </a:schemeClr>
+          </a:lnRef>
+          <a:fillRef idx="1">
+            <a:schemeClr val="accent1"/>
+          </a:fillRef>
+          <a:effectRef idx="0">
+            <a:schemeClr val="accent1"/>
+          </a:effectRef>
+          <a:fontRef idx="minor">
+            <a:schemeClr val="lt1"/>
+          </a:fontRef>
+        </p:style>
+        <p:txBody>
+          <a:bodyPr rtlCol="0" anchor="ctr"/>
+          <a:lstStyle/>
+          <a:p>
+            <a:pPr algn="ctr"/>
+            <a:endParaRPr lang="en-US" dirty="0"/>
+          </a:p>
+        </p:txBody>
+      </p:sp>
+      <p:sp>
+        <p:nvSpPr>
+          <p:cNvPr id="2" name="Título 1">
+            <a:extLst>
+              <a:ext uri="{FF2B5EF4-FFF2-40B4-BE49-F238E27FC236}">
+                <a16:creationId xmlns:a16="http://schemas.microsoft.com/office/drawing/2014/main" id="{7130DFE3-E624-B541-4F2A-558A56210957}"/>
+              </a:ext>
+            </a:extLst>
+          </p:cNvPr>
+          <p:cNvSpPr>
+            <a:spLocks noGrp="1"/>
+          </p:cNvSpPr>
+          <p:nvPr>
+            <p:ph type="title"/>
+          </p:nvPr>
+        </p:nvSpPr>
+        <p:spPr>
+          <a:xfrm>
+            <a:off x="1383564" y="348865"/>
+            <a:ext cx="9718111" cy="1576446"/>
+          </a:xfrm>
+        </p:spPr>
+        <p:txBody>
+          <a:bodyPr anchor="ctr">
+            <a:normAutofit/>
+          </a:bodyPr>
+          <a:lstStyle/>
+          <a:p>
+            <a:r>
+              <a:rPr lang="es-ES_tradnl" sz="4000" dirty="0">
+                <a:solidFill>
+                  <a:srgbClr val="FFFFFF"/>
+                </a:solidFill>
+              </a:rPr>
+              <a:t>¿Cuáles son los servicios básicos de la seguridad?</a:t>
+            </a:r>
+          </a:p>
+        </p:txBody>
+      </p:sp>
+      <p:graphicFrame>
+        <p:nvGraphicFramePr>
+          <p:cNvPr id="6" name="Marcador de contenido 2">
+            <a:extLst>
+              <a:ext uri="{FF2B5EF4-FFF2-40B4-BE49-F238E27FC236}">
+                <a16:creationId xmlns:a16="http://schemas.microsoft.com/office/drawing/2014/main" id="{9FB9C357-6A22-E8D7-DD69-89151046FED8}"/>
+              </a:ext>
+            </a:extLst>
+          </p:cNvPr>
+          <p:cNvGraphicFramePr>
+            <a:graphicFrameLocks noGrp="1"/>
+          </p:cNvGraphicFramePr>
+          <p:nvPr>
+            <p:ph idx="1"/>
+            <p:extLst>
+              <p:ext uri="{D42A27DB-BD31-4B8C-83A1-F6EECF244321}">
+                <p14:modId xmlns:p14="http://schemas.microsoft.com/office/powerpoint/2010/main" val="2858260871"/>
+              </p:ext>
+            </p:extLst>
+          </p:nvPr>
+        </p:nvGraphicFramePr>
+        <p:xfrm>
+          <a:off x="644056" y="2615979"/>
+          <a:ext cx="10927829" cy="3689405"/>
+        </p:xfrm>
+        <a:graphic>
+          <a:graphicData uri="http://schemas.openxmlformats.org/drawingml/2006/diagram">
+            <dgm:relIds xmlns:dgm="http://schemas.openxmlformats.org/drawingml/2006/diagram" xmlns:r="http://schemas.openxmlformats.org/officeDocument/2006/relationships" r:dm="rId2" r:lo="rId3" r:qs="rId4" r:cs="rId5"/>
+          </a:graphicData>
+        </a:graphic>
+      </p:graphicFrame>
+    </p:spTree>
+    <p:extLst>
+      <p:ext uri="{BB962C8B-B14F-4D97-AF65-F5344CB8AC3E}">
+        <p14:creationId xmlns:p14="http://schemas.microsoft.com/office/powerpoint/2010/main" val="2637326759"/>
+      </p:ext>
+    </p:extLst>
+  </p:cSld>
+  <p:clrMapOvr>
+    <a:masterClrMapping/>
+  </p:clrMapOvr>
+</p:sld>
+</file>
+
+<file path=ppt/slides/slide20.xml><?xml version="1.0" encoding="utf-8"?>
 <p:sld xmlns:a="http://schemas.openxmlformats.org/drawingml/2006/main" xmlns:r="http://schemas.openxmlformats.org/officeDocument/2006/relationships" xmlns:p="http://schemas.openxmlformats.org/presentationml/2006/main">
   <p:cSld>
     <p:bg>
@@ -36440,7 +33230,7 @@
 </p:sld>
 </file>
 
-<file path=ppt/slides/slide22.xml><?xml version="1.0" encoding="utf-8"?>
+<file path=ppt/slides/slide21.xml><?xml version="1.0" encoding="utf-8"?>
 <p:sld xmlns:a="http://schemas.openxmlformats.org/drawingml/2006/main" xmlns:r="http://schemas.openxmlformats.org/officeDocument/2006/relationships" xmlns:p="http://schemas.openxmlformats.org/presentationml/2006/main">
   <p:cSld>
     <p:bg>
@@ -36624,7 +33414,7 @@
 </p:sld>
 </file>
 
-<file path=ppt/slides/slide23.xml><?xml version="1.0" encoding="utf-8"?>
+<file path=ppt/slides/slide22.xml><?xml version="1.0" encoding="utf-8"?>
 <p:sld xmlns:a="http://schemas.openxmlformats.org/drawingml/2006/main" xmlns:r="http://schemas.openxmlformats.org/officeDocument/2006/relationships" xmlns:p="http://schemas.openxmlformats.org/presentationml/2006/main">
   <p:cSld>
     <p:bg>
@@ -37035,7 +33825,7 @@
 </p:sld>
 </file>
 
-<file path=ppt/slides/slide24.xml><?xml version="1.0" encoding="utf-8"?>
+<file path=ppt/slides/slide23.xml><?xml version="1.0" encoding="utf-8"?>
 <p:sld xmlns:a="http://schemas.openxmlformats.org/drawingml/2006/main" xmlns:r="http://schemas.openxmlformats.org/officeDocument/2006/relationships" xmlns:p="http://schemas.openxmlformats.org/presentationml/2006/main">
   <p:cSld>
     <p:bg>
@@ -37219,7 +34009,7 @@
 </p:sld>
 </file>
 
-<file path=ppt/slides/slide25.xml><?xml version="1.0" encoding="utf-8"?>
+<file path=ppt/slides/slide24.xml><?xml version="1.0" encoding="utf-8"?>
 <p:sld xmlns:a="http://schemas.openxmlformats.org/drawingml/2006/main" xmlns:r="http://schemas.openxmlformats.org/officeDocument/2006/relationships" xmlns:p="http://schemas.openxmlformats.org/presentationml/2006/main">
   <p:cSld>
     <p:bg>
@@ -37880,7 +34670,7 @@
 </p:sld>
 </file>
 
-<file path=ppt/slides/slide26.xml><?xml version="1.0" encoding="utf-8"?>
+<file path=ppt/slides/slide25.xml><?xml version="1.0" encoding="utf-8"?>
 <p:sld xmlns:a="http://schemas.openxmlformats.org/drawingml/2006/main" xmlns:r="http://schemas.openxmlformats.org/officeDocument/2006/relationships" xmlns:p="http://schemas.openxmlformats.org/presentationml/2006/main">
   <p:cSld>
     <p:bg>
@@ -38051,7 +34841,7 @@
 </p:sld>
 </file>
 
-<file path=ppt/slides/slide27.xml><?xml version="1.0" encoding="utf-8"?>
+<file path=ppt/slides/slide26.xml><?xml version="1.0" encoding="utf-8"?>
 <p:sld xmlns:a="http://schemas.openxmlformats.org/drawingml/2006/main" xmlns:r="http://schemas.openxmlformats.org/officeDocument/2006/relationships" xmlns:p="http://schemas.openxmlformats.org/presentationml/2006/main">
   <p:cSld>
     <p:bg>
@@ -38642,7 +35432,7 @@
 </p:sld>
 </file>
 
-<file path=ppt/slides/slide28.xml><?xml version="1.0" encoding="utf-8"?>
+<file path=ppt/slides/slide27.xml><?xml version="1.0" encoding="utf-8"?>
 <p:sld xmlns:a="http://schemas.openxmlformats.org/drawingml/2006/main" xmlns:r="http://schemas.openxmlformats.org/officeDocument/2006/relationships" xmlns:p="http://schemas.openxmlformats.org/presentationml/2006/main">
   <p:cSld>
     <p:bg>
@@ -38889,7 +35679,7 @@
             </a:r>
             <a:r>
               <a:rPr lang="es-ES_tradnl" sz="2000" dirty="0" err="1"/>
-              <a:t>EliHASH</a:t>
+              <a:t>EliMAC</a:t>
             </a:r>
             <a:endParaRPr lang="es-ES_tradnl" sz="2000" dirty="0"/>
           </a:p>
@@ -38897,6 +35687,7 @@
             <a:endParaRPr lang="es-ES_tradnl" sz="2000" dirty="0"/>
           </a:p>
           <a:p>
+            <a:pPr algn="just"/>
             <a:r>
               <a:rPr lang="es-ES_tradnl" sz="2000" dirty="0"/>
               <a:t>https://</a:t>
@@ -38910,7 +35701,7 @@
               <a:t>/AlexPs06/Funciones-hash-</a:t>
             </a:r>
             <a:r>
-              <a:rPr lang="es-ES_tradnl" sz="2000"/>
+              <a:rPr lang="es-ES_tradnl" sz="2000" dirty="0" err="1"/>
               <a:t>vectorizadas.git</a:t>
             </a:r>
             <a:endParaRPr lang="es-ES_tradnl" sz="2000" dirty="0"/>

</xml_diff>